<commit_message>
tests setup, styles and so on.
</commit_message>
<xml_diff>
--- a/React.pptx
+++ b/React.pptx
@@ -5,16 +5,21 @@
     <p:sldMasterId id="2147483648" r:id="rId1"/>
   </p:sldMasterIdLst>
   <p:sldIdLst>
-    <p:sldId id="258" r:id="rId2"/>
-    <p:sldId id="256" r:id="rId3"/>
-    <p:sldId id="257" r:id="rId4"/>
-    <p:sldId id="262" r:id="rId5"/>
-    <p:sldId id="263" r:id="rId6"/>
-    <p:sldId id="259" r:id="rId7"/>
-    <p:sldId id="260" r:id="rId8"/>
-    <p:sldId id="261" r:id="rId9"/>
-    <p:sldId id="264" r:id="rId10"/>
-    <p:sldId id="265" r:id="rId11"/>
+    <p:sldId id="266" r:id="rId2"/>
+    <p:sldId id="258" r:id="rId3"/>
+    <p:sldId id="256" r:id="rId4"/>
+    <p:sldId id="257" r:id="rId5"/>
+    <p:sldId id="262" r:id="rId6"/>
+    <p:sldId id="263" r:id="rId7"/>
+    <p:sldId id="259" r:id="rId8"/>
+    <p:sldId id="260" r:id="rId9"/>
+    <p:sldId id="261" r:id="rId10"/>
+    <p:sldId id="264" r:id="rId11"/>
+    <p:sldId id="265" r:id="rId12"/>
+    <p:sldId id="267" r:id="rId13"/>
+    <p:sldId id="268" r:id="rId14"/>
+    <p:sldId id="271" r:id="rId15"/>
+    <p:sldId id="269" r:id="rId16"/>
   </p:sldIdLst>
   <p:sldSz cx="12192000" cy="6858000"/>
   <p:notesSz cx="6858000" cy="9144000"/>
@@ -113,6 +118,11 @@
       </a:defRPr>
     </a:lvl9pPr>
   </p:defaultTextStyle>
+  <p:extLst>
+    <p:ext uri="{EFAFB233-063F-42B5-8137-9DF3F51BA10A}">
+      <p15:sldGuideLst xmlns:p15="http://schemas.microsoft.com/office/powerpoint/2012/main"/>
+    </p:ext>
+  </p:extLst>
 </p:presentation>
 </file>
 
@@ -263,7 +273,7 @@
           <a:p>
             <a:fld id="{F605501F-A064-45A5-8243-0FB80EACF6C9}" type="datetimeFigureOut">
               <a:rPr lang="en-US" smtClean="0"/>
-              <a:t>11/3/2019</a:t>
+              <a:t>11/9/2019</a:t>
             </a:fld>
             <a:endParaRPr lang="en-US"/>
           </a:p>
@@ -461,7 +471,7 @@
           <a:p>
             <a:fld id="{F605501F-A064-45A5-8243-0FB80EACF6C9}" type="datetimeFigureOut">
               <a:rPr lang="en-US" smtClean="0"/>
-              <a:t>11/3/2019</a:t>
+              <a:t>11/9/2019</a:t>
             </a:fld>
             <a:endParaRPr lang="en-US"/>
           </a:p>
@@ -669,7 +679,7 @@
           <a:p>
             <a:fld id="{F605501F-A064-45A5-8243-0FB80EACF6C9}" type="datetimeFigureOut">
               <a:rPr lang="en-US" smtClean="0"/>
-              <a:t>11/3/2019</a:t>
+              <a:t>11/9/2019</a:t>
             </a:fld>
             <a:endParaRPr lang="en-US"/>
           </a:p>
@@ -867,7 +877,7 @@
           <a:p>
             <a:fld id="{F605501F-A064-45A5-8243-0FB80EACF6C9}" type="datetimeFigureOut">
               <a:rPr lang="en-US" smtClean="0"/>
-              <a:t>11/3/2019</a:t>
+              <a:t>11/9/2019</a:t>
             </a:fld>
             <a:endParaRPr lang="en-US"/>
           </a:p>
@@ -1142,7 +1152,7 @@
           <a:p>
             <a:fld id="{F605501F-A064-45A5-8243-0FB80EACF6C9}" type="datetimeFigureOut">
               <a:rPr lang="en-US" smtClean="0"/>
-              <a:t>11/3/2019</a:t>
+              <a:t>11/9/2019</a:t>
             </a:fld>
             <a:endParaRPr lang="en-US"/>
           </a:p>
@@ -1407,7 +1417,7 @@
           <a:p>
             <a:fld id="{F605501F-A064-45A5-8243-0FB80EACF6C9}" type="datetimeFigureOut">
               <a:rPr lang="en-US" smtClean="0"/>
-              <a:t>11/3/2019</a:t>
+              <a:t>11/9/2019</a:t>
             </a:fld>
             <a:endParaRPr lang="en-US"/>
           </a:p>
@@ -1819,7 +1829,7 @@
           <a:p>
             <a:fld id="{F605501F-A064-45A5-8243-0FB80EACF6C9}" type="datetimeFigureOut">
               <a:rPr lang="en-US" smtClean="0"/>
-              <a:t>11/3/2019</a:t>
+              <a:t>11/9/2019</a:t>
             </a:fld>
             <a:endParaRPr lang="en-US"/>
           </a:p>
@@ -1960,7 +1970,7 @@
           <a:p>
             <a:fld id="{F605501F-A064-45A5-8243-0FB80EACF6C9}" type="datetimeFigureOut">
               <a:rPr lang="en-US" smtClean="0"/>
-              <a:t>11/3/2019</a:t>
+              <a:t>11/9/2019</a:t>
             </a:fld>
             <a:endParaRPr lang="en-US"/>
           </a:p>
@@ -2073,7 +2083,7 @@
           <a:p>
             <a:fld id="{F605501F-A064-45A5-8243-0FB80EACF6C9}" type="datetimeFigureOut">
               <a:rPr lang="en-US" smtClean="0"/>
-              <a:t>11/3/2019</a:t>
+              <a:t>11/9/2019</a:t>
             </a:fld>
             <a:endParaRPr lang="en-US"/>
           </a:p>
@@ -2384,7 +2394,7 @@
           <a:p>
             <a:fld id="{F605501F-A064-45A5-8243-0FB80EACF6C9}" type="datetimeFigureOut">
               <a:rPr lang="en-US" smtClean="0"/>
-              <a:t>11/3/2019</a:t>
+              <a:t>11/9/2019</a:t>
             </a:fld>
             <a:endParaRPr lang="en-US"/>
           </a:p>
@@ -2672,7 +2682,7 @@
           <a:p>
             <a:fld id="{F605501F-A064-45A5-8243-0FB80EACF6C9}" type="datetimeFigureOut">
               <a:rPr lang="en-US" smtClean="0"/>
-              <a:t>11/3/2019</a:t>
+              <a:t>11/9/2019</a:t>
             </a:fld>
             <a:endParaRPr lang="en-US"/>
           </a:p>
@@ -2913,7 +2923,7 @@
           <a:p>
             <a:fld id="{F605501F-A064-45A5-8243-0FB80EACF6C9}" type="datetimeFigureOut">
               <a:rPr lang="en-US" smtClean="0"/>
-              <a:t>11/3/2019</a:t>
+              <a:t>11/9/2019</a:t>
             </a:fld>
             <a:endParaRPr lang="en-US"/>
           </a:p>
@@ -3332,908 +3342,70 @@
       </p:grpSpPr>
       <p:sp>
         <p:nvSpPr>
-          <p:cNvPr id="4" name="Rectangle 1">
+          <p:cNvPr id="2" name="Title 1">
             <a:extLst>
               <a:ext uri="{FF2B5EF4-FFF2-40B4-BE49-F238E27FC236}">
-                <a16:creationId xmlns:a16="http://schemas.microsoft.com/office/drawing/2014/main" id="{6ADD2411-8563-4664-BE85-A98247D1024B}"/>
+                <a16:creationId xmlns:a16="http://schemas.microsoft.com/office/drawing/2014/main" id="{CEA20DA3-91EE-427B-9E2D-7170198D4EDF}"/>
               </a:ext>
             </a:extLst>
           </p:cNvPr>
           <p:cNvSpPr>
-            <a:spLocks noGrp="1" noChangeArrowheads="1"/>
+            <a:spLocks noGrp="1"/>
           </p:cNvSpPr>
           <p:nvPr>
-            <p:ph type="title"/>
+            <p:ph type="ctrTitle"/>
           </p:nvPr>
         </p:nvSpPr>
-        <p:spPr bwMode="auto">
-          <a:xfrm>
-            <a:off x="838200" y="597020"/>
-            <a:ext cx="4410053" cy="861774"/>
-          </a:xfrm>
-          <a:prstGeom prst="rect">
-            <a:avLst/>
-          </a:prstGeom>
-          <a:noFill/>
-          <a:ln>
-            <a:noFill/>
-          </a:ln>
-          <a:effectLst/>
-          <a:extLst>
-            <a:ext uri="{909E8E84-426E-40DD-AFC4-6F175D3DCCD1}">
-              <a14:hiddenFill xmlns:a14="http://schemas.microsoft.com/office/drawing/2010/main">
-                <a:solidFill>
-                  <a:schemeClr val="accent1"/>
-                </a:solidFill>
-              </a14:hiddenFill>
-            </a:ext>
-            <a:ext uri="{91240B29-F687-4F45-9708-019B960494DF}">
-              <a14:hiddenLine xmlns:a14="http://schemas.microsoft.com/office/drawing/2010/main" w="9525">
-                <a:solidFill>
-                  <a:schemeClr val="tx1"/>
-                </a:solidFill>
-                <a:miter lim="800000"/>
-                <a:headEnd/>
-                <a:tailEnd/>
-              </a14:hiddenLine>
-            </a:ext>
-            <a:ext uri="{AF507438-7753-43E0-B8FC-AC1667EBCBE1}">
-              <a14:hiddenEffects xmlns:a14="http://schemas.microsoft.com/office/drawing/2010/main">
-                <a:effectLst>
-                  <a:outerShdw dist="35921" dir="2700000" algn="ctr" rotWithShape="0">
-                    <a:schemeClr val="bg2"/>
-                  </a:outerShdw>
-                </a:effectLst>
-              </a14:hiddenEffects>
-            </a:ext>
-          </a:extLst>
-        </p:spPr>
+        <p:spPr/>
         <p:txBody>
-          <a:bodyPr vert="horz" wrap="none" lIns="0" tIns="0" rIns="0" bIns="0" numCol="1" anchor="ctr" anchorCtr="0" compatLnSpc="1">
-            <a:prstTxWarp prst="textNoShape">
-              <a:avLst/>
-            </a:prstTxWarp>
-            <a:spAutoFit/>
-          </a:bodyPr>
+          <a:bodyPr/>
           <a:lstStyle/>
           <a:p>
-            <a:pPr marL="0" marR="0" lvl="0" indent="0" algn="l" defTabSz="914400" rtl="0" eaLnBrk="0" fontAlgn="base" latinLnBrk="0" hangingPunct="0">
-              <a:lnSpc>
-                <a:spcPct val="100000"/>
-              </a:lnSpc>
-              <a:spcBef>
-                <a:spcPct val="0"/>
-              </a:spcBef>
-              <a:spcAft>
-                <a:spcPct val="0"/>
-              </a:spcAft>
-              <a:buClrTx/>
-              <a:buSzTx/>
-              <a:buFontTx/>
-              <a:buNone/>
-              <a:tabLst/>
-            </a:pPr>
-            <a:r>
-              <a:rPr lang="ru-RU" altLang="en-US" sz="2800" dirty="0">
-                <a:latin typeface="source-code-pro"/>
-              </a:rPr>
-              <a:t>Корневой узел внутри </a:t>
-            </a:r>
-            <a:r>
-              <a:rPr lang="en-US" altLang="en-US" sz="2800" dirty="0">
-                <a:latin typeface="source-code-pro"/>
-              </a:rPr>
-              <a:t>HTML:</a:t>
-            </a:r>
-            <a:br>
-              <a:rPr lang="en-US" altLang="en-US" sz="2800" dirty="0">
-                <a:solidFill>
-                  <a:srgbClr val="88C6BE"/>
-                </a:solidFill>
-                <a:latin typeface="source-code-pro"/>
-              </a:rPr>
-            </a:br>
-            <a:r>
-              <a:rPr kumimoji="0" lang="en-US" altLang="en-US" sz="2800" b="0" i="0" u="none" strike="noStrike" cap="none" normalizeH="0" baseline="0" dirty="0">
-                <a:ln>
-                  <a:noFill/>
-                </a:ln>
-                <a:solidFill>
-                  <a:srgbClr val="88C6BE"/>
-                </a:solidFill>
-                <a:effectLst/>
-                <a:latin typeface="source-code-pro"/>
-              </a:rPr>
-              <a:t>&lt;</a:t>
-            </a:r>
-            <a:r>
-              <a:rPr kumimoji="0" lang="en-US" altLang="en-US" sz="2800" b="0" i="0" u="none" strike="noStrike" cap="none" normalizeH="0" baseline="0" dirty="0">
-                <a:ln>
-                  <a:noFill/>
-                </a:ln>
-                <a:solidFill>
-                  <a:srgbClr val="FC929E"/>
-                </a:solidFill>
-                <a:effectLst/>
-                <a:latin typeface="source-code-pro"/>
-              </a:rPr>
-              <a:t>div </a:t>
-            </a:r>
-            <a:r>
-              <a:rPr kumimoji="0" lang="en-US" altLang="en-US" sz="2800" b="0" i="0" u="none" strike="noStrike" cap="none" normalizeH="0" baseline="0" dirty="0">
-                <a:ln>
-                  <a:noFill/>
-                </a:ln>
-                <a:solidFill>
-                  <a:srgbClr val="C5A5C5"/>
-                </a:solidFill>
-                <a:effectLst/>
-                <a:latin typeface="source-code-pro"/>
-              </a:rPr>
-              <a:t>id</a:t>
-            </a:r>
-            <a:r>
-              <a:rPr kumimoji="0" lang="en-US" altLang="en-US" sz="2800" b="0" i="0" u="none" strike="noStrike" cap="none" normalizeH="0" baseline="0" dirty="0">
-                <a:ln>
-                  <a:noFill/>
-                </a:ln>
-                <a:solidFill>
-                  <a:srgbClr val="88C6BE"/>
-                </a:solidFill>
-                <a:effectLst/>
-                <a:latin typeface="source-code-pro"/>
-              </a:rPr>
-              <a:t>="</a:t>
-            </a:r>
-            <a:r>
-              <a:rPr kumimoji="0" lang="en-US" altLang="en-US" sz="2800" b="0" i="0" u="none" strike="noStrike" cap="none" normalizeH="0" baseline="0" dirty="0">
-                <a:ln>
-                  <a:noFill/>
-                </a:ln>
-                <a:solidFill>
-                  <a:srgbClr val="8DC891"/>
-                </a:solidFill>
-                <a:effectLst/>
-                <a:latin typeface="source-code-pro"/>
-              </a:rPr>
-              <a:t>root</a:t>
-            </a:r>
-            <a:r>
-              <a:rPr kumimoji="0" lang="en-US" altLang="en-US" sz="2800" b="0" i="0" u="none" strike="noStrike" cap="none" normalizeH="0" baseline="0" dirty="0">
-                <a:ln>
-                  <a:noFill/>
-                </a:ln>
-                <a:solidFill>
-                  <a:srgbClr val="88C6BE"/>
-                </a:solidFill>
-                <a:effectLst/>
-                <a:latin typeface="source-code-pro"/>
-              </a:rPr>
-              <a:t>"&gt;&lt;/</a:t>
-            </a:r>
-            <a:r>
-              <a:rPr kumimoji="0" lang="en-US" altLang="en-US" sz="2800" b="0" i="0" u="none" strike="noStrike" cap="none" normalizeH="0" baseline="0" dirty="0">
-                <a:ln>
-                  <a:noFill/>
-                </a:ln>
-                <a:solidFill>
-                  <a:srgbClr val="FC929E"/>
-                </a:solidFill>
-                <a:effectLst/>
-                <a:latin typeface="source-code-pro"/>
-              </a:rPr>
-              <a:t>div</a:t>
-            </a:r>
-            <a:r>
-              <a:rPr kumimoji="0" lang="en-US" altLang="en-US" sz="2800" b="0" i="0" u="none" strike="noStrike" cap="none" normalizeH="0" baseline="0" dirty="0">
-                <a:ln>
-                  <a:noFill/>
-                </a:ln>
-                <a:solidFill>
-                  <a:srgbClr val="88C6BE"/>
-                </a:solidFill>
-                <a:effectLst/>
-                <a:latin typeface="source-code-pro"/>
-              </a:rPr>
-              <a:t>&gt;</a:t>
-            </a:r>
-            <a:r>
-              <a:rPr kumimoji="0" lang="en-US" altLang="en-US" sz="2800" b="0" i="0" u="none" strike="noStrike" cap="none" normalizeH="0" baseline="0" dirty="0">
-                <a:ln>
-                  <a:noFill/>
-                </a:ln>
-                <a:solidFill>
-                  <a:schemeClr val="tx1"/>
-                </a:solidFill>
-                <a:effectLst/>
-              </a:rPr>
-              <a:t> </a:t>
-            </a:r>
-            <a:endParaRPr kumimoji="0" lang="en-US" altLang="en-US" sz="2800" b="0" i="0" u="none" strike="noStrike" cap="none" normalizeH="0" baseline="0" dirty="0">
-              <a:ln>
-                <a:noFill/>
-              </a:ln>
-              <a:solidFill>
-                <a:schemeClr val="tx1"/>
-              </a:solidFill>
-              <a:effectLst/>
-              <a:latin typeface="Arial" panose="020B0604020202020204" pitchFamily="34" charset="0"/>
-            </a:endParaRPr>
+            <a:r>
+              <a:rPr lang="en-US" dirty="0"/>
+              <a:t>REACT.JS </a:t>
+            </a:r>
+            <a:r>
+              <a:rPr lang="ru-RU" dirty="0"/>
+              <a:t>ИЛИ  ТУДА И ОБРАТНО</a:t>
+            </a:r>
+            <a:endParaRPr lang="en-US" dirty="0"/>
           </a:p>
         </p:txBody>
       </p:sp>
       <p:sp>
         <p:nvSpPr>
-          <p:cNvPr id="5" name="Rectangle 2">
+          <p:cNvPr id="3" name="Subtitle 2">
             <a:extLst>
               <a:ext uri="{FF2B5EF4-FFF2-40B4-BE49-F238E27FC236}">
-                <a16:creationId xmlns:a16="http://schemas.microsoft.com/office/drawing/2014/main" id="{F9CA7B00-7B8C-46BA-9B1F-061D83742CAF}"/>
+                <a16:creationId xmlns:a16="http://schemas.microsoft.com/office/drawing/2014/main" id="{8F3E3941-AF07-4671-9548-06284EB42179}"/>
               </a:ext>
             </a:extLst>
           </p:cNvPr>
           <p:cNvSpPr>
-            <a:spLocks noGrp="1" noChangeArrowheads="1"/>
+            <a:spLocks noGrp="1"/>
           </p:cNvSpPr>
           <p:nvPr>
-            <p:ph idx="1"/>
+            <p:ph type="subTitle" idx="1"/>
           </p:nvPr>
         </p:nvSpPr>
-        <p:spPr bwMode="auto">
-          <a:xfrm>
-            <a:off x="838200" y="3631963"/>
-            <a:ext cx="7972054" cy="738664"/>
-          </a:xfrm>
-          <a:prstGeom prst="rect">
-            <a:avLst/>
-          </a:prstGeom>
-          <a:noFill/>
-          <a:ln>
-            <a:noFill/>
-          </a:ln>
-          <a:effectLst/>
-          <a:extLst>
-            <a:ext uri="{909E8E84-426E-40DD-AFC4-6F175D3DCCD1}">
-              <a14:hiddenFill xmlns:a14="http://schemas.microsoft.com/office/drawing/2010/main">
-                <a:solidFill>
-                  <a:schemeClr val="accent1"/>
-                </a:solidFill>
-              </a14:hiddenFill>
-            </a:ext>
-            <a:ext uri="{91240B29-F687-4F45-9708-019B960494DF}">
-              <a14:hiddenLine xmlns:a14="http://schemas.microsoft.com/office/drawing/2010/main" w="9525">
-                <a:solidFill>
-                  <a:schemeClr val="tx1"/>
-                </a:solidFill>
-                <a:miter lim="800000"/>
-                <a:headEnd/>
-                <a:tailEnd/>
-              </a14:hiddenLine>
-            </a:ext>
-            <a:ext uri="{AF507438-7753-43E0-B8FC-AC1667EBCBE1}">
-              <a14:hiddenEffects xmlns:a14="http://schemas.microsoft.com/office/drawing/2010/main">
-                <a:effectLst>
-                  <a:outerShdw dist="35921" dir="2700000" algn="ctr" rotWithShape="0">
-                    <a:schemeClr val="bg2"/>
-                  </a:outerShdw>
-                </a:effectLst>
-              </a14:hiddenEffects>
-            </a:ext>
-          </a:extLst>
-        </p:spPr>
+        <p:spPr/>
         <p:txBody>
-          <a:bodyPr vert="horz" wrap="none" lIns="0" tIns="0" rIns="0" bIns="0" numCol="1" anchor="ctr" anchorCtr="0" compatLnSpc="1">
-            <a:prstTxWarp prst="textNoShape">
-              <a:avLst/>
-            </a:prstTxWarp>
-            <a:spAutoFit/>
-          </a:bodyPr>
+          <a:bodyPr/>
           <a:lstStyle/>
           <a:p>
-            <a:pPr marL="0" marR="0" lvl="0" indent="0" algn="l" defTabSz="914400" rtl="0" eaLnBrk="0" fontAlgn="base" latinLnBrk="0" hangingPunct="0">
-              <a:lnSpc>
-                <a:spcPct val="100000"/>
-              </a:lnSpc>
-              <a:spcBef>
-                <a:spcPct val="0"/>
-              </a:spcBef>
-              <a:spcAft>
-                <a:spcPct val="0"/>
-              </a:spcAft>
-              <a:buClrTx/>
-              <a:buSzTx/>
-              <a:buFontTx/>
-              <a:buNone/>
-              <a:tabLst/>
-            </a:pPr>
-            <a:r>
-              <a:rPr kumimoji="0" lang="en-US" altLang="en-US" sz="2400" b="0" i="0" u="none" strike="noStrike" cap="none" normalizeH="0" baseline="0" dirty="0">
-                <a:ln>
-                  <a:noFill/>
-                </a:ln>
-                <a:solidFill>
-                  <a:srgbClr val="C5A5C5"/>
-                </a:solidFill>
-                <a:effectLst/>
-                <a:latin typeface="source-code-pro"/>
-              </a:rPr>
-              <a:t>const</a:t>
-            </a:r>
-            <a:r>
-              <a:rPr kumimoji="0" lang="en-US" altLang="en-US" sz="2400" b="0" i="0" u="none" strike="noStrike" cap="none" normalizeH="0" baseline="0" dirty="0">
-                <a:ln>
-                  <a:noFill/>
-                </a:ln>
-                <a:solidFill>
-                  <a:srgbClr val="FFFFFF"/>
-                </a:solidFill>
-                <a:effectLst/>
-                <a:latin typeface="source-code-pro"/>
-              </a:rPr>
-              <a:t> </a:t>
-            </a:r>
-            <a:r>
-              <a:rPr kumimoji="0" lang="en-US" altLang="en-US" sz="2400" b="0" i="0" u="none" strike="noStrike" cap="none" normalizeH="0" baseline="0" dirty="0">
-                <a:ln>
-                  <a:noFill/>
-                </a:ln>
-                <a:effectLst/>
-                <a:latin typeface="source-code-pro"/>
-              </a:rPr>
-              <a:t>element </a:t>
-            </a:r>
-            <a:r>
-              <a:rPr kumimoji="0" lang="en-US" altLang="en-US" sz="2400" b="0" i="0" u="none" strike="noStrike" cap="none" normalizeH="0" baseline="0" dirty="0">
-                <a:ln>
-                  <a:noFill/>
-                </a:ln>
-                <a:solidFill>
-                  <a:srgbClr val="D7DEEA"/>
-                </a:solidFill>
-                <a:effectLst/>
-                <a:latin typeface="source-code-pro"/>
-              </a:rPr>
-              <a:t>=</a:t>
-            </a:r>
-            <a:r>
-              <a:rPr kumimoji="0" lang="en-US" altLang="en-US" sz="2400" b="0" i="0" u="none" strike="noStrike" cap="none" normalizeH="0" baseline="0" dirty="0">
-                <a:ln>
-                  <a:noFill/>
-                </a:ln>
-                <a:solidFill>
-                  <a:srgbClr val="FFFFFF"/>
-                </a:solidFill>
-                <a:effectLst/>
-                <a:latin typeface="source-code-pro"/>
-              </a:rPr>
-              <a:t> </a:t>
-            </a:r>
-            <a:r>
-              <a:rPr kumimoji="0" lang="en-US" altLang="en-US" sz="2400" b="0" i="0" u="none" strike="noStrike" cap="none" normalizeH="0" baseline="0" dirty="0">
-                <a:ln>
-                  <a:noFill/>
-                </a:ln>
-                <a:solidFill>
-                  <a:srgbClr val="88C6BE"/>
-                </a:solidFill>
-                <a:effectLst/>
-                <a:latin typeface="source-code-pro"/>
-              </a:rPr>
-              <a:t>&lt;</a:t>
-            </a:r>
-            <a:r>
-              <a:rPr kumimoji="0" lang="en-US" altLang="en-US" sz="2400" b="0" i="0" u="none" strike="noStrike" cap="none" normalizeH="0" baseline="0" dirty="0">
-                <a:ln>
-                  <a:noFill/>
-                </a:ln>
-                <a:solidFill>
-                  <a:srgbClr val="FC929E"/>
-                </a:solidFill>
-                <a:effectLst/>
-                <a:latin typeface="source-code-pro"/>
-              </a:rPr>
-              <a:t>h1</a:t>
-            </a:r>
-            <a:r>
-              <a:rPr kumimoji="0" lang="en-US" altLang="en-US" sz="2400" b="0" i="0" u="none" strike="noStrike" cap="none" normalizeH="0" baseline="0" dirty="0">
-                <a:ln>
-                  <a:noFill/>
-                </a:ln>
-                <a:solidFill>
-                  <a:srgbClr val="88C6BE"/>
-                </a:solidFill>
-                <a:effectLst/>
-                <a:latin typeface="source-code-pro"/>
-              </a:rPr>
-              <a:t>&gt;</a:t>
-            </a:r>
-            <a:r>
-              <a:rPr kumimoji="0" lang="en-US" altLang="en-US" sz="2400" b="0" i="0" u="none" strike="noStrike" cap="none" normalizeH="0" baseline="0" dirty="0">
-                <a:ln>
-                  <a:noFill/>
-                </a:ln>
-                <a:effectLst/>
-                <a:latin typeface="source-code-pro"/>
-              </a:rPr>
-              <a:t>Hello, world</a:t>
-            </a:r>
-            <a:r>
-              <a:rPr kumimoji="0" lang="en-US" altLang="en-US" sz="2400" b="0" i="0" u="none" strike="noStrike" cap="none" normalizeH="0" baseline="0" dirty="0">
-                <a:ln>
-                  <a:noFill/>
-                </a:ln>
-                <a:solidFill>
-                  <a:srgbClr val="88C6BE"/>
-                </a:solidFill>
-                <a:effectLst/>
-                <a:latin typeface="source-code-pro"/>
-              </a:rPr>
-              <a:t>&lt;/</a:t>
-            </a:r>
-            <a:r>
-              <a:rPr kumimoji="0" lang="en-US" altLang="en-US" sz="2400" b="0" i="0" u="none" strike="noStrike" cap="none" normalizeH="0" baseline="0" dirty="0">
-                <a:ln>
-                  <a:noFill/>
-                </a:ln>
-                <a:solidFill>
-                  <a:srgbClr val="FC929E"/>
-                </a:solidFill>
-                <a:effectLst/>
-                <a:latin typeface="source-code-pro"/>
-              </a:rPr>
-              <a:t>h1</a:t>
-            </a:r>
-            <a:r>
-              <a:rPr kumimoji="0" lang="en-US" altLang="en-US" sz="2400" b="0" i="0" u="none" strike="noStrike" cap="none" normalizeH="0" baseline="0" dirty="0">
-                <a:ln>
-                  <a:noFill/>
-                </a:ln>
-                <a:solidFill>
-                  <a:srgbClr val="88C6BE"/>
-                </a:solidFill>
-                <a:effectLst/>
-                <a:latin typeface="source-code-pro"/>
-              </a:rPr>
-              <a:t>&gt;;</a:t>
-            </a:r>
-            <a:r>
-              <a:rPr kumimoji="0" lang="en-US" altLang="en-US" sz="2400" b="0" i="0" u="none" strike="noStrike" cap="none" normalizeH="0" baseline="0" dirty="0">
-                <a:ln>
-                  <a:noFill/>
-                </a:ln>
-                <a:solidFill>
-                  <a:schemeClr val="accent1"/>
-                </a:solidFill>
-                <a:effectLst/>
-                <a:latin typeface="source-code-pro"/>
-              </a:rPr>
-              <a:t> </a:t>
-            </a:r>
-            <a:endParaRPr kumimoji="0" lang="ru-RU" altLang="en-US" sz="2400" b="0" i="0" u="none" strike="noStrike" cap="none" normalizeH="0" baseline="0" dirty="0">
-              <a:ln>
-                <a:noFill/>
-              </a:ln>
-              <a:solidFill>
-                <a:schemeClr val="accent1"/>
-              </a:solidFill>
-              <a:effectLst/>
-              <a:latin typeface="source-code-pro"/>
-            </a:endParaRPr>
-          </a:p>
-          <a:p>
-            <a:pPr marL="0" marR="0" lvl="0" indent="0" algn="l" defTabSz="914400" rtl="0" eaLnBrk="0" fontAlgn="base" latinLnBrk="0" hangingPunct="0">
-              <a:lnSpc>
-                <a:spcPct val="100000"/>
-              </a:lnSpc>
-              <a:spcBef>
-                <a:spcPct val="0"/>
-              </a:spcBef>
-              <a:spcAft>
-                <a:spcPct val="0"/>
-              </a:spcAft>
-              <a:buClrTx/>
-              <a:buSzTx/>
-              <a:buFontTx/>
-              <a:buNone/>
-              <a:tabLst/>
-            </a:pPr>
-            <a:r>
-              <a:rPr kumimoji="0" lang="en-US" altLang="en-US" sz="2400" b="0" i="0" u="none" strike="noStrike" cap="none" normalizeH="0" baseline="0" dirty="0" err="1">
-                <a:ln>
-                  <a:noFill/>
-                </a:ln>
-                <a:solidFill>
-                  <a:schemeClr val="accent1"/>
-                </a:solidFill>
-                <a:effectLst/>
-                <a:latin typeface="source-code-pro"/>
-              </a:rPr>
-              <a:t>ReactDOM</a:t>
-            </a:r>
-            <a:r>
-              <a:rPr kumimoji="0" lang="en-US" altLang="en-US" sz="2400" b="0" i="0" u="none" strike="noStrike" cap="none" normalizeH="0" baseline="0" dirty="0" err="1">
-                <a:ln>
-                  <a:noFill/>
-                </a:ln>
-                <a:solidFill>
-                  <a:srgbClr val="88C6BE"/>
-                </a:solidFill>
-                <a:effectLst/>
-                <a:latin typeface="source-code-pro"/>
-              </a:rPr>
-              <a:t>.</a:t>
-            </a:r>
-            <a:r>
-              <a:rPr kumimoji="0" lang="en-US" altLang="en-US" sz="2400" b="0" i="0" u="none" strike="noStrike" cap="none" normalizeH="0" baseline="0" dirty="0" err="1">
-                <a:ln>
-                  <a:noFill/>
-                </a:ln>
-                <a:solidFill>
-                  <a:srgbClr val="79B6F2"/>
-                </a:solidFill>
-                <a:effectLst/>
-                <a:latin typeface="source-code-pro"/>
-              </a:rPr>
-              <a:t>render</a:t>
-            </a:r>
-            <a:r>
-              <a:rPr kumimoji="0" lang="en-US" altLang="en-US" sz="2400" b="0" i="0" u="none" strike="noStrike" cap="none" normalizeH="0" baseline="0" dirty="0">
-                <a:ln>
-                  <a:noFill/>
-                </a:ln>
-                <a:solidFill>
-                  <a:srgbClr val="88C6BE"/>
-                </a:solidFill>
-                <a:effectLst/>
-                <a:latin typeface="source-code-pro"/>
-              </a:rPr>
-              <a:t>(</a:t>
-            </a:r>
-            <a:r>
-              <a:rPr kumimoji="0" lang="en-US" altLang="en-US" sz="2400" b="0" i="0" u="none" strike="noStrike" cap="none" normalizeH="0" baseline="0" dirty="0">
-                <a:ln>
-                  <a:noFill/>
-                </a:ln>
-                <a:effectLst/>
-                <a:latin typeface="source-code-pro"/>
-              </a:rPr>
-              <a:t>element, </a:t>
-            </a:r>
-            <a:r>
-              <a:rPr kumimoji="0" lang="en-US" altLang="en-US" sz="2400" b="0" i="0" u="none" strike="noStrike" cap="none" normalizeH="0" baseline="0" dirty="0" err="1">
-                <a:ln>
-                  <a:noFill/>
-                </a:ln>
-                <a:effectLst/>
-                <a:latin typeface="source-code-pro"/>
-              </a:rPr>
-              <a:t>document.getElementById</a:t>
-            </a:r>
-            <a:r>
-              <a:rPr kumimoji="0" lang="en-US" altLang="en-US" sz="2400" b="0" i="0" u="none" strike="noStrike" cap="none" normalizeH="0" baseline="0" dirty="0">
-                <a:ln>
-                  <a:noFill/>
-                </a:ln>
-                <a:solidFill>
-                  <a:srgbClr val="88C6BE"/>
-                </a:solidFill>
-                <a:effectLst/>
-                <a:latin typeface="source-code-pro"/>
-              </a:rPr>
-              <a:t>(</a:t>
-            </a:r>
-            <a:r>
-              <a:rPr kumimoji="0" lang="en-US" altLang="en-US" sz="2400" b="0" i="0" u="none" strike="noStrike" cap="none" normalizeH="0" baseline="0" dirty="0">
-                <a:ln>
-                  <a:noFill/>
-                </a:ln>
-                <a:solidFill>
-                  <a:srgbClr val="8DC891"/>
-                </a:solidFill>
-                <a:effectLst/>
-                <a:latin typeface="source-code-pro"/>
-              </a:rPr>
-              <a:t>'root'</a:t>
-            </a:r>
-            <a:r>
-              <a:rPr kumimoji="0" lang="en-US" altLang="en-US" sz="2400" b="0" i="0" u="none" strike="noStrike" cap="none" normalizeH="0" baseline="0" dirty="0">
-                <a:ln>
-                  <a:noFill/>
-                </a:ln>
-                <a:solidFill>
-                  <a:srgbClr val="88C6BE"/>
-                </a:solidFill>
-                <a:effectLst/>
-                <a:latin typeface="source-code-pro"/>
-              </a:rPr>
-              <a:t>));</a:t>
-            </a:r>
-            <a:r>
-              <a:rPr kumimoji="0" lang="en-US" altLang="en-US" sz="2400" b="0" i="0" u="none" strike="noStrike" cap="none" normalizeH="0" baseline="0" dirty="0">
-                <a:ln>
-                  <a:noFill/>
-                </a:ln>
-                <a:solidFill>
-                  <a:schemeClr val="tx1"/>
-                </a:solidFill>
-                <a:effectLst/>
-              </a:rPr>
-              <a:t> </a:t>
-            </a:r>
-            <a:endParaRPr kumimoji="0" lang="en-US" altLang="en-US" sz="2400" b="0" i="0" u="none" strike="noStrike" cap="none" normalizeH="0" baseline="0" dirty="0">
-              <a:ln>
-                <a:noFill/>
-              </a:ln>
-              <a:solidFill>
-                <a:schemeClr val="tx1"/>
-              </a:solidFill>
-              <a:effectLst/>
-              <a:latin typeface="Arial" panose="020B0604020202020204" pitchFamily="34" charset="0"/>
-            </a:endParaRPr>
-          </a:p>
-        </p:txBody>
-      </p:sp>
-      <p:sp>
-        <p:nvSpPr>
-          <p:cNvPr id="8" name="Rectangle 7">
-            <a:extLst>
-              <a:ext uri="{FF2B5EF4-FFF2-40B4-BE49-F238E27FC236}">
-                <a16:creationId xmlns:a16="http://schemas.microsoft.com/office/drawing/2014/main" id="{7FFAD3BA-CBBC-4FC0-890C-AAF1578F1669}"/>
-              </a:ext>
-            </a:extLst>
-          </p:cNvPr>
-          <p:cNvSpPr/>
-          <p:nvPr/>
-        </p:nvSpPr>
-        <p:spPr>
-          <a:xfrm>
-            <a:off x="649408" y="1656377"/>
-            <a:ext cx="10893183" cy="1569660"/>
-          </a:xfrm>
-          <a:prstGeom prst="rect">
-            <a:avLst/>
-          </a:prstGeom>
-        </p:spPr>
-        <p:txBody>
-          <a:bodyPr wrap="square">
-            <a:spAutoFit/>
-          </a:bodyPr>
-          <a:lstStyle/>
-          <a:p>
-            <a:pPr lvl="0" eaLnBrk="0" fontAlgn="base" hangingPunct="0">
-              <a:spcBef>
-                <a:spcPct val="0"/>
-              </a:spcBef>
-              <a:spcAft>
-                <a:spcPct val="0"/>
-              </a:spcAft>
-            </a:pPr>
-            <a:r>
-              <a:rPr lang="en-US" altLang="en-US" sz="3200" dirty="0" err="1">
-                <a:solidFill>
-                  <a:srgbClr val="000000"/>
-                </a:solidFill>
-                <a:latin typeface="-apple-system"/>
-              </a:rPr>
-              <a:t>Для</a:t>
-            </a:r>
-            <a:r>
-              <a:rPr lang="en-US" altLang="en-US" sz="3200" dirty="0">
-                <a:solidFill>
-                  <a:srgbClr val="000000"/>
-                </a:solidFill>
-                <a:latin typeface="-apple-system"/>
-              </a:rPr>
-              <a:t> </a:t>
-            </a:r>
-            <a:r>
-              <a:rPr lang="en-US" altLang="en-US" sz="3200" dirty="0" err="1">
-                <a:solidFill>
-                  <a:srgbClr val="000000"/>
-                </a:solidFill>
-                <a:latin typeface="-apple-system"/>
-              </a:rPr>
-              <a:t>рендеринга</a:t>
-            </a:r>
-            <a:r>
-              <a:rPr lang="en-US" altLang="en-US" sz="3200" dirty="0">
-                <a:solidFill>
-                  <a:srgbClr val="000000"/>
-                </a:solidFill>
-                <a:latin typeface="-apple-system"/>
-              </a:rPr>
-              <a:t> React-</a:t>
-            </a:r>
-            <a:r>
-              <a:rPr lang="en-US" altLang="en-US" sz="3200" dirty="0" err="1">
-                <a:solidFill>
-                  <a:srgbClr val="000000"/>
-                </a:solidFill>
-                <a:latin typeface="-apple-system"/>
-              </a:rPr>
-              <a:t>элемента</a:t>
-            </a:r>
-            <a:r>
-              <a:rPr lang="en-US" altLang="en-US" sz="3200" dirty="0">
-                <a:solidFill>
-                  <a:srgbClr val="000000"/>
-                </a:solidFill>
-                <a:latin typeface="-apple-system"/>
-              </a:rPr>
-              <a:t> в </a:t>
-            </a:r>
-            <a:r>
-              <a:rPr lang="en-US" altLang="en-US" sz="3200" dirty="0" err="1">
-                <a:solidFill>
-                  <a:srgbClr val="000000"/>
-                </a:solidFill>
-                <a:latin typeface="-apple-system"/>
-              </a:rPr>
-              <a:t>корневой</a:t>
-            </a:r>
-            <a:r>
-              <a:rPr lang="en-US" altLang="en-US" sz="3200" dirty="0">
-                <a:solidFill>
-                  <a:srgbClr val="000000"/>
-                </a:solidFill>
-                <a:latin typeface="-apple-system"/>
-              </a:rPr>
-              <a:t> </a:t>
-            </a:r>
-            <a:r>
-              <a:rPr lang="en-US" altLang="en-US" sz="3200" dirty="0" err="1">
-                <a:solidFill>
-                  <a:srgbClr val="000000"/>
-                </a:solidFill>
-                <a:latin typeface="-apple-system"/>
-              </a:rPr>
-              <a:t>узел</a:t>
-            </a:r>
-            <a:r>
-              <a:rPr lang="en-US" altLang="en-US" sz="3200" dirty="0">
-                <a:solidFill>
-                  <a:srgbClr val="000000"/>
-                </a:solidFill>
-                <a:latin typeface="-apple-system"/>
-              </a:rPr>
-              <a:t> DOM, </a:t>
-            </a:r>
-            <a:r>
-              <a:rPr lang="en-US" altLang="en-US" sz="3200" dirty="0" err="1">
-                <a:solidFill>
-                  <a:srgbClr val="000000"/>
-                </a:solidFill>
-                <a:latin typeface="-apple-system"/>
-              </a:rPr>
-              <a:t>вызовите</a:t>
-            </a:r>
-            <a:r>
-              <a:rPr lang="en-US" altLang="en-US" sz="3200" dirty="0">
-                <a:solidFill>
-                  <a:srgbClr val="000000"/>
-                </a:solidFill>
-                <a:latin typeface="-apple-system"/>
-              </a:rPr>
-              <a:t> </a:t>
-            </a:r>
-            <a:r>
-              <a:rPr lang="en-US" altLang="en-US" sz="3200" dirty="0" err="1">
-                <a:solidFill>
-                  <a:srgbClr val="1A1A1A"/>
-                </a:solidFill>
-                <a:latin typeface="source-code-pro"/>
-              </a:rPr>
-              <a:t>ReactDOM.render</a:t>
-            </a:r>
-            <a:r>
-              <a:rPr lang="en-US" altLang="en-US" sz="3200" dirty="0">
-                <a:solidFill>
-                  <a:srgbClr val="1A1A1A"/>
-                </a:solidFill>
-                <a:latin typeface="source-code-pro"/>
-              </a:rPr>
-              <a:t>()</a:t>
-            </a:r>
-            <a:r>
-              <a:rPr lang="en-US" altLang="en-US" sz="3200" dirty="0">
-                <a:solidFill>
-                  <a:srgbClr val="000000"/>
-                </a:solidFill>
-                <a:latin typeface="-apple-system"/>
-              </a:rPr>
-              <a:t> с React-</a:t>
-            </a:r>
-            <a:r>
-              <a:rPr lang="en-US" altLang="en-US" sz="3200" dirty="0" err="1">
-                <a:solidFill>
-                  <a:srgbClr val="000000"/>
-                </a:solidFill>
-                <a:latin typeface="-apple-system"/>
-              </a:rPr>
-              <a:t>элементом</a:t>
-            </a:r>
-            <a:r>
-              <a:rPr lang="en-US" altLang="en-US" sz="3200" dirty="0">
-                <a:solidFill>
-                  <a:srgbClr val="000000"/>
-                </a:solidFill>
-                <a:latin typeface="-apple-system"/>
-              </a:rPr>
-              <a:t> и </a:t>
-            </a:r>
-            <a:r>
-              <a:rPr lang="en-US" altLang="en-US" sz="3200" dirty="0" err="1">
-                <a:solidFill>
-                  <a:srgbClr val="000000"/>
-                </a:solidFill>
-                <a:latin typeface="-apple-system"/>
-              </a:rPr>
-              <a:t>корневым</a:t>
-            </a:r>
-            <a:r>
-              <a:rPr lang="en-US" altLang="en-US" sz="3200" dirty="0">
-                <a:solidFill>
-                  <a:srgbClr val="000000"/>
-                </a:solidFill>
-                <a:latin typeface="-apple-system"/>
-              </a:rPr>
-              <a:t> DOM </a:t>
-            </a:r>
-            <a:r>
-              <a:rPr lang="en-US" altLang="en-US" sz="3200" dirty="0" err="1">
-                <a:solidFill>
-                  <a:srgbClr val="000000"/>
-                </a:solidFill>
-                <a:latin typeface="-apple-system"/>
-              </a:rPr>
-              <a:t>узлом</a:t>
-            </a:r>
-            <a:r>
-              <a:rPr lang="en-US" altLang="en-US" sz="3200" dirty="0">
-                <a:solidFill>
-                  <a:srgbClr val="000000"/>
-                </a:solidFill>
-                <a:latin typeface="-apple-system"/>
-              </a:rPr>
-              <a:t> в </a:t>
-            </a:r>
-            <a:r>
-              <a:rPr lang="en-US" altLang="en-US" sz="3200" dirty="0" err="1">
-                <a:solidFill>
-                  <a:srgbClr val="000000"/>
-                </a:solidFill>
-                <a:latin typeface="-apple-system"/>
-              </a:rPr>
-              <a:t>качестве</a:t>
-            </a:r>
-            <a:r>
-              <a:rPr lang="en-US" altLang="en-US" sz="3200" dirty="0">
-                <a:solidFill>
-                  <a:srgbClr val="000000"/>
-                </a:solidFill>
-                <a:latin typeface="-apple-system"/>
-              </a:rPr>
-              <a:t> </a:t>
-            </a:r>
-            <a:r>
-              <a:rPr lang="en-US" altLang="en-US" sz="3200" dirty="0" err="1">
-                <a:solidFill>
-                  <a:srgbClr val="000000"/>
-                </a:solidFill>
-                <a:latin typeface="-apple-system"/>
-              </a:rPr>
-              <a:t>аргументов</a:t>
-            </a:r>
-            <a:r>
-              <a:rPr lang="en-US" altLang="en-US" sz="3200" dirty="0"/>
-              <a:t> </a:t>
-            </a:r>
+            <a:r>
+              <a:rPr lang="ru-RU" dirty="0"/>
+              <a:t>Повесть Марии Ворониной, разработчика из Рязани.</a:t>
+            </a:r>
+            <a:endParaRPr lang="en-US" dirty="0"/>
           </a:p>
         </p:txBody>
       </p:sp>
     </p:spTree>
     <p:extLst>
       <p:ext uri="{BB962C8B-B14F-4D97-AF65-F5344CB8AC3E}">
-        <p14:creationId xmlns:p14="http://schemas.microsoft.com/office/powerpoint/2010/main" val="3516962384"/>
+        <p14:creationId xmlns:p14="http://schemas.microsoft.com/office/powerpoint/2010/main" val="2014179902"/>
       </p:ext>
     </p:extLst>
   </p:cSld>
@@ -4244,6 +3416,292 @@
 </file>
 
 <file path=ppt/slides/slide10.xml><?xml version="1.0" encoding="utf-8"?>
+<p:sld xmlns:a="http://schemas.openxmlformats.org/drawingml/2006/main" xmlns:r="http://schemas.openxmlformats.org/officeDocument/2006/relationships" xmlns:p="http://schemas.openxmlformats.org/presentationml/2006/main">
+  <p:cSld>
+    <p:spTree>
+      <p:nvGrpSpPr>
+        <p:cNvPr id="1" name=""/>
+        <p:cNvGrpSpPr/>
+        <p:nvPr/>
+      </p:nvGrpSpPr>
+      <p:grpSpPr>
+        <a:xfrm>
+          <a:off x="0" y="0"/>
+          <a:ext cx="0" cy="0"/>
+          <a:chOff x="0" y="0"/>
+          <a:chExt cx="0" cy="0"/>
+        </a:xfrm>
+      </p:grpSpPr>
+      <p:sp>
+        <p:nvSpPr>
+          <p:cNvPr id="2" name="Title 1">
+            <a:extLst>
+              <a:ext uri="{FF2B5EF4-FFF2-40B4-BE49-F238E27FC236}">
+                <a16:creationId xmlns:a16="http://schemas.microsoft.com/office/drawing/2014/main" id="{C63A1C02-C59C-4517-AB59-BFD9646B176E}"/>
+              </a:ext>
+            </a:extLst>
+          </p:cNvPr>
+          <p:cNvSpPr>
+            <a:spLocks noGrp="1"/>
+          </p:cNvSpPr>
+          <p:nvPr>
+            <p:ph type="title"/>
+          </p:nvPr>
+        </p:nvSpPr>
+        <p:spPr/>
+        <p:txBody>
+          <a:bodyPr>
+            <a:normAutofit fontScale="90000"/>
+          </a:bodyPr>
+          <a:lstStyle/>
+          <a:p>
+            <a:r>
+              <a:rPr lang="ru-RU" sz="3600" dirty="0"/>
+              <a:t>Есть три варианта как передать обработчик событий, чтобы у нас был доступ к текущему элементу</a:t>
+            </a:r>
+            <a:br>
+              <a:rPr lang="en-US" dirty="0"/>
+            </a:br>
+            <a:endParaRPr lang="en-US" dirty="0"/>
+          </a:p>
+        </p:txBody>
+      </p:sp>
+      <p:sp>
+        <p:nvSpPr>
+          <p:cNvPr id="3" name="Content Placeholder 2">
+            <a:extLst>
+              <a:ext uri="{FF2B5EF4-FFF2-40B4-BE49-F238E27FC236}">
+                <a16:creationId xmlns:a16="http://schemas.microsoft.com/office/drawing/2014/main" id="{AF0FF26A-6D34-4E52-BDEE-7EFB882C493F}"/>
+              </a:ext>
+            </a:extLst>
+          </p:cNvPr>
+          <p:cNvSpPr>
+            <a:spLocks noGrp="1"/>
+          </p:cNvSpPr>
+          <p:nvPr>
+            <p:ph idx="1"/>
+          </p:nvPr>
+        </p:nvSpPr>
+        <p:spPr/>
+        <p:txBody>
+          <a:bodyPr>
+            <a:normAutofit/>
+          </a:bodyPr>
+          <a:lstStyle/>
+          <a:p>
+            <a:pPr marL="514350" indent="-514350">
+              <a:buAutoNum type="arabicPeriod"/>
+            </a:pPr>
+            <a:r>
+              <a:rPr lang="en-US" b="1" dirty="0"/>
+              <a:t>Bind </a:t>
+            </a:r>
+            <a:r>
+              <a:rPr lang="ru-RU" b="1" dirty="0"/>
+              <a:t>в конструкторе.</a:t>
+            </a:r>
+          </a:p>
+          <a:p>
+            <a:pPr marL="0" indent="0">
+              <a:buNone/>
+            </a:pPr>
+            <a:r>
+              <a:rPr lang="ru-RU" dirty="0"/>
+              <a:t> </a:t>
+            </a:r>
+            <a:r>
+              <a:rPr lang="en-US" dirty="0" err="1"/>
+              <a:t>this.addNew</a:t>
+            </a:r>
+            <a:r>
+              <a:rPr lang="en-US" dirty="0"/>
+              <a:t> = </a:t>
+            </a:r>
+            <a:r>
+              <a:rPr lang="en-US" dirty="0" err="1"/>
+              <a:t>this.addNew.bind</a:t>
+            </a:r>
+            <a:r>
+              <a:rPr lang="en-US" dirty="0"/>
+              <a:t>(this);</a:t>
+            </a:r>
+          </a:p>
+          <a:p>
+            <a:pPr marL="0" indent="0">
+              <a:buNone/>
+            </a:pPr>
+            <a:r>
+              <a:rPr lang="en-US" dirty="0" err="1"/>
+              <a:t>onClick</a:t>
+            </a:r>
+            <a:r>
+              <a:rPr lang="en-US" dirty="0"/>
+              <a:t>={</a:t>
+            </a:r>
+            <a:r>
+              <a:rPr lang="en-US" dirty="0" err="1"/>
+              <a:t>this.addNew</a:t>
+            </a:r>
+            <a:r>
+              <a:rPr lang="en-US" dirty="0"/>
+              <a:t>}</a:t>
+            </a:r>
+            <a:endParaRPr lang="ru-RU" dirty="0"/>
+          </a:p>
+          <a:p>
+            <a:pPr marL="0" indent="0">
+              <a:buNone/>
+            </a:pPr>
+            <a:r>
+              <a:rPr lang="ru-RU" b="1" dirty="0"/>
+              <a:t>2. Стрелочные функции</a:t>
+            </a:r>
+            <a:r>
+              <a:rPr lang="en-US" b="1" dirty="0"/>
+              <a:t> </a:t>
+            </a:r>
+            <a:r>
+              <a:rPr lang="ru-RU" b="1" dirty="0"/>
+              <a:t>в</a:t>
+            </a:r>
+            <a:r>
+              <a:rPr lang="en-US" b="1" dirty="0"/>
+              <a:t> </a:t>
+            </a:r>
+            <a:r>
+              <a:rPr lang="ru-RU" b="1" dirty="0" err="1"/>
+              <a:t>колбэке</a:t>
+            </a:r>
+            <a:r>
+              <a:rPr lang="ru-RU" b="1" dirty="0"/>
+              <a:t>.</a:t>
+            </a:r>
+          </a:p>
+          <a:p>
+            <a:pPr marL="0" indent="0">
+              <a:buNone/>
+            </a:pPr>
+            <a:r>
+              <a:rPr lang="en-US" dirty="0"/>
+              <a:t>&lt;li </a:t>
+            </a:r>
+            <a:r>
+              <a:rPr lang="en-US" dirty="0" err="1"/>
+              <a:t>onClick</a:t>
+            </a:r>
+            <a:r>
+              <a:rPr lang="en-US" dirty="0"/>
+              <a:t>={() =&gt; </a:t>
+            </a:r>
+            <a:r>
+              <a:rPr lang="en-US" dirty="0" err="1"/>
+              <a:t>this.addNew</a:t>
+            </a:r>
+            <a:r>
+              <a:rPr lang="en-US" dirty="0"/>
+              <a:t>()}&gt;</a:t>
+            </a:r>
+            <a:r>
+              <a:rPr lang="ru-RU" dirty="0"/>
+              <a:t>Добавить&lt;/</a:t>
+            </a:r>
+            <a:r>
+              <a:rPr lang="en-US" dirty="0"/>
+              <a:t>li&gt;</a:t>
+            </a:r>
+            <a:endParaRPr lang="ru-RU" dirty="0"/>
+          </a:p>
+          <a:p>
+            <a:pPr marL="0" indent="0">
+              <a:buNone/>
+            </a:pPr>
+            <a:r>
+              <a:rPr lang="ru-RU" dirty="0"/>
+              <a:t>3.</a:t>
+            </a:r>
+            <a:r>
+              <a:rPr lang="ru-RU" b="1" dirty="0"/>
+              <a:t>Синтаксисом общедоступных полей классов (эксперимент.)</a:t>
+            </a:r>
+          </a:p>
+          <a:p>
+            <a:pPr marL="0" indent="0">
+              <a:buNone/>
+            </a:pPr>
+            <a:r>
+              <a:rPr lang="en-US" dirty="0" err="1"/>
+              <a:t>addNew</a:t>
+            </a:r>
+            <a:r>
+              <a:rPr lang="en-US" dirty="0"/>
+              <a:t> = () =&gt; {   </a:t>
+            </a:r>
+            <a:r>
+              <a:rPr lang="ru-RU" dirty="0"/>
+              <a:t>…</a:t>
+            </a:r>
+            <a:r>
+              <a:rPr lang="en-US" dirty="0"/>
+              <a:t>  }</a:t>
+            </a:r>
+            <a:endParaRPr lang="ru-RU" dirty="0"/>
+          </a:p>
+          <a:p>
+            <a:pPr marL="0" indent="0">
+              <a:buNone/>
+            </a:pPr>
+            <a:r>
+              <a:rPr lang="en-US" dirty="0" err="1"/>
+              <a:t>onClick</a:t>
+            </a:r>
+            <a:r>
+              <a:rPr lang="en-US" dirty="0"/>
+              <a:t>={</a:t>
+            </a:r>
+            <a:r>
+              <a:rPr lang="en-US" dirty="0" err="1"/>
+              <a:t>this.addNew</a:t>
+            </a:r>
+            <a:r>
+              <a:rPr lang="en-US" dirty="0"/>
+              <a:t>}</a:t>
+            </a:r>
+            <a:endParaRPr lang="ru-RU" dirty="0"/>
+          </a:p>
+          <a:p>
+            <a:pPr marL="0" indent="0">
+              <a:buNone/>
+            </a:pPr>
+            <a:endParaRPr lang="en-US" dirty="0"/>
+          </a:p>
+          <a:p>
+            <a:pPr marL="0" indent="0">
+              <a:buNone/>
+            </a:pPr>
+            <a:endParaRPr lang="en-US" dirty="0"/>
+          </a:p>
+          <a:p>
+            <a:pPr marL="0" indent="0">
+              <a:buNone/>
+            </a:pPr>
+            <a:endParaRPr lang="en-US" dirty="0"/>
+          </a:p>
+        </p:txBody>
+      </p:sp>
+    </p:spTree>
+    <p:extLst>
+      <p:ext uri="{BB962C8B-B14F-4D97-AF65-F5344CB8AC3E}">
+        <p14:creationId xmlns:p14="http://schemas.microsoft.com/office/powerpoint/2010/main" val="3565448551"/>
+      </p:ext>
+    </p:extLst>
+  </p:cSld>
+  <p:clrMapOvr>
+    <a:masterClrMapping/>
+  </p:clrMapOvr>
+</p:sld>
+</file>
+
+<file path=ppt/slides/slide11.xml><?xml version="1.0" encoding="utf-8"?>
 <p:sld xmlns:a="http://schemas.openxmlformats.org/drawingml/2006/main" xmlns:r="http://schemas.openxmlformats.org/officeDocument/2006/relationships" xmlns:p="http://schemas.openxmlformats.org/presentationml/2006/main">
   <p:cSld>
     <p:spTree>
@@ -4402,7 +3860,2844 @@
 </p:sld>
 </file>
 
+<file path=ppt/slides/slide12.xml><?xml version="1.0" encoding="utf-8"?>
+<p:sld xmlns:a="http://schemas.openxmlformats.org/drawingml/2006/main" xmlns:r="http://schemas.openxmlformats.org/officeDocument/2006/relationships" xmlns:p="http://schemas.openxmlformats.org/presentationml/2006/main">
+  <p:cSld>
+    <p:spTree>
+      <p:nvGrpSpPr>
+        <p:cNvPr id="1" name=""/>
+        <p:cNvGrpSpPr/>
+        <p:nvPr/>
+      </p:nvGrpSpPr>
+      <p:grpSpPr>
+        <a:xfrm>
+          <a:off x="0" y="0"/>
+          <a:ext cx="0" cy="0"/>
+          <a:chOff x="0" y="0"/>
+          <a:chExt cx="0" cy="0"/>
+        </a:xfrm>
+      </p:grpSpPr>
+      <p:sp>
+        <p:nvSpPr>
+          <p:cNvPr id="2" name="Rectangle 1">
+            <a:extLst>
+              <a:ext uri="{FF2B5EF4-FFF2-40B4-BE49-F238E27FC236}">
+                <a16:creationId xmlns:a16="http://schemas.microsoft.com/office/drawing/2014/main" id="{849B6BF6-4E59-42A9-8D5E-B026D7528BD7}"/>
+              </a:ext>
+            </a:extLst>
+          </p:cNvPr>
+          <p:cNvSpPr/>
+          <p:nvPr/>
+        </p:nvSpPr>
+        <p:spPr>
+          <a:xfrm>
+            <a:off x="442848" y="451050"/>
+            <a:ext cx="8701152" cy="5078313"/>
+          </a:xfrm>
+          <a:prstGeom prst="rect">
+            <a:avLst/>
+          </a:prstGeom>
+        </p:spPr>
+        <p:txBody>
+          <a:bodyPr wrap="square">
+            <a:spAutoFit/>
+          </a:bodyPr>
+          <a:lstStyle/>
+          <a:p>
+            <a:r>
+              <a:rPr lang="ru-RU" sz="3600" b="1" dirty="0">
+                <a:solidFill>
+                  <a:srgbClr val="000000"/>
+                </a:solidFill>
+                <a:latin typeface="Segoe UI" panose="020B0502040204020203" pitchFamily="34" charset="0"/>
+                <a:ea typeface="Times New Roman" panose="02020603050405020304" pitchFamily="18" charset="0"/>
+              </a:rPr>
+              <a:t>Виртуальный </a:t>
+            </a:r>
+            <a:r>
+              <a:rPr lang="en-US" sz="3600" b="1" dirty="0">
+                <a:solidFill>
+                  <a:srgbClr val="000000"/>
+                </a:solidFill>
+                <a:latin typeface="Segoe UI" panose="020B0502040204020203" pitchFamily="34" charset="0"/>
+                <a:ea typeface="Times New Roman" panose="02020603050405020304" pitchFamily="18" charset="0"/>
+              </a:rPr>
+              <a:t>DOM</a:t>
+            </a:r>
+            <a:r>
+              <a:rPr lang="ru-RU" sz="3600" b="1" dirty="0">
+                <a:solidFill>
+                  <a:srgbClr val="000000"/>
+                </a:solidFill>
+                <a:latin typeface="Segoe UI" panose="020B0502040204020203" pitchFamily="34" charset="0"/>
+                <a:ea typeface="Times New Roman" panose="02020603050405020304" pitchFamily="18" charset="0"/>
+              </a:rPr>
+              <a:t> (</a:t>
+            </a:r>
+            <a:r>
+              <a:rPr lang="en-US" sz="3600" b="1" dirty="0">
+                <a:solidFill>
+                  <a:srgbClr val="000000"/>
+                </a:solidFill>
+                <a:latin typeface="Segoe UI" panose="020B0502040204020203" pitchFamily="34" charset="0"/>
+                <a:ea typeface="Times New Roman" panose="02020603050405020304" pitchFamily="18" charset="0"/>
+              </a:rPr>
+              <a:t>VDOM</a:t>
+            </a:r>
+            <a:r>
+              <a:rPr lang="ru-RU" sz="3600" b="1" dirty="0">
+                <a:solidFill>
+                  <a:srgbClr val="000000"/>
+                </a:solidFill>
+                <a:latin typeface="Segoe UI" panose="020B0502040204020203" pitchFamily="34" charset="0"/>
+                <a:ea typeface="Times New Roman" panose="02020603050405020304" pitchFamily="18" charset="0"/>
+              </a:rPr>
+              <a:t>)</a:t>
+            </a:r>
+            <a:r>
+              <a:rPr lang="en-US" sz="3600" dirty="0">
+                <a:solidFill>
+                  <a:srgbClr val="000000"/>
+                </a:solidFill>
+                <a:latin typeface="Segoe UI" panose="020B0502040204020203" pitchFamily="34" charset="0"/>
+                <a:ea typeface="Times New Roman" panose="02020603050405020304" pitchFamily="18" charset="0"/>
+              </a:rPr>
+              <a:t> </a:t>
+            </a:r>
+            <a:r>
+              <a:rPr lang="ru-RU" sz="3600" dirty="0">
+                <a:solidFill>
+                  <a:srgbClr val="000000"/>
+                </a:solidFill>
+                <a:latin typeface="Segoe UI" panose="020B0502040204020203" pitchFamily="34" charset="0"/>
+                <a:ea typeface="Times New Roman" panose="02020603050405020304" pitchFamily="18" charset="0"/>
+              </a:rPr>
+              <a:t>— это концепция программирования, в</a:t>
+            </a:r>
+            <a:r>
+              <a:rPr lang="en-US" sz="3600" dirty="0">
+                <a:solidFill>
+                  <a:srgbClr val="000000"/>
+                </a:solidFill>
+                <a:latin typeface="Segoe UI" panose="020B0502040204020203" pitchFamily="34" charset="0"/>
+                <a:ea typeface="Times New Roman" panose="02020603050405020304" pitchFamily="18" charset="0"/>
+              </a:rPr>
+              <a:t> </a:t>
+            </a:r>
+            <a:r>
+              <a:rPr lang="ru-RU" sz="3600" dirty="0">
+                <a:solidFill>
+                  <a:srgbClr val="000000"/>
+                </a:solidFill>
+                <a:latin typeface="Segoe UI" panose="020B0502040204020203" pitchFamily="34" charset="0"/>
+                <a:ea typeface="Times New Roman" panose="02020603050405020304" pitchFamily="18" charset="0"/>
+              </a:rPr>
+              <a:t>которой идеальное или «виртуальное» представление пользовательского интерфейса хранится в</a:t>
+            </a:r>
+            <a:r>
+              <a:rPr lang="en-US" sz="3600" dirty="0">
+                <a:solidFill>
+                  <a:srgbClr val="000000"/>
+                </a:solidFill>
+                <a:latin typeface="Segoe UI" panose="020B0502040204020203" pitchFamily="34" charset="0"/>
+                <a:ea typeface="Times New Roman" panose="02020603050405020304" pitchFamily="18" charset="0"/>
+              </a:rPr>
+              <a:t> </a:t>
+            </a:r>
+            <a:r>
+              <a:rPr lang="ru-RU" sz="3600" dirty="0">
+                <a:solidFill>
+                  <a:srgbClr val="000000"/>
+                </a:solidFill>
+                <a:latin typeface="Segoe UI" panose="020B0502040204020203" pitchFamily="34" charset="0"/>
+                <a:ea typeface="Times New Roman" panose="02020603050405020304" pitchFamily="18" charset="0"/>
+              </a:rPr>
+              <a:t>памяти и</a:t>
+            </a:r>
+            <a:r>
+              <a:rPr lang="en-US" sz="3600" dirty="0">
+                <a:solidFill>
+                  <a:srgbClr val="000000"/>
+                </a:solidFill>
+                <a:latin typeface="Segoe UI" panose="020B0502040204020203" pitchFamily="34" charset="0"/>
+                <a:ea typeface="Times New Roman" panose="02020603050405020304" pitchFamily="18" charset="0"/>
+              </a:rPr>
+              <a:t> </a:t>
+            </a:r>
+            <a:r>
+              <a:rPr lang="ru-RU" sz="3600" dirty="0">
+                <a:solidFill>
+                  <a:srgbClr val="000000"/>
+                </a:solidFill>
+                <a:latin typeface="Segoe UI" panose="020B0502040204020203" pitchFamily="34" charset="0"/>
+                <a:ea typeface="Times New Roman" panose="02020603050405020304" pitchFamily="18" charset="0"/>
+              </a:rPr>
+              <a:t>синхронизируется с</a:t>
+            </a:r>
+            <a:r>
+              <a:rPr lang="en-US" sz="3600" dirty="0">
+                <a:solidFill>
+                  <a:srgbClr val="000000"/>
+                </a:solidFill>
+                <a:latin typeface="Segoe UI" panose="020B0502040204020203" pitchFamily="34" charset="0"/>
+                <a:ea typeface="Times New Roman" panose="02020603050405020304" pitchFamily="18" charset="0"/>
+              </a:rPr>
+              <a:t> </a:t>
+            </a:r>
+            <a:r>
+              <a:rPr lang="ru-RU" sz="3600" dirty="0">
+                <a:solidFill>
+                  <a:srgbClr val="000000"/>
+                </a:solidFill>
+                <a:latin typeface="Segoe UI" panose="020B0502040204020203" pitchFamily="34" charset="0"/>
+                <a:ea typeface="Times New Roman" panose="02020603050405020304" pitchFamily="18" charset="0"/>
+              </a:rPr>
+              <a:t>«настоящим» </a:t>
+            </a:r>
+            <a:r>
+              <a:rPr lang="en-US" sz="3600" dirty="0">
+                <a:solidFill>
+                  <a:srgbClr val="000000"/>
+                </a:solidFill>
+                <a:latin typeface="Segoe UI" panose="020B0502040204020203" pitchFamily="34" charset="0"/>
+                <a:ea typeface="Times New Roman" panose="02020603050405020304" pitchFamily="18" charset="0"/>
+              </a:rPr>
+              <a:t>DOM</a:t>
+            </a:r>
+            <a:r>
+              <a:rPr lang="ru-RU" sz="3600" dirty="0">
+                <a:solidFill>
+                  <a:srgbClr val="000000"/>
+                </a:solidFill>
+                <a:latin typeface="Segoe UI" panose="020B0502040204020203" pitchFamily="34" charset="0"/>
+                <a:ea typeface="Times New Roman" panose="02020603050405020304" pitchFamily="18" charset="0"/>
+              </a:rPr>
+              <a:t> при помощи библиотеки, такой как </a:t>
+            </a:r>
+            <a:r>
+              <a:rPr lang="en-US" sz="3600" dirty="0" err="1">
+                <a:solidFill>
+                  <a:srgbClr val="000000"/>
+                </a:solidFill>
+                <a:latin typeface="Segoe UI" panose="020B0502040204020203" pitchFamily="34" charset="0"/>
+                <a:ea typeface="Times New Roman" panose="02020603050405020304" pitchFamily="18" charset="0"/>
+              </a:rPr>
+              <a:t>ReactDOM</a:t>
+            </a:r>
+            <a:r>
+              <a:rPr lang="ru-RU" sz="3600" dirty="0">
+                <a:solidFill>
+                  <a:srgbClr val="000000"/>
+                </a:solidFill>
+                <a:latin typeface="Segoe UI" panose="020B0502040204020203" pitchFamily="34" charset="0"/>
+                <a:ea typeface="Times New Roman" panose="02020603050405020304" pitchFamily="18" charset="0"/>
+              </a:rPr>
+              <a:t>. Этот процесс называется</a:t>
+            </a:r>
+            <a:r>
+              <a:rPr lang="en-US" sz="3600" dirty="0">
+                <a:solidFill>
+                  <a:srgbClr val="000000"/>
+                </a:solidFill>
+                <a:latin typeface="Segoe UI" panose="020B0502040204020203" pitchFamily="34" charset="0"/>
+                <a:ea typeface="Times New Roman" panose="02020603050405020304" pitchFamily="18" charset="0"/>
+              </a:rPr>
+              <a:t> </a:t>
+            </a:r>
+            <a:r>
+              <a:rPr lang="ru-RU" sz="3600" u="sng" dirty="0">
+                <a:solidFill>
+                  <a:srgbClr val="1A1A1A"/>
+                </a:solidFill>
+                <a:latin typeface="Segoe UI" panose="020B0502040204020203" pitchFamily="34" charset="0"/>
+                <a:ea typeface="Times New Roman" panose="02020603050405020304" pitchFamily="18" charset="0"/>
+              </a:rPr>
+              <a:t>согласованием</a:t>
+            </a:r>
+            <a:r>
+              <a:rPr lang="ru-RU" sz="3600" dirty="0">
+                <a:solidFill>
+                  <a:srgbClr val="000000"/>
+                </a:solidFill>
+                <a:latin typeface="Segoe UI" panose="020B0502040204020203" pitchFamily="34" charset="0"/>
+                <a:ea typeface="Times New Roman" panose="02020603050405020304" pitchFamily="18" charset="0"/>
+              </a:rPr>
+              <a:t>.</a:t>
+            </a:r>
+            <a:endParaRPr lang="en-US" sz="3600" dirty="0">
+              <a:effectLst/>
+              <a:latin typeface="Times New Roman" panose="02020603050405020304" pitchFamily="18" charset="0"/>
+              <a:ea typeface="Times New Roman" panose="02020603050405020304" pitchFamily="18" charset="0"/>
+            </a:endParaRPr>
+          </a:p>
+        </p:txBody>
+      </p:sp>
+    </p:spTree>
+    <p:extLst>
+      <p:ext uri="{BB962C8B-B14F-4D97-AF65-F5344CB8AC3E}">
+        <p14:creationId xmlns:p14="http://schemas.microsoft.com/office/powerpoint/2010/main" val="1516366036"/>
+      </p:ext>
+    </p:extLst>
+  </p:cSld>
+  <p:clrMapOvr>
+    <a:masterClrMapping/>
+  </p:clrMapOvr>
+</p:sld>
+</file>
+
+<file path=ppt/slides/slide13.xml><?xml version="1.0" encoding="utf-8"?>
+<p:sld xmlns:a="http://schemas.openxmlformats.org/drawingml/2006/main" xmlns:r="http://schemas.openxmlformats.org/officeDocument/2006/relationships" xmlns:p="http://schemas.openxmlformats.org/presentationml/2006/main">
+  <p:cSld>
+    <p:spTree>
+      <p:nvGrpSpPr>
+        <p:cNvPr id="1" name=""/>
+        <p:cNvGrpSpPr/>
+        <p:nvPr/>
+      </p:nvGrpSpPr>
+      <p:grpSpPr>
+        <a:xfrm>
+          <a:off x="0" y="0"/>
+          <a:ext cx="0" cy="0"/>
+          <a:chOff x="0" y="0"/>
+          <a:chExt cx="0" cy="0"/>
+        </a:xfrm>
+      </p:grpSpPr>
+      <p:sp>
+        <p:nvSpPr>
+          <p:cNvPr id="2" name="Title 1">
+            <a:extLst>
+              <a:ext uri="{FF2B5EF4-FFF2-40B4-BE49-F238E27FC236}">
+                <a16:creationId xmlns:a16="http://schemas.microsoft.com/office/drawing/2014/main" id="{5CD3E058-688E-4E62-BDC2-FA2FAC5D0415}"/>
+              </a:ext>
+            </a:extLst>
+          </p:cNvPr>
+          <p:cNvSpPr>
+            <a:spLocks noGrp="1"/>
+          </p:cNvSpPr>
+          <p:nvPr>
+            <p:ph type="title"/>
+          </p:nvPr>
+        </p:nvSpPr>
+        <p:spPr>
+          <a:xfrm>
+            <a:off x="838200" y="365125"/>
+            <a:ext cx="10515600" cy="2304267"/>
+          </a:xfrm>
+        </p:spPr>
+        <p:txBody>
+          <a:bodyPr>
+            <a:normAutofit fontScale="90000"/>
+          </a:bodyPr>
+          <a:lstStyle/>
+          <a:p>
+            <a:r>
+              <a:rPr lang="ru-RU" dirty="0"/>
+              <a:t>«Ключ»</a:t>
+            </a:r>
+            <a:r>
+              <a:rPr lang="en-US" dirty="0"/>
+              <a:t> </a:t>
+            </a:r>
+            <a:r>
+              <a:rPr lang="ru-RU" dirty="0"/>
+              <a:t>— это специальный строковый атрибут, который нужно указывать при создании списка элементов. </a:t>
+            </a:r>
+            <a:br>
+              <a:rPr lang="en-US" dirty="0"/>
+            </a:br>
+            <a:endParaRPr lang="en-US" dirty="0"/>
+          </a:p>
+        </p:txBody>
+      </p:sp>
+      <p:sp>
+        <p:nvSpPr>
+          <p:cNvPr id="3" name="Content Placeholder 2">
+            <a:extLst>
+              <a:ext uri="{FF2B5EF4-FFF2-40B4-BE49-F238E27FC236}">
+                <a16:creationId xmlns:a16="http://schemas.microsoft.com/office/drawing/2014/main" id="{66FFCA27-637A-407D-A741-065BCBD1B909}"/>
+              </a:ext>
+            </a:extLst>
+          </p:cNvPr>
+          <p:cNvSpPr>
+            <a:spLocks noGrp="1"/>
+          </p:cNvSpPr>
+          <p:nvPr>
+            <p:ph idx="1"/>
+          </p:nvPr>
+        </p:nvSpPr>
+        <p:spPr>
+          <a:xfrm>
+            <a:off x="838200" y="2923619"/>
+            <a:ext cx="10515600" cy="3253343"/>
+          </a:xfrm>
+        </p:spPr>
+        <p:txBody>
+          <a:bodyPr>
+            <a:normAutofit/>
+          </a:bodyPr>
+          <a:lstStyle/>
+          <a:p>
+            <a:pPr marL="0" indent="0">
+              <a:buNone/>
+            </a:pPr>
+            <a:r>
+              <a:rPr lang="en-US" sz="4400" dirty="0">
+                <a:solidFill>
+                  <a:schemeClr val="tx2"/>
+                </a:solidFill>
+              </a:rPr>
+              <a:t>this</a:t>
+            </a:r>
+            <a:r>
+              <a:rPr lang="ru-RU" sz="4400" dirty="0">
+                <a:solidFill>
+                  <a:schemeClr val="tx2"/>
+                </a:solidFill>
+              </a:rPr>
+              <a:t>.</a:t>
+            </a:r>
+            <a:r>
+              <a:rPr lang="en-US" sz="4400" dirty="0">
+                <a:solidFill>
+                  <a:schemeClr val="tx2"/>
+                </a:solidFill>
+              </a:rPr>
+              <a:t>state</a:t>
+            </a:r>
+            <a:r>
+              <a:rPr lang="ru-RU" sz="4400" dirty="0">
+                <a:solidFill>
+                  <a:schemeClr val="tx2"/>
+                </a:solidFill>
+              </a:rPr>
+              <a:t>.</a:t>
+            </a:r>
+            <a:r>
+              <a:rPr lang="en-US" sz="4400" dirty="0">
+                <a:solidFill>
+                  <a:schemeClr val="tx2"/>
+                </a:solidFill>
+              </a:rPr>
+              <a:t>news</a:t>
+            </a:r>
+            <a:r>
+              <a:rPr lang="ru-RU" sz="4400" dirty="0">
+                <a:solidFill>
+                  <a:schemeClr val="tx2"/>
+                </a:solidFill>
+              </a:rPr>
+              <a:t>.</a:t>
+            </a:r>
+            <a:r>
+              <a:rPr lang="en-US" sz="4400" dirty="0">
+                <a:solidFill>
+                  <a:schemeClr val="tx2"/>
+                </a:solidFill>
+              </a:rPr>
+              <a:t>map</a:t>
+            </a:r>
+            <a:r>
+              <a:rPr lang="ru-RU" sz="4400" dirty="0">
+                <a:solidFill>
+                  <a:schemeClr val="tx2"/>
+                </a:solidFill>
+              </a:rPr>
+              <a:t>((</a:t>
+            </a:r>
+            <a:r>
+              <a:rPr lang="en-US" sz="4400" dirty="0">
+                <a:solidFill>
+                  <a:schemeClr val="tx2"/>
+                </a:solidFill>
+              </a:rPr>
+              <a:t>item</a:t>
+            </a:r>
+            <a:r>
+              <a:rPr lang="ru-RU" sz="4400" dirty="0">
+                <a:solidFill>
+                  <a:schemeClr val="tx2"/>
+                </a:solidFill>
+              </a:rPr>
+              <a:t>,</a:t>
+            </a:r>
+            <a:r>
+              <a:rPr lang="en-US" sz="4400" dirty="0">
+                <a:solidFill>
+                  <a:schemeClr val="tx2"/>
+                </a:solidFill>
+              </a:rPr>
+              <a:t> index</a:t>
+            </a:r>
+            <a:r>
+              <a:rPr lang="ru-RU" sz="4400" dirty="0">
+                <a:solidFill>
+                  <a:schemeClr val="tx2"/>
+                </a:solidFill>
+              </a:rPr>
+              <a:t>)</a:t>
+            </a:r>
+            <a:r>
+              <a:rPr lang="en-US" sz="4400" dirty="0">
+                <a:solidFill>
+                  <a:schemeClr val="tx2"/>
+                </a:solidFill>
+              </a:rPr>
+              <a:t> </a:t>
+            </a:r>
+            <a:r>
+              <a:rPr lang="ru-RU" sz="4400" dirty="0">
+                <a:solidFill>
+                  <a:schemeClr val="tx2"/>
+                </a:solidFill>
+              </a:rPr>
+              <a:t>=&gt;</a:t>
+            </a:r>
+            <a:r>
+              <a:rPr lang="en-US" sz="4400" dirty="0">
+                <a:solidFill>
+                  <a:schemeClr val="tx2"/>
+                </a:solidFill>
+              </a:rPr>
+              <a:t> </a:t>
+            </a:r>
+          </a:p>
+          <a:p>
+            <a:pPr marL="0" indent="0">
+              <a:buNone/>
+            </a:pPr>
+            <a:r>
+              <a:rPr lang="ru-RU" sz="4400" dirty="0">
+                <a:solidFill>
+                  <a:schemeClr val="tx2"/>
+                </a:solidFill>
+              </a:rPr>
+              <a:t>&lt;</a:t>
+            </a:r>
+            <a:r>
+              <a:rPr lang="en-US" sz="4400" dirty="0">
+                <a:solidFill>
+                  <a:schemeClr val="tx2"/>
+                </a:solidFill>
+              </a:rPr>
+              <a:t>Item </a:t>
+            </a:r>
+            <a:r>
+              <a:rPr lang="en-US" sz="4400" dirty="0" err="1">
+                <a:solidFill>
+                  <a:schemeClr val="tx2"/>
+                </a:solidFill>
+              </a:rPr>
+              <a:t>item</a:t>
+            </a:r>
+            <a:r>
+              <a:rPr lang="ru-RU" sz="4400" dirty="0">
+                <a:solidFill>
+                  <a:schemeClr val="tx2"/>
+                </a:solidFill>
+              </a:rPr>
+              <a:t>={</a:t>
+            </a:r>
+            <a:r>
+              <a:rPr lang="en-US" sz="4400" dirty="0">
+                <a:solidFill>
+                  <a:schemeClr val="tx2"/>
+                </a:solidFill>
+              </a:rPr>
+              <a:t>item</a:t>
+            </a:r>
+            <a:r>
+              <a:rPr lang="ru-RU" sz="4400" dirty="0">
+                <a:solidFill>
+                  <a:schemeClr val="tx2"/>
+                </a:solidFill>
+              </a:rPr>
+              <a:t>}</a:t>
+            </a:r>
+            <a:r>
+              <a:rPr lang="en-US" sz="4400" dirty="0">
+                <a:solidFill>
+                  <a:schemeClr val="tx2"/>
+                </a:solidFill>
+              </a:rPr>
+              <a:t> </a:t>
+            </a:r>
+            <a:r>
+              <a:rPr lang="en-US" sz="4400" b="1" dirty="0">
+                <a:solidFill>
+                  <a:schemeClr val="tx2"/>
+                </a:solidFill>
+              </a:rPr>
+              <a:t>key</a:t>
+            </a:r>
+            <a:r>
+              <a:rPr lang="ru-RU" sz="4400" b="1" dirty="0">
+                <a:solidFill>
+                  <a:schemeClr val="tx2"/>
+                </a:solidFill>
+              </a:rPr>
+              <a:t>={</a:t>
+            </a:r>
+            <a:r>
+              <a:rPr lang="en-US" sz="4400" b="1" dirty="0">
+                <a:solidFill>
+                  <a:schemeClr val="tx2"/>
+                </a:solidFill>
+              </a:rPr>
+              <a:t>item</a:t>
+            </a:r>
+            <a:r>
+              <a:rPr lang="ru-RU" sz="4400" b="1" dirty="0">
+                <a:solidFill>
+                  <a:schemeClr val="tx2"/>
+                </a:solidFill>
+              </a:rPr>
+              <a:t>.</a:t>
+            </a:r>
+            <a:r>
+              <a:rPr lang="en-US" sz="4400" b="1" dirty="0">
+                <a:solidFill>
+                  <a:schemeClr val="tx2"/>
+                </a:solidFill>
+              </a:rPr>
+              <a:t>id</a:t>
+            </a:r>
+            <a:r>
+              <a:rPr lang="ru-RU" sz="4400" b="1" dirty="0">
+                <a:solidFill>
+                  <a:schemeClr val="tx2"/>
+                </a:solidFill>
+              </a:rPr>
+              <a:t>}</a:t>
+            </a:r>
+            <a:r>
+              <a:rPr lang="en-US" sz="4400" dirty="0">
+                <a:solidFill>
+                  <a:schemeClr val="tx2"/>
+                </a:solidFill>
+              </a:rPr>
+              <a:t> </a:t>
+            </a:r>
+          </a:p>
+          <a:p>
+            <a:pPr marL="0" indent="0">
+              <a:buNone/>
+            </a:pPr>
+            <a:r>
+              <a:rPr lang="en-US" sz="4400" dirty="0">
+                <a:solidFill>
+                  <a:schemeClr val="tx2"/>
+                </a:solidFill>
+              </a:rPr>
+              <a:t>index</a:t>
+            </a:r>
+            <a:r>
+              <a:rPr lang="ru-RU" sz="4400" dirty="0">
+                <a:solidFill>
+                  <a:schemeClr val="tx2"/>
+                </a:solidFill>
+              </a:rPr>
+              <a:t>={</a:t>
+            </a:r>
+            <a:r>
+              <a:rPr lang="en-US" sz="4400" dirty="0">
+                <a:solidFill>
+                  <a:schemeClr val="tx2"/>
+                </a:solidFill>
+              </a:rPr>
+              <a:t>index</a:t>
+            </a:r>
+            <a:r>
+              <a:rPr lang="ru-RU" sz="4400" dirty="0">
+                <a:solidFill>
+                  <a:schemeClr val="tx2"/>
+                </a:solidFill>
+              </a:rPr>
+              <a:t>}</a:t>
+            </a:r>
+            <a:r>
+              <a:rPr lang="en-US" sz="4400" dirty="0">
+                <a:solidFill>
+                  <a:schemeClr val="tx2"/>
+                </a:solidFill>
+              </a:rPr>
+              <a:t> </a:t>
+            </a:r>
+            <a:r>
+              <a:rPr lang="ru-RU" sz="4400" dirty="0">
+                <a:solidFill>
+                  <a:schemeClr val="tx2"/>
+                </a:solidFill>
+              </a:rPr>
+              <a:t>/&gt;</a:t>
+            </a:r>
+            <a:endParaRPr lang="en-US" sz="4400" dirty="0">
+              <a:solidFill>
+                <a:schemeClr val="tx2"/>
+              </a:solidFill>
+            </a:endParaRPr>
+          </a:p>
+          <a:p>
+            <a:pPr marL="0" indent="0">
+              <a:buNone/>
+            </a:pPr>
+            <a:r>
+              <a:rPr lang="ru-RU" sz="4400" dirty="0">
+                <a:solidFill>
+                  <a:schemeClr val="tx2"/>
+                </a:solidFill>
+              </a:rPr>
+              <a:t>)</a:t>
+            </a:r>
+            <a:endParaRPr lang="en-US" sz="4400" dirty="0">
+              <a:solidFill>
+                <a:schemeClr val="tx2"/>
+              </a:solidFill>
+            </a:endParaRPr>
+          </a:p>
+        </p:txBody>
+      </p:sp>
+    </p:spTree>
+    <p:extLst>
+      <p:ext uri="{BB962C8B-B14F-4D97-AF65-F5344CB8AC3E}">
+        <p14:creationId xmlns:p14="http://schemas.microsoft.com/office/powerpoint/2010/main" val="4222425608"/>
+      </p:ext>
+    </p:extLst>
+  </p:cSld>
+  <p:clrMapOvr>
+    <a:masterClrMapping/>
+  </p:clrMapOvr>
+</p:sld>
+</file>
+
+<file path=ppt/slides/slide14.xml><?xml version="1.0" encoding="utf-8"?>
+<p:sld xmlns:a="http://schemas.openxmlformats.org/drawingml/2006/main" xmlns:r="http://schemas.openxmlformats.org/officeDocument/2006/relationships" xmlns:p="http://schemas.openxmlformats.org/presentationml/2006/main">
+  <p:cSld>
+    <p:spTree>
+      <p:nvGrpSpPr>
+        <p:cNvPr id="1" name=""/>
+        <p:cNvGrpSpPr/>
+        <p:nvPr/>
+      </p:nvGrpSpPr>
+      <p:grpSpPr>
+        <a:xfrm>
+          <a:off x="0" y="0"/>
+          <a:ext cx="0" cy="0"/>
+          <a:chOff x="0" y="0"/>
+          <a:chExt cx="0" cy="0"/>
+        </a:xfrm>
+      </p:grpSpPr>
+      <p:sp>
+        <p:nvSpPr>
+          <p:cNvPr id="2" name="Rectangle 1">
+            <a:extLst>
+              <a:ext uri="{FF2B5EF4-FFF2-40B4-BE49-F238E27FC236}">
+                <a16:creationId xmlns:a16="http://schemas.microsoft.com/office/drawing/2014/main" id="{6B928FC6-6529-4B54-9D71-BC92E1468193}"/>
+              </a:ext>
+            </a:extLst>
+          </p:cNvPr>
+          <p:cNvSpPr>
+            <a:spLocks noChangeArrowheads="1"/>
+          </p:cNvSpPr>
+          <p:nvPr/>
+        </p:nvSpPr>
+        <p:spPr bwMode="auto">
+          <a:xfrm>
+            <a:off x="364940" y="5820"/>
+            <a:ext cx="10927695" cy="6104179"/>
+          </a:xfrm>
+          <a:prstGeom prst="rect">
+            <a:avLst/>
+          </a:prstGeom>
+          <a:solidFill>
+            <a:srgbClr val="FFFFFF"/>
+          </a:solidFill>
+          <a:ln>
+            <a:noFill/>
+          </a:ln>
+          <a:effectLst/>
+          <a:extLst>
+            <a:ext uri="{91240B29-F687-4F45-9708-019B960494DF}">
+              <a14:hiddenLine xmlns:a14="http://schemas.microsoft.com/office/drawing/2010/main" w="9525">
+                <a:solidFill>
+                  <a:schemeClr val="tx1"/>
+                </a:solidFill>
+                <a:miter lim="800000"/>
+                <a:headEnd/>
+                <a:tailEnd/>
+              </a14:hiddenLine>
+            </a:ext>
+            <a:ext uri="{AF507438-7753-43E0-B8FC-AC1667EBCBE1}">
+              <a14:hiddenEffects xmlns:a14="http://schemas.microsoft.com/office/drawing/2010/main">
+                <a:effectLst>
+                  <a:outerShdw dist="35921" dir="2700000" algn="ctr" rotWithShape="0">
+                    <a:schemeClr val="bg2"/>
+                  </a:outerShdw>
+                </a:effectLst>
+              </a14:hiddenEffects>
+            </a:ext>
+          </a:extLst>
+        </p:spPr>
+        <p:txBody>
+          <a:bodyPr vert="horz" wrap="square" lIns="0" tIns="177744" rIns="0" bIns="0" numCol="1" anchor="ctr" anchorCtr="0" compatLnSpc="1">
+            <a:prstTxWarp prst="textNoShape">
+              <a:avLst/>
+            </a:prstTxWarp>
+            <a:spAutoFit/>
+          </a:bodyPr>
+          <a:lstStyle>
+            <a:lvl1pPr eaLnBrk="0" fontAlgn="base" hangingPunct="0">
+              <a:spcBef>
+                <a:spcPct val="0"/>
+              </a:spcBef>
+              <a:spcAft>
+                <a:spcPct val="0"/>
+              </a:spcAft>
+              <a:defRPr>
+                <a:solidFill>
+                  <a:schemeClr val="tx1"/>
+                </a:solidFill>
+                <a:latin typeface="Arial" panose="020B0604020202020204" pitchFamily="34" charset="0"/>
+              </a:defRPr>
+            </a:lvl1pPr>
+            <a:lvl2pPr eaLnBrk="0" fontAlgn="base" hangingPunct="0">
+              <a:spcBef>
+                <a:spcPct val="0"/>
+              </a:spcBef>
+              <a:spcAft>
+                <a:spcPct val="0"/>
+              </a:spcAft>
+              <a:defRPr>
+                <a:solidFill>
+                  <a:schemeClr val="tx1"/>
+                </a:solidFill>
+                <a:latin typeface="Arial" panose="020B0604020202020204" pitchFamily="34" charset="0"/>
+              </a:defRPr>
+            </a:lvl2pPr>
+            <a:lvl3pPr eaLnBrk="0" fontAlgn="base" hangingPunct="0">
+              <a:spcBef>
+                <a:spcPct val="0"/>
+              </a:spcBef>
+              <a:spcAft>
+                <a:spcPct val="0"/>
+              </a:spcAft>
+              <a:defRPr>
+                <a:solidFill>
+                  <a:schemeClr val="tx1"/>
+                </a:solidFill>
+                <a:latin typeface="Arial" panose="020B0604020202020204" pitchFamily="34" charset="0"/>
+              </a:defRPr>
+            </a:lvl3pPr>
+            <a:lvl4pPr eaLnBrk="0" fontAlgn="base" hangingPunct="0">
+              <a:spcBef>
+                <a:spcPct val="0"/>
+              </a:spcBef>
+              <a:spcAft>
+                <a:spcPct val="0"/>
+              </a:spcAft>
+              <a:defRPr>
+                <a:solidFill>
+                  <a:schemeClr val="tx1"/>
+                </a:solidFill>
+                <a:latin typeface="Arial" panose="020B0604020202020204" pitchFamily="34" charset="0"/>
+              </a:defRPr>
+            </a:lvl4pPr>
+            <a:lvl5pPr eaLnBrk="0" fontAlgn="base" hangingPunct="0">
+              <a:spcBef>
+                <a:spcPct val="0"/>
+              </a:spcBef>
+              <a:spcAft>
+                <a:spcPct val="0"/>
+              </a:spcAft>
+              <a:defRPr>
+                <a:solidFill>
+                  <a:schemeClr val="tx1"/>
+                </a:solidFill>
+                <a:latin typeface="Arial" panose="020B0604020202020204" pitchFamily="34" charset="0"/>
+              </a:defRPr>
+            </a:lvl5pPr>
+            <a:lvl6pPr eaLnBrk="0" fontAlgn="base" hangingPunct="0">
+              <a:spcBef>
+                <a:spcPct val="0"/>
+              </a:spcBef>
+              <a:spcAft>
+                <a:spcPct val="0"/>
+              </a:spcAft>
+              <a:defRPr>
+                <a:solidFill>
+                  <a:schemeClr val="tx1"/>
+                </a:solidFill>
+                <a:latin typeface="Arial" panose="020B0604020202020204" pitchFamily="34" charset="0"/>
+              </a:defRPr>
+            </a:lvl6pPr>
+            <a:lvl7pPr eaLnBrk="0" fontAlgn="base" hangingPunct="0">
+              <a:spcBef>
+                <a:spcPct val="0"/>
+              </a:spcBef>
+              <a:spcAft>
+                <a:spcPct val="0"/>
+              </a:spcAft>
+              <a:defRPr>
+                <a:solidFill>
+                  <a:schemeClr val="tx1"/>
+                </a:solidFill>
+                <a:latin typeface="Arial" panose="020B0604020202020204" pitchFamily="34" charset="0"/>
+              </a:defRPr>
+            </a:lvl7pPr>
+            <a:lvl8pPr eaLnBrk="0" fontAlgn="base" hangingPunct="0">
+              <a:spcBef>
+                <a:spcPct val="0"/>
+              </a:spcBef>
+              <a:spcAft>
+                <a:spcPct val="0"/>
+              </a:spcAft>
+              <a:defRPr>
+                <a:solidFill>
+                  <a:schemeClr val="tx1"/>
+                </a:solidFill>
+                <a:latin typeface="Arial" panose="020B0604020202020204" pitchFamily="34" charset="0"/>
+              </a:defRPr>
+            </a:lvl8pPr>
+            <a:lvl9pPr eaLnBrk="0" fontAlgn="base" hangingPunct="0">
+              <a:spcBef>
+                <a:spcPct val="0"/>
+              </a:spcBef>
+              <a:spcAft>
+                <a:spcPct val="0"/>
+              </a:spcAft>
+              <a:defRPr>
+                <a:solidFill>
+                  <a:schemeClr val="tx1"/>
+                </a:solidFill>
+                <a:latin typeface="Arial" panose="020B0604020202020204" pitchFamily="34" charset="0"/>
+              </a:defRPr>
+            </a:lvl9pPr>
+          </a:lstStyle>
+          <a:p>
+            <a:pPr marL="0" marR="0" lvl="0" indent="0" algn="l" defTabSz="914400" rtl="0" eaLnBrk="0" fontAlgn="base" latinLnBrk="0" hangingPunct="0">
+              <a:lnSpc>
+                <a:spcPct val="100000"/>
+              </a:lnSpc>
+              <a:spcBef>
+                <a:spcPct val="0"/>
+              </a:spcBef>
+              <a:spcAft>
+                <a:spcPct val="0"/>
+              </a:spcAft>
+              <a:buClrTx/>
+              <a:buSzTx/>
+              <a:buFontTx/>
+              <a:buNone/>
+              <a:tabLst/>
+            </a:pPr>
+            <a:r>
+              <a:rPr lang="ru-RU" altLang="en-US" sz="1500" b="1" dirty="0">
+                <a:latin typeface="medium-content-serif-font"/>
+              </a:rPr>
+              <a:t>Компонент</a:t>
+            </a:r>
+            <a:r>
+              <a:rPr kumimoji="0" lang="en-US" altLang="en-US" sz="1500" b="1" i="0" u="none" strike="noStrike" cap="none" normalizeH="0" baseline="0" dirty="0">
+                <a:ln>
+                  <a:noFill/>
+                </a:ln>
+                <a:solidFill>
+                  <a:schemeClr val="tx1"/>
+                </a:solidFill>
+                <a:effectLst/>
+                <a:latin typeface="medium-content-serif-font"/>
+              </a:rPr>
+              <a:t>:</a:t>
+            </a:r>
+            <a:endParaRPr kumimoji="0" lang="en-US" altLang="en-US" sz="1200" b="1" i="0" u="none" strike="noStrike" cap="none" normalizeH="0" baseline="0" dirty="0">
+              <a:ln>
+                <a:noFill/>
+              </a:ln>
+              <a:solidFill>
+                <a:schemeClr val="tx1"/>
+              </a:solidFill>
+              <a:effectLst/>
+              <a:latin typeface="Menlo"/>
+            </a:endParaRPr>
+          </a:p>
+          <a:p>
+            <a:pPr marL="0" marR="0" lvl="0" indent="0" algn="l" defTabSz="914400" rtl="0" eaLnBrk="0" fontAlgn="base" latinLnBrk="0" hangingPunct="0">
+              <a:lnSpc>
+                <a:spcPct val="100000"/>
+              </a:lnSpc>
+              <a:spcBef>
+                <a:spcPct val="0"/>
+              </a:spcBef>
+              <a:spcAft>
+                <a:spcPct val="0"/>
+              </a:spcAft>
+              <a:buClrTx/>
+              <a:buSzTx/>
+              <a:buFontTx/>
+              <a:buNone/>
+              <a:tabLst/>
+            </a:pPr>
+            <a:r>
+              <a:rPr kumimoji="0" lang="en-US" altLang="en-US" sz="2400" b="0" i="0" u="none" strike="noStrike" cap="none" normalizeH="0" baseline="0" dirty="0">
+                <a:ln>
+                  <a:noFill/>
+                </a:ln>
+                <a:solidFill>
+                  <a:schemeClr val="tx1"/>
+                </a:solidFill>
+                <a:effectLst/>
+                <a:latin typeface="Menlo"/>
+              </a:rPr>
+              <a:t>const </a:t>
+            </a:r>
+            <a:r>
+              <a:rPr kumimoji="0" lang="en-US" altLang="en-US" sz="2400" b="0" i="0" u="none" strike="noStrike" cap="none" normalizeH="0" baseline="0" dirty="0" err="1">
+                <a:ln>
+                  <a:noFill/>
+                </a:ln>
+                <a:solidFill>
+                  <a:schemeClr val="tx1"/>
+                </a:solidFill>
+                <a:effectLst/>
+                <a:latin typeface="Menlo"/>
+              </a:rPr>
+              <a:t>ButtonWithIcon</a:t>
+            </a:r>
+            <a:r>
+              <a:rPr kumimoji="0" lang="en-US" altLang="en-US" sz="2400" b="0" i="0" u="none" strike="noStrike" cap="none" normalizeH="0" baseline="0" dirty="0">
+                <a:ln>
+                  <a:noFill/>
+                </a:ln>
+                <a:solidFill>
+                  <a:schemeClr val="tx1"/>
+                </a:solidFill>
+                <a:effectLst/>
+                <a:latin typeface="Menlo"/>
+              </a:rPr>
+              <a:t> = ({icon, children}) =&gt; (</a:t>
+            </a:r>
+            <a:br>
+              <a:rPr kumimoji="0" lang="en-US" altLang="en-US" sz="2400" b="0" i="0" u="none" strike="noStrike" cap="none" normalizeH="0" baseline="0" dirty="0">
+                <a:ln>
+                  <a:noFill/>
+                </a:ln>
+                <a:solidFill>
+                  <a:schemeClr val="tx1"/>
+                </a:solidFill>
+                <a:effectLst/>
+                <a:latin typeface="Menlo"/>
+              </a:rPr>
+            </a:br>
+            <a:r>
+              <a:rPr kumimoji="0" lang="en-US" altLang="en-US" sz="2400" b="0" i="0" u="none" strike="noStrike" cap="none" normalizeH="0" baseline="0" dirty="0">
+                <a:ln>
+                  <a:noFill/>
+                </a:ln>
+                <a:solidFill>
+                  <a:schemeClr val="tx1"/>
+                </a:solidFill>
+                <a:effectLst/>
+                <a:latin typeface="Menlo"/>
+              </a:rPr>
+              <a:t>&lt;button&gt;&lt;Icon icon={icon} /&gt;{children}&lt;/button&gt;</a:t>
+            </a:r>
+            <a:br>
+              <a:rPr kumimoji="0" lang="en-US" altLang="en-US" sz="2400" b="0" i="0" u="none" strike="noStrike" cap="none" normalizeH="0" baseline="0" dirty="0">
+                <a:ln>
+                  <a:noFill/>
+                </a:ln>
+                <a:solidFill>
+                  <a:schemeClr val="tx1"/>
+                </a:solidFill>
+                <a:effectLst/>
+                <a:latin typeface="Menlo"/>
+              </a:rPr>
+            </a:br>
+            <a:r>
+              <a:rPr kumimoji="0" lang="en-US" altLang="en-US" sz="2400" b="0" i="0" u="none" strike="noStrike" cap="none" normalizeH="0" baseline="0" dirty="0">
+                <a:ln>
+                  <a:noFill/>
+                </a:ln>
+                <a:solidFill>
+                  <a:schemeClr val="tx1"/>
+                </a:solidFill>
+                <a:effectLst/>
+                <a:latin typeface="Menlo"/>
+              </a:rPr>
+              <a:t>);</a:t>
+            </a:r>
+            <a:endParaRPr kumimoji="0" lang="ru-RU" altLang="en-US" sz="2400" b="0" i="0" u="none" strike="noStrike" cap="none" normalizeH="0" baseline="0" dirty="0">
+              <a:ln>
+                <a:noFill/>
+              </a:ln>
+              <a:solidFill>
+                <a:schemeClr val="tx1"/>
+              </a:solidFill>
+              <a:effectLst/>
+              <a:latin typeface="Menlo"/>
+            </a:endParaRPr>
+          </a:p>
+          <a:p>
+            <a:pPr marL="0" marR="0" lvl="0" indent="0" algn="l" defTabSz="914400" rtl="0" eaLnBrk="0" fontAlgn="base" latinLnBrk="0" hangingPunct="0">
+              <a:lnSpc>
+                <a:spcPct val="100000"/>
+              </a:lnSpc>
+              <a:spcBef>
+                <a:spcPct val="0"/>
+              </a:spcBef>
+              <a:spcAft>
+                <a:spcPct val="0"/>
+              </a:spcAft>
+              <a:buClrTx/>
+              <a:buSzTx/>
+              <a:buFontTx/>
+              <a:buNone/>
+              <a:tabLst/>
+            </a:pPr>
+            <a:endParaRPr kumimoji="0" lang="en-US" altLang="en-US" sz="2400" b="0" i="0" u="none" strike="noStrike" cap="none" normalizeH="0" baseline="0" dirty="0">
+              <a:ln>
+                <a:noFill/>
+              </a:ln>
+              <a:solidFill>
+                <a:schemeClr val="tx1"/>
+              </a:solidFill>
+              <a:effectLst/>
+            </a:endParaRPr>
+          </a:p>
+          <a:p>
+            <a:pPr marL="0" marR="0" lvl="0" indent="0" algn="l" defTabSz="914400" rtl="0" eaLnBrk="0" fontAlgn="base" latinLnBrk="0" hangingPunct="0">
+              <a:lnSpc>
+                <a:spcPct val="100000"/>
+              </a:lnSpc>
+              <a:spcBef>
+                <a:spcPct val="0"/>
+              </a:spcBef>
+              <a:spcAft>
+                <a:spcPct val="0"/>
+              </a:spcAft>
+              <a:buClrTx/>
+              <a:buSzTx/>
+              <a:buFontTx/>
+              <a:buNone/>
+              <a:tabLst/>
+            </a:pPr>
+            <a:r>
+              <a:rPr kumimoji="0" lang="en-US" altLang="en-US" sz="1500" b="1" i="0" u="none" strike="noStrike" cap="none" normalizeH="0" baseline="0" dirty="0">
+                <a:ln>
+                  <a:noFill/>
+                </a:ln>
+                <a:solidFill>
+                  <a:schemeClr val="tx1"/>
+                </a:solidFill>
+                <a:effectLst/>
+                <a:latin typeface="medium-content-serif-font"/>
+              </a:rPr>
+              <a:t>React </a:t>
+            </a:r>
+            <a:r>
+              <a:rPr kumimoji="0" lang="en-US" altLang="en-US" sz="1500" b="1" i="0" u="none" strike="noStrike" cap="none" normalizeH="0" baseline="0" dirty="0" err="1">
+                <a:ln>
+                  <a:noFill/>
+                </a:ln>
+                <a:solidFill>
+                  <a:schemeClr val="tx1"/>
+                </a:solidFill>
+                <a:effectLst/>
+                <a:latin typeface="medium-content-serif-font"/>
+              </a:rPr>
+              <a:t>отрисует</a:t>
+            </a:r>
+            <a:r>
+              <a:rPr kumimoji="0" lang="en-US" altLang="en-US" sz="1500" b="1" i="0" u="none" strike="noStrike" cap="none" normalizeH="0" baseline="0" dirty="0">
+                <a:ln>
+                  <a:noFill/>
+                </a:ln>
+                <a:solidFill>
+                  <a:schemeClr val="tx1"/>
+                </a:solidFill>
+                <a:effectLst/>
+                <a:latin typeface="medium-content-serif-font"/>
+              </a:rPr>
+              <a:t> </a:t>
+            </a:r>
+            <a:r>
+              <a:rPr kumimoji="0" lang="en-US" altLang="en-US" sz="1500" b="1" i="0" u="none" strike="noStrike" cap="none" normalizeH="0" baseline="0" dirty="0" err="1">
+                <a:ln>
+                  <a:noFill/>
+                </a:ln>
+                <a:solidFill>
+                  <a:schemeClr val="tx1"/>
+                </a:solidFill>
+                <a:effectLst/>
+                <a:latin typeface="medium-content-serif-font"/>
+              </a:rPr>
+              <a:t>его</a:t>
+            </a:r>
+            <a:r>
+              <a:rPr kumimoji="0" lang="en-US" altLang="en-US" sz="1500" b="1" i="0" u="none" strike="noStrike" cap="none" normalizeH="0" baseline="0" dirty="0">
+                <a:ln>
+                  <a:noFill/>
+                </a:ln>
+                <a:solidFill>
+                  <a:schemeClr val="tx1"/>
+                </a:solidFill>
+                <a:effectLst/>
+                <a:latin typeface="medium-content-serif-font"/>
+              </a:rPr>
+              <a:t> </a:t>
+            </a:r>
+            <a:r>
+              <a:rPr kumimoji="0" lang="en-US" altLang="en-US" sz="1500" b="1" i="0" u="none" strike="noStrike" cap="none" normalizeH="0" baseline="0" dirty="0" err="1">
+                <a:ln>
+                  <a:noFill/>
+                </a:ln>
+                <a:solidFill>
+                  <a:schemeClr val="tx1"/>
+                </a:solidFill>
+                <a:effectLst/>
+                <a:latin typeface="medium-content-serif-font"/>
+              </a:rPr>
+              <a:t>так</a:t>
+            </a:r>
+            <a:r>
+              <a:rPr kumimoji="0" lang="en-US" altLang="en-US" sz="1500" b="1" i="0" u="none" strike="noStrike" cap="none" normalizeH="0" baseline="0" dirty="0">
+                <a:ln>
+                  <a:noFill/>
+                </a:ln>
+                <a:solidFill>
+                  <a:schemeClr val="tx1"/>
+                </a:solidFill>
+                <a:effectLst/>
+                <a:latin typeface="medium-content-serif-font"/>
+              </a:rPr>
+              <a:t>:</a:t>
+            </a:r>
+            <a:endParaRPr kumimoji="0" lang="en-US" altLang="en-US" sz="1200" b="1" i="0" u="none" strike="noStrike" cap="none" normalizeH="0" baseline="0" dirty="0">
+              <a:ln>
+                <a:noFill/>
+              </a:ln>
+              <a:solidFill>
+                <a:schemeClr val="tx1"/>
+              </a:solidFill>
+              <a:effectLst/>
+              <a:latin typeface="Menlo"/>
+            </a:endParaRPr>
+          </a:p>
+          <a:p>
+            <a:pPr marL="0" marR="0" lvl="0" indent="0" algn="l" defTabSz="914400" rtl="0" eaLnBrk="0" fontAlgn="base" latinLnBrk="0" hangingPunct="0">
+              <a:lnSpc>
+                <a:spcPct val="100000"/>
+              </a:lnSpc>
+              <a:spcBef>
+                <a:spcPct val="0"/>
+              </a:spcBef>
+              <a:spcAft>
+                <a:spcPct val="0"/>
+              </a:spcAft>
+              <a:buClrTx/>
+              <a:buSzTx/>
+              <a:buFontTx/>
+              <a:buNone/>
+              <a:tabLst/>
+            </a:pPr>
+            <a:r>
+              <a:rPr kumimoji="0" lang="en-US" altLang="en-US" sz="2400" b="0" i="0" u="none" strike="noStrike" cap="none" normalizeH="0" baseline="0" dirty="0">
+                <a:ln>
+                  <a:noFill/>
+                </a:ln>
+                <a:solidFill>
+                  <a:schemeClr val="tx1"/>
+                </a:solidFill>
+                <a:effectLst/>
+                <a:latin typeface="Menlo"/>
+              </a:rPr>
+              <a:t>&lt;button&gt;</a:t>
+            </a:r>
+            <a:br>
+              <a:rPr kumimoji="0" lang="en-US" altLang="en-US" sz="2400" b="0" i="0" u="none" strike="noStrike" cap="none" normalizeH="0" baseline="0" dirty="0">
+                <a:ln>
+                  <a:noFill/>
+                </a:ln>
+                <a:solidFill>
+                  <a:schemeClr val="tx1"/>
+                </a:solidFill>
+                <a:effectLst/>
+                <a:latin typeface="Menlo"/>
+              </a:rPr>
+            </a:br>
+            <a:r>
+              <a:rPr kumimoji="0" lang="en-US" altLang="en-US" sz="2400" b="0" i="0" u="none" strike="noStrike" cap="none" normalizeH="0" baseline="0" dirty="0">
+                <a:ln>
+                  <a:noFill/>
+                </a:ln>
+                <a:solidFill>
+                  <a:schemeClr val="tx1"/>
+                </a:solidFill>
+                <a:effectLst/>
+                <a:latin typeface="Menlo"/>
+              </a:rPr>
+              <a:t>&lt;</a:t>
+            </a:r>
+            <a:r>
+              <a:rPr kumimoji="0" lang="en-US" altLang="en-US" sz="2400" b="0" i="0" u="none" strike="noStrike" cap="none" normalizeH="0" baseline="0" dirty="0" err="1">
+                <a:ln>
+                  <a:noFill/>
+                </a:ln>
+                <a:solidFill>
+                  <a:schemeClr val="tx1"/>
+                </a:solidFill>
+                <a:effectLst/>
+                <a:latin typeface="Menlo"/>
+              </a:rPr>
+              <a:t>i</a:t>
+            </a:r>
+            <a:r>
+              <a:rPr kumimoji="0" lang="en-US" altLang="en-US" sz="2400" b="0" i="0" u="none" strike="noStrike" cap="none" normalizeH="0" baseline="0" dirty="0">
+                <a:ln>
+                  <a:noFill/>
+                </a:ln>
+                <a:solidFill>
+                  <a:schemeClr val="tx1"/>
+                </a:solidFill>
+                <a:effectLst/>
+                <a:latin typeface="Menlo"/>
+              </a:rPr>
+              <a:t> class="icon </a:t>
+            </a:r>
+            <a:r>
+              <a:rPr kumimoji="0" lang="en-US" altLang="en-US" sz="2400" b="0" i="0" u="none" strike="noStrike" cap="none" normalizeH="0" baseline="0" dirty="0" err="1">
+                <a:ln>
+                  <a:noFill/>
+                </a:ln>
+                <a:solidFill>
+                  <a:schemeClr val="tx1"/>
+                </a:solidFill>
+                <a:effectLst/>
+                <a:latin typeface="Menlo"/>
+              </a:rPr>
+              <a:t>icon_coffee</a:t>
+            </a:r>
+            <a:r>
+              <a:rPr kumimoji="0" lang="en-US" altLang="en-US" sz="2400" b="0" i="0" u="none" strike="noStrike" cap="none" normalizeH="0" baseline="0" dirty="0">
+                <a:ln>
+                  <a:noFill/>
+                </a:ln>
+                <a:solidFill>
+                  <a:schemeClr val="tx1"/>
+                </a:solidFill>
+                <a:effectLst/>
+                <a:latin typeface="Menlo"/>
+              </a:rPr>
+              <a:t>"&gt;&lt;/</a:t>
+            </a:r>
+            <a:r>
+              <a:rPr kumimoji="0" lang="en-US" altLang="en-US" sz="2400" b="0" i="0" u="none" strike="noStrike" cap="none" normalizeH="0" baseline="0" dirty="0" err="1">
+                <a:ln>
+                  <a:noFill/>
+                </a:ln>
+                <a:solidFill>
+                  <a:schemeClr val="tx1"/>
+                </a:solidFill>
+                <a:effectLst/>
+                <a:latin typeface="Menlo"/>
+              </a:rPr>
+              <a:t>i</a:t>
+            </a:r>
+            <a:r>
+              <a:rPr kumimoji="0" lang="en-US" altLang="en-US" sz="2400" b="0" i="0" u="none" strike="noStrike" cap="none" normalizeH="0" baseline="0" dirty="0">
+                <a:ln>
+                  <a:noFill/>
+                </a:ln>
+                <a:solidFill>
+                  <a:schemeClr val="tx1"/>
+                </a:solidFill>
+                <a:effectLst/>
+                <a:latin typeface="Menlo"/>
+              </a:rPr>
+              <a:t>&gt;</a:t>
+            </a:r>
+            <a:br>
+              <a:rPr kumimoji="0" lang="en-US" altLang="en-US" sz="2400" b="0" i="0" u="none" strike="noStrike" cap="none" normalizeH="0" baseline="0" dirty="0">
+                <a:ln>
+                  <a:noFill/>
+                </a:ln>
+                <a:solidFill>
+                  <a:schemeClr val="tx1"/>
+                </a:solidFill>
+                <a:effectLst/>
+                <a:latin typeface="Menlo"/>
+              </a:rPr>
+            </a:br>
+            <a:r>
+              <a:rPr kumimoji="0" lang="en-US" altLang="en-US" sz="2400" b="0" i="0" u="none" strike="noStrike" cap="none" normalizeH="0" baseline="0" dirty="0">
+                <a:ln>
+                  <a:noFill/>
+                </a:ln>
+                <a:solidFill>
+                  <a:schemeClr val="tx1"/>
+                </a:solidFill>
+                <a:effectLst/>
+                <a:latin typeface="Menlo"/>
+              </a:rPr>
+              <a:t>Hello Jest!</a:t>
+            </a:r>
+            <a:br>
+              <a:rPr kumimoji="0" lang="en-US" altLang="en-US" sz="2400" b="0" i="0" u="none" strike="noStrike" cap="none" normalizeH="0" baseline="0" dirty="0">
+                <a:ln>
+                  <a:noFill/>
+                </a:ln>
+                <a:solidFill>
+                  <a:schemeClr val="tx1"/>
+                </a:solidFill>
+                <a:effectLst/>
+                <a:latin typeface="Menlo"/>
+              </a:rPr>
+            </a:br>
+            <a:r>
+              <a:rPr kumimoji="0" lang="en-US" altLang="en-US" sz="2400" b="0" i="0" u="none" strike="noStrike" cap="none" normalizeH="0" baseline="0" dirty="0">
+                <a:ln>
+                  <a:noFill/>
+                </a:ln>
+                <a:solidFill>
+                  <a:schemeClr val="tx1"/>
+                </a:solidFill>
+                <a:effectLst/>
+                <a:latin typeface="Menlo"/>
+              </a:rPr>
+              <a:t>&lt;/button&gt;</a:t>
+            </a:r>
+            <a:endParaRPr kumimoji="0" lang="ru-RU" altLang="en-US" sz="2400" b="0" i="0" u="none" strike="noStrike" cap="none" normalizeH="0" baseline="0" dirty="0">
+              <a:ln>
+                <a:noFill/>
+              </a:ln>
+              <a:solidFill>
+                <a:schemeClr val="tx1"/>
+              </a:solidFill>
+              <a:effectLst/>
+              <a:latin typeface="Menlo"/>
+            </a:endParaRPr>
+          </a:p>
+          <a:p>
+            <a:pPr marL="0" marR="0" lvl="0" indent="0" algn="l" defTabSz="914400" rtl="0" eaLnBrk="0" fontAlgn="base" latinLnBrk="0" hangingPunct="0">
+              <a:lnSpc>
+                <a:spcPct val="100000"/>
+              </a:lnSpc>
+              <a:spcBef>
+                <a:spcPct val="0"/>
+              </a:spcBef>
+              <a:spcAft>
+                <a:spcPct val="0"/>
+              </a:spcAft>
+              <a:buClrTx/>
+              <a:buSzTx/>
+              <a:buFontTx/>
+              <a:buNone/>
+              <a:tabLst/>
+            </a:pPr>
+            <a:endParaRPr kumimoji="0" lang="en-US" altLang="en-US" sz="2400" b="0" i="0" u="none" strike="noStrike" cap="none" normalizeH="0" baseline="0" dirty="0">
+              <a:ln>
+                <a:noFill/>
+              </a:ln>
+              <a:solidFill>
+                <a:schemeClr val="tx1"/>
+              </a:solidFill>
+              <a:effectLst/>
+            </a:endParaRPr>
+          </a:p>
+          <a:p>
+            <a:pPr marL="0" marR="0" lvl="0" indent="0" algn="l" defTabSz="914400" rtl="0" eaLnBrk="0" fontAlgn="base" latinLnBrk="0" hangingPunct="0">
+              <a:lnSpc>
+                <a:spcPct val="100000"/>
+              </a:lnSpc>
+              <a:spcBef>
+                <a:spcPct val="0"/>
+              </a:spcBef>
+              <a:spcAft>
+                <a:spcPct val="0"/>
+              </a:spcAft>
+              <a:buClrTx/>
+              <a:buSzTx/>
+              <a:buFontTx/>
+              <a:buNone/>
+              <a:tabLst/>
+            </a:pPr>
+            <a:r>
+              <a:rPr kumimoji="0" lang="en-US" altLang="en-US" sz="1500" b="1" i="0" u="none" strike="noStrike" cap="none" normalizeH="0" baseline="0" dirty="0" err="1">
+                <a:ln>
+                  <a:noFill/>
+                </a:ln>
+                <a:solidFill>
+                  <a:schemeClr val="tx1"/>
+                </a:solidFill>
+                <a:effectLst/>
+                <a:latin typeface="medium-content-serif-font"/>
+              </a:rPr>
+              <a:t>Но</a:t>
+            </a:r>
+            <a:r>
+              <a:rPr kumimoji="0" lang="en-US" altLang="en-US" sz="1500" b="1" i="0" u="none" strike="noStrike" cap="none" normalizeH="0" baseline="0" dirty="0">
+                <a:ln>
+                  <a:noFill/>
+                </a:ln>
+                <a:solidFill>
+                  <a:schemeClr val="tx1"/>
+                </a:solidFill>
+                <a:effectLst/>
+                <a:latin typeface="medium-content-serif-font"/>
+              </a:rPr>
+              <a:t> с shallow rendering </a:t>
+            </a:r>
+            <a:r>
+              <a:rPr kumimoji="0" lang="en-US" altLang="en-US" sz="1500" b="1" i="0" u="none" strike="noStrike" cap="none" normalizeH="0" baseline="0" dirty="0" err="1">
+                <a:ln>
+                  <a:noFill/>
+                </a:ln>
+                <a:solidFill>
+                  <a:schemeClr val="tx1"/>
+                </a:solidFill>
+                <a:effectLst/>
+                <a:latin typeface="medium-content-serif-font"/>
+              </a:rPr>
+              <a:t>вот</a:t>
+            </a:r>
+            <a:r>
+              <a:rPr kumimoji="0" lang="en-US" altLang="en-US" sz="1500" b="1" i="0" u="none" strike="noStrike" cap="none" normalizeH="0" baseline="0" dirty="0">
+                <a:ln>
+                  <a:noFill/>
+                </a:ln>
+                <a:solidFill>
+                  <a:schemeClr val="tx1"/>
+                </a:solidFill>
+                <a:effectLst/>
+                <a:latin typeface="medium-content-serif-font"/>
+              </a:rPr>
+              <a:t> </a:t>
+            </a:r>
+            <a:r>
+              <a:rPr kumimoji="0" lang="en-US" altLang="en-US" sz="1500" b="1" i="0" u="none" strike="noStrike" cap="none" normalizeH="0" baseline="0" dirty="0" err="1">
+                <a:ln>
+                  <a:noFill/>
+                </a:ln>
+                <a:solidFill>
+                  <a:schemeClr val="tx1"/>
+                </a:solidFill>
+                <a:effectLst/>
+                <a:latin typeface="medium-content-serif-font"/>
+              </a:rPr>
+              <a:t>так</a:t>
+            </a:r>
+            <a:r>
+              <a:rPr kumimoji="0" lang="en-US" altLang="en-US" sz="1500" b="1" i="0" u="none" strike="noStrike" cap="none" normalizeH="0" baseline="0" dirty="0">
+                <a:ln>
+                  <a:noFill/>
+                </a:ln>
+                <a:solidFill>
+                  <a:schemeClr val="tx1"/>
+                </a:solidFill>
+                <a:effectLst/>
+                <a:latin typeface="medium-content-serif-font"/>
+              </a:rPr>
+              <a:t>:</a:t>
+            </a:r>
+            <a:endParaRPr kumimoji="0" lang="ru-RU" altLang="en-US" sz="1500" b="1" i="0" u="none" strike="noStrike" cap="none" normalizeH="0" baseline="0" dirty="0">
+              <a:ln>
+                <a:noFill/>
+              </a:ln>
+              <a:solidFill>
+                <a:schemeClr val="tx1"/>
+              </a:solidFill>
+              <a:effectLst/>
+              <a:latin typeface="medium-content-serif-font"/>
+            </a:endParaRPr>
+          </a:p>
+          <a:p>
+            <a:pPr marL="0" marR="0" lvl="0" indent="0" algn="l" defTabSz="914400" rtl="0" eaLnBrk="0" fontAlgn="base" latinLnBrk="0" hangingPunct="0">
+              <a:lnSpc>
+                <a:spcPct val="100000"/>
+              </a:lnSpc>
+              <a:spcBef>
+                <a:spcPct val="0"/>
+              </a:spcBef>
+              <a:spcAft>
+                <a:spcPct val="0"/>
+              </a:spcAft>
+              <a:buClrTx/>
+              <a:buSzTx/>
+              <a:buFontTx/>
+              <a:buNone/>
+              <a:tabLst/>
+            </a:pPr>
+            <a:endParaRPr kumimoji="0" lang="en-US" altLang="en-US" sz="1200" b="1" i="0" u="none" strike="noStrike" cap="none" normalizeH="0" baseline="0" dirty="0">
+              <a:ln>
+                <a:noFill/>
+              </a:ln>
+              <a:solidFill>
+                <a:schemeClr val="tx1"/>
+              </a:solidFill>
+              <a:effectLst/>
+              <a:latin typeface="Menlo"/>
+            </a:endParaRPr>
+          </a:p>
+          <a:p>
+            <a:pPr marL="0" marR="0" lvl="0" indent="0" algn="l" defTabSz="914400" rtl="0" eaLnBrk="0" fontAlgn="base" latinLnBrk="0" hangingPunct="0">
+              <a:lnSpc>
+                <a:spcPct val="100000"/>
+              </a:lnSpc>
+              <a:spcBef>
+                <a:spcPct val="0"/>
+              </a:spcBef>
+              <a:spcAft>
+                <a:spcPct val="0"/>
+              </a:spcAft>
+              <a:buClrTx/>
+              <a:buSzTx/>
+              <a:buFontTx/>
+              <a:buNone/>
+              <a:tabLst/>
+            </a:pPr>
+            <a:r>
+              <a:rPr kumimoji="0" lang="en-US" altLang="en-US" sz="2800" b="0" i="0" u="none" strike="noStrike" cap="none" normalizeH="0" baseline="0" dirty="0">
+                <a:ln>
+                  <a:noFill/>
+                </a:ln>
+                <a:solidFill>
+                  <a:schemeClr val="tx1"/>
+                </a:solidFill>
+                <a:effectLst/>
+                <a:latin typeface="Menlo"/>
+              </a:rPr>
+              <a:t>&lt;button&gt;</a:t>
+            </a:r>
+            <a:br>
+              <a:rPr kumimoji="0" lang="en-US" altLang="en-US" sz="2800" b="0" i="0" u="none" strike="noStrike" cap="none" normalizeH="0" baseline="0" dirty="0">
+                <a:ln>
+                  <a:noFill/>
+                </a:ln>
+                <a:solidFill>
+                  <a:schemeClr val="tx1"/>
+                </a:solidFill>
+                <a:effectLst/>
+                <a:latin typeface="Menlo"/>
+              </a:rPr>
+            </a:br>
+            <a:r>
+              <a:rPr kumimoji="0" lang="en-US" altLang="en-US" sz="2800" b="0" i="0" u="none" strike="noStrike" cap="none" normalizeH="0" baseline="0" dirty="0">
+                <a:ln>
+                  <a:noFill/>
+                </a:ln>
+                <a:solidFill>
+                  <a:schemeClr val="tx1"/>
+                </a:solidFill>
+                <a:effectLst/>
+                <a:latin typeface="Menlo"/>
+              </a:rPr>
+              <a:t>&lt;Icon icon="coffee" /&gt;</a:t>
+            </a:r>
+            <a:br>
+              <a:rPr kumimoji="0" lang="en-US" altLang="en-US" sz="2800" b="0" i="0" u="none" strike="noStrike" cap="none" normalizeH="0" baseline="0" dirty="0">
+                <a:ln>
+                  <a:noFill/>
+                </a:ln>
+                <a:solidFill>
+                  <a:schemeClr val="tx1"/>
+                </a:solidFill>
+                <a:effectLst/>
+                <a:latin typeface="Menlo"/>
+              </a:rPr>
+            </a:br>
+            <a:r>
+              <a:rPr kumimoji="0" lang="en-US" altLang="en-US" sz="2800" b="0" i="0" u="none" strike="noStrike" cap="none" normalizeH="0" baseline="0" dirty="0">
+                <a:ln>
+                  <a:noFill/>
+                </a:ln>
+                <a:solidFill>
+                  <a:schemeClr val="tx1"/>
+                </a:solidFill>
+                <a:effectLst/>
+                <a:latin typeface="Menlo"/>
+              </a:rPr>
+              <a:t>Hello Jest!</a:t>
+            </a:r>
+            <a:br>
+              <a:rPr kumimoji="0" lang="en-US" altLang="en-US" sz="2800" b="0" i="0" u="none" strike="noStrike" cap="none" normalizeH="0" baseline="0" dirty="0">
+                <a:ln>
+                  <a:noFill/>
+                </a:ln>
+                <a:solidFill>
+                  <a:schemeClr val="tx1"/>
+                </a:solidFill>
+                <a:effectLst/>
+                <a:latin typeface="Menlo"/>
+              </a:rPr>
+            </a:br>
+            <a:r>
+              <a:rPr kumimoji="0" lang="en-US" altLang="en-US" sz="2800" b="0" i="0" u="none" strike="noStrike" cap="none" normalizeH="0" baseline="0" dirty="0">
+                <a:ln>
+                  <a:noFill/>
+                </a:ln>
+                <a:solidFill>
+                  <a:schemeClr val="tx1"/>
+                </a:solidFill>
+                <a:effectLst/>
+                <a:latin typeface="Menlo"/>
+              </a:rPr>
+              <a:t>&lt;/button&gt;</a:t>
+            </a:r>
+            <a:r>
+              <a:rPr kumimoji="0" lang="en-US" altLang="en-US" sz="2800" b="0" i="0" u="none" strike="noStrike" cap="none" normalizeH="0" baseline="0" dirty="0">
+                <a:ln>
+                  <a:noFill/>
+                </a:ln>
+                <a:solidFill>
+                  <a:schemeClr val="tx1"/>
+                </a:solidFill>
+                <a:effectLst/>
+              </a:rPr>
+              <a:t> </a:t>
+            </a:r>
+          </a:p>
+        </p:txBody>
+      </p:sp>
+    </p:spTree>
+    <p:extLst>
+      <p:ext uri="{BB962C8B-B14F-4D97-AF65-F5344CB8AC3E}">
+        <p14:creationId xmlns:p14="http://schemas.microsoft.com/office/powerpoint/2010/main" val="4074883353"/>
+      </p:ext>
+    </p:extLst>
+  </p:cSld>
+  <p:clrMapOvr>
+    <a:masterClrMapping/>
+  </p:clrMapOvr>
+</p:sld>
+</file>
+
+<file path=ppt/slides/slide15.xml><?xml version="1.0" encoding="utf-8"?>
+<p:sld xmlns:a="http://schemas.openxmlformats.org/drawingml/2006/main" xmlns:r="http://schemas.openxmlformats.org/officeDocument/2006/relationships" xmlns:p="http://schemas.openxmlformats.org/presentationml/2006/main">
+  <p:cSld>
+    <p:spTree>
+      <p:nvGrpSpPr>
+        <p:cNvPr id="1" name=""/>
+        <p:cNvGrpSpPr/>
+        <p:nvPr/>
+      </p:nvGrpSpPr>
+      <p:grpSpPr>
+        <a:xfrm>
+          <a:off x="0" y="0"/>
+          <a:ext cx="0" cy="0"/>
+          <a:chOff x="0" y="0"/>
+          <a:chExt cx="0" cy="0"/>
+        </a:xfrm>
+      </p:grpSpPr>
+      <p:sp>
+        <p:nvSpPr>
+          <p:cNvPr id="2" name="Title 1">
+            <a:extLst>
+              <a:ext uri="{FF2B5EF4-FFF2-40B4-BE49-F238E27FC236}">
+                <a16:creationId xmlns:a16="http://schemas.microsoft.com/office/drawing/2014/main" id="{608C180C-8462-4DA3-8678-908805B09E29}"/>
+              </a:ext>
+            </a:extLst>
+          </p:cNvPr>
+          <p:cNvSpPr>
+            <a:spLocks noGrp="1"/>
+          </p:cNvSpPr>
+          <p:nvPr>
+            <p:ph type="ctrTitle"/>
+          </p:nvPr>
+        </p:nvSpPr>
+        <p:spPr>
+          <a:xfrm>
+            <a:off x="1524000" y="278831"/>
+            <a:ext cx="9144000" cy="869295"/>
+          </a:xfrm>
+        </p:spPr>
+        <p:txBody>
+          <a:bodyPr>
+            <a:normAutofit fontScale="90000"/>
+          </a:bodyPr>
+          <a:lstStyle/>
+          <a:p>
+            <a:r>
+              <a:rPr lang="ru-RU" dirty="0"/>
+              <a:t>Первый тест:</a:t>
+            </a:r>
+            <a:endParaRPr lang="en-US" dirty="0"/>
+          </a:p>
+        </p:txBody>
+      </p:sp>
+      <p:sp>
+        <p:nvSpPr>
+          <p:cNvPr id="3" name="Subtitle 2">
+            <a:extLst>
+              <a:ext uri="{FF2B5EF4-FFF2-40B4-BE49-F238E27FC236}">
+                <a16:creationId xmlns:a16="http://schemas.microsoft.com/office/drawing/2014/main" id="{C11784EF-0E69-49C6-9088-9DDEF83A59DA}"/>
+              </a:ext>
+            </a:extLst>
+          </p:cNvPr>
+          <p:cNvSpPr>
+            <a:spLocks noGrp="1"/>
+          </p:cNvSpPr>
+          <p:nvPr>
+            <p:ph type="subTitle" idx="1"/>
+          </p:nvPr>
+        </p:nvSpPr>
+        <p:spPr>
+          <a:xfrm>
+            <a:off x="1524000" y="1353148"/>
+            <a:ext cx="9144000" cy="5010748"/>
+          </a:xfrm>
+        </p:spPr>
+        <p:txBody>
+          <a:bodyPr>
+            <a:normAutofit fontScale="92500" lnSpcReduction="10000"/>
+          </a:bodyPr>
+          <a:lstStyle/>
+          <a:p>
+            <a:r>
+              <a:rPr lang="en-US" dirty="0"/>
+              <a:t>import React from "react";</a:t>
+            </a:r>
+          </a:p>
+          <a:p>
+            <a:r>
+              <a:rPr lang="en-US" dirty="0"/>
+              <a:t>import Loader from "../</a:t>
+            </a:r>
+            <a:r>
+              <a:rPr lang="en-US" dirty="0" err="1"/>
+              <a:t>src</a:t>
+            </a:r>
+            <a:r>
+              <a:rPr lang="en-US" dirty="0"/>
+              <a:t>/Loader";</a:t>
+            </a:r>
+          </a:p>
+          <a:p>
+            <a:br>
+              <a:rPr lang="en-US" dirty="0"/>
+            </a:br>
+            <a:br>
+              <a:rPr lang="en-US" dirty="0"/>
+            </a:br>
+            <a:r>
+              <a:rPr lang="en-US" dirty="0"/>
+              <a:t>describe("Test Loader component", () =&gt; {</a:t>
+            </a:r>
+          </a:p>
+          <a:p>
+            <a:r>
+              <a:rPr lang="en-US" dirty="0"/>
+              <a:t>    it("should show correctly", () =&gt; {</a:t>
+            </a:r>
+          </a:p>
+          <a:p>
+            <a:r>
+              <a:rPr lang="en-US" dirty="0"/>
+              <a:t>        const wrapper = shallow(&lt;Loader  /&gt;);</a:t>
+            </a:r>
+          </a:p>
+          <a:p>
+            <a:r>
+              <a:rPr lang="en-US" dirty="0"/>
+              <a:t>        expect(</a:t>
+            </a:r>
+            <a:r>
+              <a:rPr lang="en-US" dirty="0" err="1"/>
+              <a:t>wrapper.getElements</a:t>
+            </a:r>
+            <a:r>
+              <a:rPr lang="en-US" dirty="0"/>
+              <a:t>().length).</a:t>
+            </a:r>
+            <a:r>
+              <a:rPr lang="en-US" dirty="0" err="1"/>
+              <a:t>toBe</a:t>
+            </a:r>
+            <a:r>
+              <a:rPr lang="en-US" dirty="0"/>
+              <a:t>(1);</a:t>
+            </a:r>
+          </a:p>
+          <a:p>
+            <a:r>
+              <a:rPr lang="en-US" dirty="0"/>
+              <a:t>        const text = </a:t>
+            </a:r>
+            <a:r>
+              <a:rPr lang="en-US" dirty="0" err="1"/>
+              <a:t>wrapper.text</a:t>
+            </a:r>
+            <a:r>
+              <a:rPr lang="en-US" dirty="0"/>
+              <a:t>();</a:t>
+            </a:r>
+          </a:p>
+          <a:p>
+            <a:r>
+              <a:rPr lang="en-US" dirty="0"/>
+              <a:t>        expect(text).</a:t>
+            </a:r>
+            <a:r>
+              <a:rPr lang="en-US" dirty="0" err="1"/>
+              <a:t>toBe</a:t>
+            </a:r>
+            <a:r>
+              <a:rPr lang="en-US" dirty="0"/>
+              <a:t>("</a:t>
+            </a:r>
+            <a:r>
+              <a:rPr lang="ru-RU" dirty="0"/>
+              <a:t>АААААААААААААААААААААААААААААААААААААААААААААА!!!! ВСЕ ПРОПАЛО!!!!! Т_Т");</a:t>
+            </a:r>
+          </a:p>
+          <a:p>
+            <a:r>
+              <a:rPr lang="ru-RU" dirty="0"/>
+              <a:t>    });</a:t>
+            </a:r>
+          </a:p>
+          <a:p>
+            <a:r>
+              <a:rPr lang="ru-RU" dirty="0"/>
+              <a:t>});</a:t>
+            </a:r>
+          </a:p>
+          <a:p>
+            <a:endParaRPr lang="en-US" dirty="0"/>
+          </a:p>
+        </p:txBody>
+      </p:sp>
+    </p:spTree>
+    <p:extLst>
+      <p:ext uri="{BB962C8B-B14F-4D97-AF65-F5344CB8AC3E}">
+        <p14:creationId xmlns:p14="http://schemas.microsoft.com/office/powerpoint/2010/main" val="4137661995"/>
+      </p:ext>
+    </p:extLst>
+  </p:cSld>
+  <p:clrMapOvr>
+    <a:masterClrMapping/>
+  </p:clrMapOvr>
+</p:sld>
+</file>
+
 <file path=ppt/slides/slide2.xml><?xml version="1.0" encoding="utf-8"?>
+<p:sld xmlns:a="http://schemas.openxmlformats.org/drawingml/2006/main" xmlns:r="http://schemas.openxmlformats.org/officeDocument/2006/relationships" xmlns:p="http://schemas.openxmlformats.org/presentationml/2006/main">
+  <p:cSld>
+    <p:spTree>
+      <p:nvGrpSpPr>
+        <p:cNvPr id="1" name=""/>
+        <p:cNvGrpSpPr/>
+        <p:nvPr/>
+      </p:nvGrpSpPr>
+      <p:grpSpPr>
+        <a:xfrm>
+          <a:off x="0" y="0"/>
+          <a:ext cx="0" cy="0"/>
+          <a:chOff x="0" y="0"/>
+          <a:chExt cx="0" cy="0"/>
+        </a:xfrm>
+      </p:grpSpPr>
+      <p:sp>
+        <p:nvSpPr>
+          <p:cNvPr id="4" name="Rectangle 1">
+            <a:extLst>
+              <a:ext uri="{FF2B5EF4-FFF2-40B4-BE49-F238E27FC236}">
+                <a16:creationId xmlns:a16="http://schemas.microsoft.com/office/drawing/2014/main" id="{6ADD2411-8563-4664-BE85-A98247D1024B}"/>
+              </a:ext>
+            </a:extLst>
+          </p:cNvPr>
+          <p:cNvSpPr>
+            <a:spLocks noGrp="1" noChangeArrowheads="1"/>
+          </p:cNvSpPr>
+          <p:nvPr>
+            <p:ph type="title"/>
+          </p:nvPr>
+        </p:nvSpPr>
+        <p:spPr bwMode="auto">
+          <a:xfrm>
+            <a:off x="838200" y="597020"/>
+            <a:ext cx="4410053" cy="861774"/>
+          </a:xfrm>
+          <a:prstGeom prst="rect">
+            <a:avLst/>
+          </a:prstGeom>
+          <a:noFill/>
+          <a:ln>
+            <a:noFill/>
+          </a:ln>
+          <a:effectLst/>
+          <a:extLst>
+            <a:ext uri="{909E8E84-426E-40DD-AFC4-6F175D3DCCD1}">
+              <a14:hiddenFill xmlns:a14="http://schemas.microsoft.com/office/drawing/2010/main">
+                <a:solidFill>
+                  <a:schemeClr val="accent1"/>
+                </a:solidFill>
+              </a14:hiddenFill>
+            </a:ext>
+            <a:ext uri="{91240B29-F687-4F45-9708-019B960494DF}">
+              <a14:hiddenLine xmlns:a14="http://schemas.microsoft.com/office/drawing/2010/main" w="9525">
+                <a:solidFill>
+                  <a:schemeClr val="tx1"/>
+                </a:solidFill>
+                <a:miter lim="800000"/>
+                <a:headEnd/>
+                <a:tailEnd/>
+              </a14:hiddenLine>
+            </a:ext>
+            <a:ext uri="{AF507438-7753-43E0-B8FC-AC1667EBCBE1}">
+              <a14:hiddenEffects xmlns:a14="http://schemas.microsoft.com/office/drawing/2010/main">
+                <a:effectLst>
+                  <a:outerShdw dist="35921" dir="2700000" algn="ctr" rotWithShape="0">
+                    <a:schemeClr val="bg2"/>
+                  </a:outerShdw>
+                </a:effectLst>
+              </a14:hiddenEffects>
+            </a:ext>
+          </a:extLst>
+        </p:spPr>
+        <p:txBody>
+          <a:bodyPr vert="horz" wrap="none" lIns="0" tIns="0" rIns="0" bIns="0" numCol="1" anchor="ctr" anchorCtr="0" compatLnSpc="1">
+            <a:prstTxWarp prst="textNoShape">
+              <a:avLst/>
+            </a:prstTxWarp>
+            <a:spAutoFit/>
+          </a:bodyPr>
+          <a:lstStyle/>
+          <a:p>
+            <a:pPr marL="0" marR="0" lvl="0" indent="0" algn="l" defTabSz="914400" rtl="0" eaLnBrk="0" fontAlgn="base" latinLnBrk="0" hangingPunct="0">
+              <a:lnSpc>
+                <a:spcPct val="100000"/>
+              </a:lnSpc>
+              <a:spcBef>
+                <a:spcPct val="0"/>
+              </a:spcBef>
+              <a:spcAft>
+                <a:spcPct val="0"/>
+              </a:spcAft>
+              <a:buClrTx/>
+              <a:buSzTx/>
+              <a:buFontTx/>
+              <a:buNone/>
+              <a:tabLst/>
+            </a:pPr>
+            <a:r>
+              <a:rPr lang="ru-RU" altLang="en-US" sz="2800" dirty="0">
+                <a:latin typeface="source-code-pro"/>
+              </a:rPr>
+              <a:t>Корневой узел внутри </a:t>
+            </a:r>
+            <a:r>
+              <a:rPr lang="en-US" altLang="en-US" sz="2800" dirty="0">
+                <a:latin typeface="source-code-pro"/>
+              </a:rPr>
+              <a:t>HTML:</a:t>
+            </a:r>
+            <a:br>
+              <a:rPr lang="en-US" altLang="en-US" sz="2800" dirty="0">
+                <a:solidFill>
+                  <a:srgbClr val="88C6BE"/>
+                </a:solidFill>
+                <a:latin typeface="source-code-pro"/>
+              </a:rPr>
+            </a:br>
+            <a:r>
+              <a:rPr kumimoji="0" lang="en-US" altLang="en-US" sz="2800" b="0" i="0" u="none" strike="noStrike" cap="none" normalizeH="0" baseline="0" dirty="0">
+                <a:ln>
+                  <a:noFill/>
+                </a:ln>
+                <a:solidFill>
+                  <a:srgbClr val="88C6BE"/>
+                </a:solidFill>
+                <a:effectLst/>
+                <a:latin typeface="source-code-pro"/>
+              </a:rPr>
+              <a:t>&lt;</a:t>
+            </a:r>
+            <a:r>
+              <a:rPr kumimoji="0" lang="en-US" altLang="en-US" sz="2800" b="0" i="0" u="none" strike="noStrike" cap="none" normalizeH="0" baseline="0" dirty="0">
+                <a:ln>
+                  <a:noFill/>
+                </a:ln>
+                <a:solidFill>
+                  <a:srgbClr val="FC929E"/>
+                </a:solidFill>
+                <a:effectLst/>
+                <a:latin typeface="source-code-pro"/>
+              </a:rPr>
+              <a:t>div </a:t>
+            </a:r>
+            <a:r>
+              <a:rPr kumimoji="0" lang="en-US" altLang="en-US" sz="2800" b="0" i="0" u="none" strike="noStrike" cap="none" normalizeH="0" baseline="0" dirty="0">
+                <a:ln>
+                  <a:noFill/>
+                </a:ln>
+                <a:solidFill>
+                  <a:srgbClr val="C5A5C5"/>
+                </a:solidFill>
+                <a:effectLst/>
+                <a:latin typeface="source-code-pro"/>
+              </a:rPr>
+              <a:t>id</a:t>
+            </a:r>
+            <a:r>
+              <a:rPr kumimoji="0" lang="en-US" altLang="en-US" sz="2800" b="0" i="0" u="none" strike="noStrike" cap="none" normalizeH="0" baseline="0" dirty="0">
+                <a:ln>
+                  <a:noFill/>
+                </a:ln>
+                <a:solidFill>
+                  <a:srgbClr val="88C6BE"/>
+                </a:solidFill>
+                <a:effectLst/>
+                <a:latin typeface="source-code-pro"/>
+              </a:rPr>
+              <a:t>="</a:t>
+            </a:r>
+            <a:r>
+              <a:rPr kumimoji="0" lang="en-US" altLang="en-US" sz="2800" b="0" i="0" u="none" strike="noStrike" cap="none" normalizeH="0" baseline="0" dirty="0">
+                <a:ln>
+                  <a:noFill/>
+                </a:ln>
+                <a:solidFill>
+                  <a:srgbClr val="8DC891"/>
+                </a:solidFill>
+                <a:effectLst/>
+                <a:latin typeface="source-code-pro"/>
+              </a:rPr>
+              <a:t>root</a:t>
+            </a:r>
+            <a:r>
+              <a:rPr kumimoji="0" lang="en-US" altLang="en-US" sz="2800" b="0" i="0" u="none" strike="noStrike" cap="none" normalizeH="0" baseline="0" dirty="0">
+                <a:ln>
+                  <a:noFill/>
+                </a:ln>
+                <a:solidFill>
+                  <a:srgbClr val="88C6BE"/>
+                </a:solidFill>
+                <a:effectLst/>
+                <a:latin typeface="source-code-pro"/>
+              </a:rPr>
+              <a:t>"&gt;&lt;/</a:t>
+            </a:r>
+            <a:r>
+              <a:rPr kumimoji="0" lang="en-US" altLang="en-US" sz="2800" b="0" i="0" u="none" strike="noStrike" cap="none" normalizeH="0" baseline="0" dirty="0">
+                <a:ln>
+                  <a:noFill/>
+                </a:ln>
+                <a:solidFill>
+                  <a:srgbClr val="FC929E"/>
+                </a:solidFill>
+                <a:effectLst/>
+                <a:latin typeface="source-code-pro"/>
+              </a:rPr>
+              <a:t>div</a:t>
+            </a:r>
+            <a:r>
+              <a:rPr kumimoji="0" lang="en-US" altLang="en-US" sz="2800" b="0" i="0" u="none" strike="noStrike" cap="none" normalizeH="0" baseline="0" dirty="0">
+                <a:ln>
+                  <a:noFill/>
+                </a:ln>
+                <a:solidFill>
+                  <a:srgbClr val="88C6BE"/>
+                </a:solidFill>
+                <a:effectLst/>
+                <a:latin typeface="source-code-pro"/>
+              </a:rPr>
+              <a:t>&gt;</a:t>
+            </a:r>
+            <a:r>
+              <a:rPr kumimoji="0" lang="en-US" altLang="en-US" sz="2800" b="0" i="0" u="none" strike="noStrike" cap="none" normalizeH="0" baseline="0" dirty="0">
+                <a:ln>
+                  <a:noFill/>
+                </a:ln>
+                <a:solidFill>
+                  <a:schemeClr val="tx1"/>
+                </a:solidFill>
+                <a:effectLst/>
+              </a:rPr>
+              <a:t> </a:t>
+            </a:r>
+            <a:endParaRPr kumimoji="0" lang="en-US" altLang="en-US" sz="2800" b="0" i="0" u="none" strike="noStrike" cap="none" normalizeH="0" baseline="0" dirty="0">
+              <a:ln>
+                <a:noFill/>
+              </a:ln>
+              <a:solidFill>
+                <a:schemeClr val="tx1"/>
+              </a:solidFill>
+              <a:effectLst/>
+              <a:latin typeface="Arial" panose="020B0604020202020204" pitchFamily="34" charset="0"/>
+            </a:endParaRPr>
+          </a:p>
+        </p:txBody>
+      </p:sp>
+      <p:sp>
+        <p:nvSpPr>
+          <p:cNvPr id="5" name="Rectangle 2">
+            <a:extLst>
+              <a:ext uri="{FF2B5EF4-FFF2-40B4-BE49-F238E27FC236}">
+                <a16:creationId xmlns:a16="http://schemas.microsoft.com/office/drawing/2014/main" id="{F9CA7B00-7B8C-46BA-9B1F-061D83742CAF}"/>
+              </a:ext>
+            </a:extLst>
+          </p:cNvPr>
+          <p:cNvSpPr>
+            <a:spLocks noGrp="1" noChangeArrowheads="1"/>
+          </p:cNvSpPr>
+          <p:nvPr>
+            <p:ph idx="1"/>
+          </p:nvPr>
+        </p:nvSpPr>
+        <p:spPr bwMode="auto">
+          <a:xfrm>
+            <a:off x="838200" y="3631963"/>
+            <a:ext cx="7972054" cy="738664"/>
+          </a:xfrm>
+          <a:prstGeom prst="rect">
+            <a:avLst/>
+          </a:prstGeom>
+          <a:noFill/>
+          <a:ln>
+            <a:noFill/>
+          </a:ln>
+          <a:effectLst/>
+          <a:extLst>
+            <a:ext uri="{909E8E84-426E-40DD-AFC4-6F175D3DCCD1}">
+              <a14:hiddenFill xmlns:a14="http://schemas.microsoft.com/office/drawing/2010/main">
+                <a:solidFill>
+                  <a:schemeClr val="accent1"/>
+                </a:solidFill>
+              </a14:hiddenFill>
+            </a:ext>
+            <a:ext uri="{91240B29-F687-4F45-9708-019B960494DF}">
+              <a14:hiddenLine xmlns:a14="http://schemas.microsoft.com/office/drawing/2010/main" w="9525">
+                <a:solidFill>
+                  <a:schemeClr val="tx1"/>
+                </a:solidFill>
+                <a:miter lim="800000"/>
+                <a:headEnd/>
+                <a:tailEnd/>
+              </a14:hiddenLine>
+            </a:ext>
+            <a:ext uri="{AF507438-7753-43E0-B8FC-AC1667EBCBE1}">
+              <a14:hiddenEffects xmlns:a14="http://schemas.microsoft.com/office/drawing/2010/main">
+                <a:effectLst>
+                  <a:outerShdw dist="35921" dir="2700000" algn="ctr" rotWithShape="0">
+                    <a:schemeClr val="bg2"/>
+                  </a:outerShdw>
+                </a:effectLst>
+              </a14:hiddenEffects>
+            </a:ext>
+          </a:extLst>
+        </p:spPr>
+        <p:txBody>
+          <a:bodyPr vert="horz" wrap="none" lIns="0" tIns="0" rIns="0" bIns="0" numCol="1" anchor="ctr" anchorCtr="0" compatLnSpc="1">
+            <a:prstTxWarp prst="textNoShape">
+              <a:avLst/>
+            </a:prstTxWarp>
+            <a:spAutoFit/>
+          </a:bodyPr>
+          <a:lstStyle/>
+          <a:p>
+            <a:pPr marL="0" marR="0" lvl="0" indent="0" algn="l" defTabSz="914400" rtl="0" eaLnBrk="0" fontAlgn="base" latinLnBrk="0" hangingPunct="0">
+              <a:lnSpc>
+                <a:spcPct val="100000"/>
+              </a:lnSpc>
+              <a:spcBef>
+                <a:spcPct val="0"/>
+              </a:spcBef>
+              <a:spcAft>
+                <a:spcPct val="0"/>
+              </a:spcAft>
+              <a:buClrTx/>
+              <a:buSzTx/>
+              <a:buFontTx/>
+              <a:buNone/>
+              <a:tabLst/>
+            </a:pPr>
+            <a:r>
+              <a:rPr kumimoji="0" lang="en-US" altLang="en-US" sz="2400" b="0" i="0" u="none" strike="noStrike" cap="none" normalizeH="0" baseline="0" dirty="0">
+                <a:ln>
+                  <a:noFill/>
+                </a:ln>
+                <a:solidFill>
+                  <a:srgbClr val="C5A5C5"/>
+                </a:solidFill>
+                <a:effectLst/>
+                <a:latin typeface="source-code-pro"/>
+              </a:rPr>
+              <a:t>const</a:t>
+            </a:r>
+            <a:r>
+              <a:rPr kumimoji="0" lang="en-US" altLang="en-US" sz="2400" b="0" i="0" u="none" strike="noStrike" cap="none" normalizeH="0" baseline="0" dirty="0">
+                <a:ln>
+                  <a:noFill/>
+                </a:ln>
+                <a:solidFill>
+                  <a:srgbClr val="FFFFFF"/>
+                </a:solidFill>
+                <a:effectLst/>
+                <a:latin typeface="source-code-pro"/>
+              </a:rPr>
+              <a:t> </a:t>
+            </a:r>
+            <a:r>
+              <a:rPr kumimoji="0" lang="en-US" altLang="en-US" sz="2400" b="0" i="0" u="none" strike="noStrike" cap="none" normalizeH="0" baseline="0" dirty="0">
+                <a:ln>
+                  <a:noFill/>
+                </a:ln>
+                <a:effectLst/>
+                <a:latin typeface="source-code-pro"/>
+              </a:rPr>
+              <a:t>element </a:t>
+            </a:r>
+            <a:r>
+              <a:rPr kumimoji="0" lang="en-US" altLang="en-US" sz="2400" b="0" i="0" u="none" strike="noStrike" cap="none" normalizeH="0" baseline="0" dirty="0">
+                <a:ln>
+                  <a:noFill/>
+                </a:ln>
+                <a:solidFill>
+                  <a:srgbClr val="D7DEEA"/>
+                </a:solidFill>
+                <a:effectLst/>
+                <a:latin typeface="source-code-pro"/>
+              </a:rPr>
+              <a:t>=</a:t>
+            </a:r>
+            <a:r>
+              <a:rPr kumimoji="0" lang="en-US" altLang="en-US" sz="2400" b="0" i="0" u="none" strike="noStrike" cap="none" normalizeH="0" baseline="0" dirty="0">
+                <a:ln>
+                  <a:noFill/>
+                </a:ln>
+                <a:solidFill>
+                  <a:srgbClr val="FFFFFF"/>
+                </a:solidFill>
+                <a:effectLst/>
+                <a:latin typeface="source-code-pro"/>
+              </a:rPr>
+              <a:t> </a:t>
+            </a:r>
+            <a:r>
+              <a:rPr kumimoji="0" lang="en-US" altLang="en-US" sz="2400" b="0" i="0" u="none" strike="noStrike" cap="none" normalizeH="0" baseline="0" dirty="0">
+                <a:ln>
+                  <a:noFill/>
+                </a:ln>
+                <a:solidFill>
+                  <a:srgbClr val="88C6BE"/>
+                </a:solidFill>
+                <a:effectLst/>
+                <a:latin typeface="source-code-pro"/>
+              </a:rPr>
+              <a:t>&lt;</a:t>
+            </a:r>
+            <a:r>
+              <a:rPr kumimoji="0" lang="en-US" altLang="en-US" sz="2400" b="0" i="0" u="none" strike="noStrike" cap="none" normalizeH="0" baseline="0" dirty="0">
+                <a:ln>
+                  <a:noFill/>
+                </a:ln>
+                <a:solidFill>
+                  <a:srgbClr val="FC929E"/>
+                </a:solidFill>
+                <a:effectLst/>
+                <a:latin typeface="source-code-pro"/>
+              </a:rPr>
+              <a:t>h1</a:t>
+            </a:r>
+            <a:r>
+              <a:rPr kumimoji="0" lang="en-US" altLang="en-US" sz="2400" b="0" i="0" u="none" strike="noStrike" cap="none" normalizeH="0" baseline="0" dirty="0">
+                <a:ln>
+                  <a:noFill/>
+                </a:ln>
+                <a:solidFill>
+                  <a:srgbClr val="88C6BE"/>
+                </a:solidFill>
+                <a:effectLst/>
+                <a:latin typeface="source-code-pro"/>
+              </a:rPr>
+              <a:t>&gt;</a:t>
+            </a:r>
+            <a:r>
+              <a:rPr kumimoji="0" lang="en-US" altLang="en-US" sz="2400" b="0" i="0" u="none" strike="noStrike" cap="none" normalizeH="0" baseline="0" dirty="0">
+                <a:ln>
+                  <a:noFill/>
+                </a:ln>
+                <a:effectLst/>
+                <a:latin typeface="source-code-pro"/>
+              </a:rPr>
+              <a:t>Hello, world</a:t>
+            </a:r>
+            <a:r>
+              <a:rPr kumimoji="0" lang="en-US" altLang="en-US" sz="2400" b="0" i="0" u="none" strike="noStrike" cap="none" normalizeH="0" baseline="0" dirty="0">
+                <a:ln>
+                  <a:noFill/>
+                </a:ln>
+                <a:solidFill>
+                  <a:srgbClr val="88C6BE"/>
+                </a:solidFill>
+                <a:effectLst/>
+                <a:latin typeface="source-code-pro"/>
+              </a:rPr>
+              <a:t>&lt;/</a:t>
+            </a:r>
+            <a:r>
+              <a:rPr kumimoji="0" lang="en-US" altLang="en-US" sz="2400" b="0" i="0" u="none" strike="noStrike" cap="none" normalizeH="0" baseline="0" dirty="0">
+                <a:ln>
+                  <a:noFill/>
+                </a:ln>
+                <a:solidFill>
+                  <a:srgbClr val="FC929E"/>
+                </a:solidFill>
+                <a:effectLst/>
+                <a:latin typeface="source-code-pro"/>
+              </a:rPr>
+              <a:t>h1</a:t>
+            </a:r>
+            <a:r>
+              <a:rPr kumimoji="0" lang="en-US" altLang="en-US" sz="2400" b="0" i="0" u="none" strike="noStrike" cap="none" normalizeH="0" baseline="0" dirty="0">
+                <a:ln>
+                  <a:noFill/>
+                </a:ln>
+                <a:solidFill>
+                  <a:srgbClr val="88C6BE"/>
+                </a:solidFill>
+                <a:effectLst/>
+                <a:latin typeface="source-code-pro"/>
+              </a:rPr>
+              <a:t>&gt;;</a:t>
+            </a:r>
+            <a:r>
+              <a:rPr kumimoji="0" lang="en-US" altLang="en-US" sz="2400" b="0" i="0" u="none" strike="noStrike" cap="none" normalizeH="0" baseline="0" dirty="0">
+                <a:ln>
+                  <a:noFill/>
+                </a:ln>
+                <a:solidFill>
+                  <a:schemeClr val="accent1"/>
+                </a:solidFill>
+                <a:effectLst/>
+                <a:latin typeface="source-code-pro"/>
+              </a:rPr>
+              <a:t> </a:t>
+            </a:r>
+            <a:endParaRPr kumimoji="0" lang="ru-RU" altLang="en-US" sz="2400" b="0" i="0" u="none" strike="noStrike" cap="none" normalizeH="0" baseline="0" dirty="0">
+              <a:ln>
+                <a:noFill/>
+              </a:ln>
+              <a:solidFill>
+                <a:schemeClr val="accent1"/>
+              </a:solidFill>
+              <a:effectLst/>
+              <a:latin typeface="source-code-pro"/>
+            </a:endParaRPr>
+          </a:p>
+          <a:p>
+            <a:pPr marL="0" marR="0" lvl="0" indent="0" algn="l" defTabSz="914400" rtl="0" eaLnBrk="0" fontAlgn="base" latinLnBrk="0" hangingPunct="0">
+              <a:lnSpc>
+                <a:spcPct val="100000"/>
+              </a:lnSpc>
+              <a:spcBef>
+                <a:spcPct val="0"/>
+              </a:spcBef>
+              <a:spcAft>
+                <a:spcPct val="0"/>
+              </a:spcAft>
+              <a:buClrTx/>
+              <a:buSzTx/>
+              <a:buFontTx/>
+              <a:buNone/>
+              <a:tabLst/>
+            </a:pPr>
+            <a:r>
+              <a:rPr kumimoji="0" lang="en-US" altLang="en-US" sz="2400" b="0" i="0" u="none" strike="noStrike" cap="none" normalizeH="0" baseline="0" dirty="0" err="1">
+                <a:ln>
+                  <a:noFill/>
+                </a:ln>
+                <a:solidFill>
+                  <a:schemeClr val="accent1"/>
+                </a:solidFill>
+                <a:effectLst/>
+                <a:latin typeface="source-code-pro"/>
+              </a:rPr>
+              <a:t>ReactDOM</a:t>
+            </a:r>
+            <a:r>
+              <a:rPr kumimoji="0" lang="en-US" altLang="en-US" sz="2400" b="0" i="0" u="none" strike="noStrike" cap="none" normalizeH="0" baseline="0" dirty="0" err="1">
+                <a:ln>
+                  <a:noFill/>
+                </a:ln>
+                <a:solidFill>
+                  <a:srgbClr val="88C6BE"/>
+                </a:solidFill>
+                <a:effectLst/>
+                <a:latin typeface="source-code-pro"/>
+              </a:rPr>
+              <a:t>.</a:t>
+            </a:r>
+            <a:r>
+              <a:rPr kumimoji="0" lang="en-US" altLang="en-US" sz="2400" b="0" i="0" u="none" strike="noStrike" cap="none" normalizeH="0" baseline="0" dirty="0" err="1">
+                <a:ln>
+                  <a:noFill/>
+                </a:ln>
+                <a:solidFill>
+                  <a:srgbClr val="79B6F2"/>
+                </a:solidFill>
+                <a:effectLst/>
+                <a:latin typeface="source-code-pro"/>
+              </a:rPr>
+              <a:t>render</a:t>
+            </a:r>
+            <a:r>
+              <a:rPr kumimoji="0" lang="en-US" altLang="en-US" sz="2400" b="0" i="0" u="none" strike="noStrike" cap="none" normalizeH="0" baseline="0" dirty="0">
+                <a:ln>
+                  <a:noFill/>
+                </a:ln>
+                <a:solidFill>
+                  <a:srgbClr val="88C6BE"/>
+                </a:solidFill>
+                <a:effectLst/>
+                <a:latin typeface="source-code-pro"/>
+              </a:rPr>
+              <a:t>(</a:t>
+            </a:r>
+            <a:r>
+              <a:rPr kumimoji="0" lang="en-US" altLang="en-US" sz="2400" b="0" i="0" u="none" strike="noStrike" cap="none" normalizeH="0" baseline="0" dirty="0">
+                <a:ln>
+                  <a:noFill/>
+                </a:ln>
+                <a:effectLst/>
+                <a:latin typeface="source-code-pro"/>
+              </a:rPr>
+              <a:t>element, </a:t>
+            </a:r>
+            <a:r>
+              <a:rPr kumimoji="0" lang="en-US" altLang="en-US" sz="2400" b="0" i="0" u="none" strike="noStrike" cap="none" normalizeH="0" baseline="0" dirty="0" err="1">
+                <a:ln>
+                  <a:noFill/>
+                </a:ln>
+                <a:effectLst/>
+                <a:latin typeface="source-code-pro"/>
+              </a:rPr>
+              <a:t>document.getElementById</a:t>
+            </a:r>
+            <a:r>
+              <a:rPr kumimoji="0" lang="en-US" altLang="en-US" sz="2400" b="0" i="0" u="none" strike="noStrike" cap="none" normalizeH="0" baseline="0" dirty="0">
+                <a:ln>
+                  <a:noFill/>
+                </a:ln>
+                <a:solidFill>
+                  <a:srgbClr val="88C6BE"/>
+                </a:solidFill>
+                <a:effectLst/>
+                <a:latin typeface="source-code-pro"/>
+              </a:rPr>
+              <a:t>(</a:t>
+            </a:r>
+            <a:r>
+              <a:rPr kumimoji="0" lang="en-US" altLang="en-US" sz="2400" b="0" i="0" u="none" strike="noStrike" cap="none" normalizeH="0" baseline="0" dirty="0">
+                <a:ln>
+                  <a:noFill/>
+                </a:ln>
+                <a:solidFill>
+                  <a:srgbClr val="8DC891"/>
+                </a:solidFill>
+                <a:effectLst/>
+                <a:latin typeface="source-code-pro"/>
+              </a:rPr>
+              <a:t>'root'</a:t>
+            </a:r>
+            <a:r>
+              <a:rPr kumimoji="0" lang="en-US" altLang="en-US" sz="2400" b="0" i="0" u="none" strike="noStrike" cap="none" normalizeH="0" baseline="0" dirty="0">
+                <a:ln>
+                  <a:noFill/>
+                </a:ln>
+                <a:solidFill>
+                  <a:srgbClr val="88C6BE"/>
+                </a:solidFill>
+                <a:effectLst/>
+                <a:latin typeface="source-code-pro"/>
+              </a:rPr>
+              <a:t>));</a:t>
+            </a:r>
+            <a:r>
+              <a:rPr kumimoji="0" lang="en-US" altLang="en-US" sz="2400" b="0" i="0" u="none" strike="noStrike" cap="none" normalizeH="0" baseline="0" dirty="0">
+                <a:ln>
+                  <a:noFill/>
+                </a:ln>
+                <a:solidFill>
+                  <a:schemeClr val="tx1"/>
+                </a:solidFill>
+                <a:effectLst/>
+              </a:rPr>
+              <a:t> </a:t>
+            </a:r>
+            <a:endParaRPr kumimoji="0" lang="en-US" altLang="en-US" sz="2400" b="0" i="0" u="none" strike="noStrike" cap="none" normalizeH="0" baseline="0" dirty="0">
+              <a:ln>
+                <a:noFill/>
+              </a:ln>
+              <a:solidFill>
+                <a:schemeClr val="tx1"/>
+              </a:solidFill>
+              <a:effectLst/>
+              <a:latin typeface="Arial" panose="020B0604020202020204" pitchFamily="34" charset="0"/>
+            </a:endParaRPr>
+          </a:p>
+        </p:txBody>
+      </p:sp>
+      <p:sp>
+        <p:nvSpPr>
+          <p:cNvPr id="8" name="Rectangle 7">
+            <a:extLst>
+              <a:ext uri="{FF2B5EF4-FFF2-40B4-BE49-F238E27FC236}">
+                <a16:creationId xmlns:a16="http://schemas.microsoft.com/office/drawing/2014/main" id="{7FFAD3BA-CBBC-4FC0-890C-AAF1578F1669}"/>
+              </a:ext>
+            </a:extLst>
+          </p:cNvPr>
+          <p:cNvSpPr/>
+          <p:nvPr/>
+        </p:nvSpPr>
+        <p:spPr>
+          <a:xfrm>
+            <a:off x="649408" y="1656377"/>
+            <a:ext cx="10893183" cy="1569660"/>
+          </a:xfrm>
+          <a:prstGeom prst="rect">
+            <a:avLst/>
+          </a:prstGeom>
+        </p:spPr>
+        <p:txBody>
+          <a:bodyPr wrap="square">
+            <a:spAutoFit/>
+          </a:bodyPr>
+          <a:lstStyle/>
+          <a:p>
+            <a:pPr lvl="0" eaLnBrk="0" fontAlgn="base" hangingPunct="0">
+              <a:spcBef>
+                <a:spcPct val="0"/>
+              </a:spcBef>
+              <a:spcAft>
+                <a:spcPct val="0"/>
+              </a:spcAft>
+            </a:pPr>
+            <a:r>
+              <a:rPr lang="en-US" altLang="en-US" sz="3200" dirty="0" err="1">
+                <a:solidFill>
+                  <a:srgbClr val="000000"/>
+                </a:solidFill>
+                <a:latin typeface="-apple-system"/>
+              </a:rPr>
+              <a:t>Для</a:t>
+            </a:r>
+            <a:r>
+              <a:rPr lang="en-US" altLang="en-US" sz="3200" dirty="0">
+                <a:solidFill>
+                  <a:srgbClr val="000000"/>
+                </a:solidFill>
+                <a:latin typeface="-apple-system"/>
+              </a:rPr>
+              <a:t> </a:t>
+            </a:r>
+            <a:r>
+              <a:rPr lang="en-US" altLang="en-US" sz="3200" dirty="0" err="1">
+                <a:solidFill>
+                  <a:srgbClr val="000000"/>
+                </a:solidFill>
+                <a:latin typeface="-apple-system"/>
+              </a:rPr>
+              <a:t>рендеринга</a:t>
+            </a:r>
+            <a:r>
+              <a:rPr lang="en-US" altLang="en-US" sz="3200" dirty="0">
+                <a:solidFill>
+                  <a:srgbClr val="000000"/>
+                </a:solidFill>
+                <a:latin typeface="-apple-system"/>
+              </a:rPr>
+              <a:t> React-</a:t>
+            </a:r>
+            <a:r>
+              <a:rPr lang="en-US" altLang="en-US" sz="3200" dirty="0" err="1">
+                <a:solidFill>
+                  <a:srgbClr val="000000"/>
+                </a:solidFill>
+                <a:latin typeface="-apple-system"/>
+              </a:rPr>
+              <a:t>элемента</a:t>
+            </a:r>
+            <a:r>
+              <a:rPr lang="en-US" altLang="en-US" sz="3200" dirty="0">
+                <a:solidFill>
+                  <a:srgbClr val="000000"/>
+                </a:solidFill>
+                <a:latin typeface="-apple-system"/>
+              </a:rPr>
+              <a:t> в </a:t>
+            </a:r>
+            <a:r>
+              <a:rPr lang="en-US" altLang="en-US" sz="3200" dirty="0" err="1">
+                <a:solidFill>
+                  <a:srgbClr val="000000"/>
+                </a:solidFill>
+                <a:latin typeface="-apple-system"/>
+              </a:rPr>
+              <a:t>корневой</a:t>
+            </a:r>
+            <a:r>
+              <a:rPr lang="en-US" altLang="en-US" sz="3200" dirty="0">
+                <a:solidFill>
+                  <a:srgbClr val="000000"/>
+                </a:solidFill>
+                <a:latin typeface="-apple-system"/>
+              </a:rPr>
+              <a:t> </a:t>
+            </a:r>
+            <a:r>
+              <a:rPr lang="en-US" altLang="en-US" sz="3200" dirty="0" err="1">
+                <a:solidFill>
+                  <a:srgbClr val="000000"/>
+                </a:solidFill>
+                <a:latin typeface="-apple-system"/>
+              </a:rPr>
+              <a:t>узел</a:t>
+            </a:r>
+            <a:r>
+              <a:rPr lang="en-US" altLang="en-US" sz="3200" dirty="0">
+                <a:solidFill>
+                  <a:srgbClr val="000000"/>
+                </a:solidFill>
+                <a:latin typeface="-apple-system"/>
+              </a:rPr>
+              <a:t> DOM, </a:t>
+            </a:r>
+            <a:r>
+              <a:rPr lang="en-US" altLang="en-US" sz="3200" dirty="0" err="1">
+                <a:solidFill>
+                  <a:srgbClr val="000000"/>
+                </a:solidFill>
+                <a:latin typeface="-apple-system"/>
+              </a:rPr>
+              <a:t>вызовите</a:t>
+            </a:r>
+            <a:r>
+              <a:rPr lang="en-US" altLang="en-US" sz="3200" dirty="0">
+                <a:solidFill>
+                  <a:srgbClr val="000000"/>
+                </a:solidFill>
+                <a:latin typeface="-apple-system"/>
+              </a:rPr>
+              <a:t> </a:t>
+            </a:r>
+            <a:r>
+              <a:rPr lang="en-US" altLang="en-US" sz="3200" dirty="0" err="1">
+                <a:solidFill>
+                  <a:srgbClr val="1A1A1A"/>
+                </a:solidFill>
+                <a:latin typeface="source-code-pro"/>
+              </a:rPr>
+              <a:t>ReactDOM.render</a:t>
+            </a:r>
+            <a:r>
+              <a:rPr lang="en-US" altLang="en-US" sz="3200" dirty="0">
+                <a:solidFill>
+                  <a:srgbClr val="1A1A1A"/>
+                </a:solidFill>
+                <a:latin typeface="source-code-pro"/>
+              </a:rPr>
+              <a:t>()</a:t>
+            </a:r>
+            <a:r>
+              <a:rPr lang="en-US" altLang="en-US" sz="3200" dirty="0">
+                <a:solidFill>
+                  <a:srgbClr val="000000"/>
+                </a:solidFill>
+                <a:latin typeface="-apple-system"/>
+              </a:rPr>
+              <a:t> c </a:t>
+            </a:r>
+            <a:r>
+              <a:rPr lang="ru-RU" altLang="en-US" sz="3200" dirty="0">
+                <a:solidFill>
+                  <a:srgbClr val="000000"/>
+                </a:solidFill>
+                <a:latin typeface="-apple-system"/>
+              </a:rPr>
+              <a:t>двумя аргументами</a:t>
+            </a:r>
+            <a:r>
+              <a:rPr lang="en-US" altLang="en-US" sz="3200" dirty="0">
+                <a:solidFill>
+                  <a:srgbClr val="000000"/>
+                </a:solidFill>
+                <a:latin typeface="-apple-system"/>
+              </a:rPr>
+              <a:t>:</a:t>
+            </a:r>
+          </a:p>
+          <a:p>
+            <a:pPr lvl="0" eaLnBrk="0" fontAlgn="base" hangingPunct="0">
+              <a:spcBef>
+                <a:spcPct val="0"/>
+              </a:spcBef>
+              <a:spcAft>
+                <a:spcPct val="0"/>
+              </a:spcAft>
+            </a:pPr>
+            <a:r>
+              <a:rPr lang="en-US" altLang="en-US" sz="3200" dirty="0">
+                <a:solidFill>
+                  <a:srgbClr val="000000"/>
+                </a:solidFill>
+                <a:latin typeface="-apple-system"/>
+              </a:rPr>
+              <a:t>React-</a:t>
+            </a:r>
+            <a:r>
+              <a:rPr lang="en-US" altLang="en-US" sz="3200" dirty="0" err="1">
+                <a:solidFill>
+                  <a:srgbClr val="000000"/>
+                </a:solidFill>
+                <a:latin typeface="-apple-system"/>
+              </a:rPr>
+              <a:t>элементом</a:t>
+            </a:r>
+            <a:r>
+              <a:rPr lang="en-US" altLang="en-US" sz="3200" dirty="0">
+                <a:solidFill>
+                  <a:srgbClr val="000000"/>
+                </a:solidFill>
+                <a:latin typeface="-apple-system"/>
+              </a:rPr>
+              <a:t> и </a:t>
+            </a:r>
+            <a:r>
+              <a:rPr lang="en-US" altLang="en-US" sz="3200" dirty="0" err="1">
+                <a:solidFill>
+                  <a:srgbClr val="000000"/>
+                </a:solidFill>
+                <a:latin typeface="-apple-system"/>
+              </a:rPr>
+              <a:t>корневым</a:t>
+            </a:r>
+            <a:r>
+              <a:rPr lang="en-US" altLang="en-US" sz="3200" dirty="0">
+                <a:solidFill>
+                  <a:srgbClr val="000000"/>
+                </a:solidFill>
+                <a:latin typeface="-apple-system"/>
+              </a:rPr>
+              <a:t> DOM.</a:t>
+            </a:r>
+            <a:endParaRPr lang="en-US" altLang="en-US" sz="3200" dirty="0"/>
+          </a:p>
+        </p:txBody>
+      </p:sp>
+    </p:spTree>
+    <p:extLst>
+      <p:ext uri="{BB962C8B-B14F-4D97-AF65-F5344CB8AC3E}">
+        <p14:creationId xmlns:p14="http://schemas.microsoft.com/office/powerpoint/2010/main" val="3516962384"/>
+      </p:ext>
+    </p:extLst>
+  </p:cSld>
+  <p:clrMapOvr>
+    <a:masterClrMapping/>
+  </p:clrMapOvr>
+</p:sld>
+</file>
+
+<file path=ppt/slides/slide3.xml><?xml version="1.0" encoding="utf-8"?>
 <p:sld xmlns:a="http://schemas.openxmlformats.org/drawingml/2006/main" xmlns:r="http://schemas.openxmlformats.org/officeDocument/2006/relationships" xmlns:p="http://schemas.openxmlformats.org/presentationml/2006/main">
   <p:cSld>
     <p:spTree>
@@ -4977,7 +7272,7 @@
 </p:sld>
 </file>
 
-<file path=ppt/slides/slide3.xml><?xml version="1.0" encoding="utf-8"?>
+<file path=ppt/slides/slide4.xml><?xml version="1.0" encoding="utf-8"?>
 <p:sld xmlns:a="http://schemas.openxmlformats.org/drawingml/2006/main" xmlns:r="http://schemas.openxmlformats.org/officeDocument/2006/relationships" xmlns:p="http://schemas.openxmlformats.org/presentationml/2006/main">
   <p:cSld>
     <p:spTree>
@@ -5684,7 +7979,7 @@
 </p:sld>
 </file>
 
-<file path=ppt/slides/slide4.xml><?xml version="1.0" encoding="utf-8"?>
+<file path=ppt/slides/slide5.xml><?xml version="1.0" encoding="utf-8"?>
 <p:sld xmlns:a="http://schemas.openxmlformats.org/drawingml/2006/main" xmlns:r="http://schemas.openxmlformats.org/officeDocument/2006/relationships" xmlns:p="http://schemas.openxmlformats.org/presentationml/2006/main">
   <p:cSld>
     <p:spTree>
@@ -5841,7 +8136,7 @@
 </p:sld>
 </file>
 
-<file path=ppt/slides/slide5.xml><?xml version="1.0" encoding="utf-8"?>
+<file path=ppt/slides/slide6.xml><?xml version="1.0" encoding="utf-8"?>
 <p:sld xmlns:a="http://schemas.openxmlformats.org/drawingml/2006/main" xmlns:r="http://schemas.openxmlformats.org/officeDocument/2006/relationships" xmlns:p="http://schemas.openxmlformats.org/presentationml/2006/main">
   <p:cSld>
     <p:spTree>
@@ -5918,7 +8213,7 @@
 </p:sld>
 </file>
 
-<file path=ppt/slides/slide6.xml><?xml version="1.0" encoding="utf-8"?>
+<file path=ppt/slides/slide7.xml><?xml version="1.0" encoding="utf-8"?>
 <p:sld xmlns:a="http://schemas.openxmlformats.org/drawingml/2006/main" xmlns:r="http://schemas.openxmlformats.org/officeDocument/2006/relationships" xmlns:p="http://schemas.openxmlformats.org/presentationml/2006/main">
   <p:cSld>
     <p:spTree>
@@ -6324,7 +8619,7 @@
 </p:sld>
 </file>
 
-<file path=ppt/slides/slide7.xml><?xml version="1.0" encoding="utf-8"?>
+<file path=ppt/slides/slide8.xml><?xml version="1.0" encoding="utf-8"?>
 <p:sld xmlns:a="http://schemas.openxmlformats.org/drawingml/2006/main" xmlns:r="http://schemas.openxmlformats.org/officeDocument/2006/relationships" xmlns:p="http://schemas.openxmlformats.org/presentationml/2006/main">
   <p:cSld>
     <p:spTree>
@@ -7197,7 +9492,7 @@
 </p:sld>
 </file>
 
-<file path=ppt/slides/slide8.xml><?xml version="1.0" encoding="utf-8"?>
+<file path=ppt/slides/slide9.xml><?xml version="1.0" encoding="utf-8"?>
 <p:sld xmlns:a="http://schemas.openxmlformats.org/drawingml/2006/main" xmlns:r="http://schemas.openxmlformats.org/officeDocument/2006/relationships" xmlns:p="http://schemas.openxmlformats.org/presentationml/2006/main">
   <p:cSld>
     <p:spTree>
@@ -7936,7 +10231,7 @@
                 <a:ea typeface="Calibri" panose="020F0502020204030204" pitchFamily="34" charset="0"/>
                 <a:cs typeface="Segoe UI" panose="020B0502040204020203" pitchFamily="34" charset="0"/>
               </a:rPr>
-              <a:t> использовать второй вариант вызова</a:t>
+              <a:t>использовать второй вариант вызова</a:t>
             </a:r>
             <a:r>
               <a:rPr kumimoji="0" lang="en-US" altLang="en-US" sz="2800" b="0" i="0" u="none" strike="noStrike" cap="none" normalizeH="0" baseline="0" dirty="0">
@@ -8132,308 +10427,6 @@
     <p:extLst>
       <p:ext uri="{BB962C8B-B14F-4D97-AF65-F5344CB8AC3E}">
         <p14:creationId xmlns:p14="http://schemas.microsoft.com/office/powerpoint/2010/main" val="3093917897"/>
-      </p:ext>
-    </p:extLst>
-  </p:cSld>
-  <p:clrMapOvr>
-    <a:masterClrMapping/>
-  </p:clrMapOvr>
-</p:sld>
-</file>
-
-<file path=ppt/slides/slide9.xml><?xml version="1.0" encoding="utf-8"?>
-<p:sld xmlns:a="http://schemas.openxmlformats.org/drawingml/2006/main" xmlns:r="http://schemas.openxmlformats.org/officeDocument/2006/relationships" xmlns:p="http://schemas.openxmlformats.org/presentationml/2006/main">
-  <p:cSld>
-    <p:spTree>
-      <p:nvGrpSpPr>
-        <p:cNvPr id="1" name=""/>
-        <p:cNvGrpSpPr/>
-        <p:nvPr/>
-      </p:nvGrpSpPr>
-      <p:grpSpPr>
-        <a:xfrm>
-          <a:off x="0" y="0"/>
-          <a:ext cx="0" cy="0"/>
-          <a:chOff x="0" y="0"/>
-          <a:chExt cx="0" cy="0"/>
-        </a:xfrm>
-      </p:grpSpPr>
-      <p:sp>
-        <p:nvSpPr>
-          <p:cNvPr id="2" name="Title 1">
-            <a:extLst>
-              <a:ext uri="{FF2B5EF4-FFF2-40B4-BE49-F238E27FC236}">
-                <a16:creationId xmlns:a16="http://schemas.microsoft.com/office/drawing/2014/main" id="{C63A1C02-C59C-4517-AB59-BFD9646B176E}"/>
-              </a:ext>
-            </a:extLst>
-          </p:cNvPr>
-          <p:cNvSpPr>
-            <a:spLocks noGrp="1"/>
-          </p:cNvSpPr>
-          <p:nvPr>
-            <p:ph type="title"/>
-          </p:nvPr>
-        </p:nvSpPr>
-        <p:spPr/>
-        <p:txBody>
-          <a:bodyPr>
-            <a:normAutofit fontScale="90000"/>
-          </a:bodyPr>
-          <a:lstStyle/>
-          <a:p>
-            <a:r>
-              <a:rPr lang="ru-RU" sz="3600" dirty="0"/>
-              <a:t>Есть три варианта как передать обработчик событий, чтобы у нас был доступ к текущему элементу</a:t>
-            </a:r>
-            <a:br>
-              <a:rPr lang="en-US" dirty="0"/>
-            </a:br>
-            <a:endParaRPr lang="en-US" dirty="0"/>
-          </a:p>
-        </p:txBody>
-      </p:sp>
-      <p:sp>
-        <p:nvSpPr>
-          <p:cNvPr id="3" name="Content Placeholder 2">
-            <a:extLst>
-              <a:ext uri="{FF2B5EF4-FFF2-40B4-BE49-F238E27FC236}">
-                <a16:creationId xmlns:a16="http://schemas.microsoft.com/office/drawing/2014/main" id="{AF0FF26A-6D34-4E52-BDEE-7EFB882C493F}"/>
-              </a:ext>
-            </a:extLst>
-          </p:cNvPr>
-          <p:cNvSpPr>
-            <a:spLocks noGrp="1"/>
-          </p:cNvSpPr>
-          <p:nvPr>
-            <p:ph idx="1"/>
-          </p:nvPr>
-        </p:nvSpPr>
-        <p:spPr/>
-        <p:txBody>
-          <a:bodyPr>
-            <a:normAutofit/>
-          </a:bodyPr>
-          <a:lstStyle/>
-          <a:p>
-            <a:pPr marL="514350" indent="-514350">
-              <a:buAutoNum type="arabicPeriod"/>
-            </a:pPr>
-            <a:r>
-              <a:rPr lang="en-US" dirty="0"/>
-              <a:t>Bind </a:t>
-            </a:r>
-            <a:r>
-              <a:rPr lang="ru-RU" dirty="0"/>
-              <a:t>в конструкторе.</a:t>
-            </a:r>
-          </a:p>
-          <a:p>
-            <a:pPr marL="0" indent="0">
-              <a:buNone/>
-            </a:pPr>
-            <a:r>
-              <a:rPr lang="ru-RU" dirty="0"/>
-              <a:t> </a:t>
-            </a:r>
-            <a:r>
-              <a:rPr lang="en-US" dirty="0" err="1"/>
-              <a:t>this.addNew</a:t>
-            </a:r>
-            <a:r>
-              <a:rPr lang="en-US" dirty="0"/>
-              <a:t> = </a:t>
-            </a:r>
-            <a:r>
-              <a:rPr lang="en-US" dirty="0" err="1"/>
-              <a:t>this.addNew.bind</a:t>
-            </a:r>
-            <a:r>
-              <a:rPr lang="en-US" dirty="0"/>
-              <a:t>(this);</a:t>
-            </a:r>
-          </a:p>
-          <a:p>
-            <a:pPr marL="0" indent="0">
-              <a:buNone/>
-            </a:pPr>
-            <a:r>
-              <a:rPr lang="en-US" dirty="0" err="1"/>
-              <a:t>onClick</a:t>
-            </a:r>
-            <a:r>
-              <a:rPr lang="en-US" dirty="0"/>
-              <a:t>={</a:t>
-            </a:r>
-            <a:r>
-              <a:rPr lang="en-US" dirty="0" err="1"/>
-              <a:t>this.addNew</a:t>
-            </a:r>
-            <a:r>
-              <a:rPr lang="en-US" dirty="0"/>
-              <a:t>}</a:t>
-            </a:r>
-            <a:endParaRPr lang="ru-RU" dirty="0"/>
-          </a:p>
-          <a:p>
-            <a:pPr marL="0" indent="0">
-              <a:buNone/>
-            </a:pPr>
-            <a:r>
-              <a:rPr lang="ru-RU" dirty="0"/>
-              <a:t>2. </a:t>
-            </a:r>
-            <a:r>
-              <a:rPr lang="ru-RU" u="sng" dirty="0"/>
-              <a:t>С</a:t>
-            </a:r>
-            <a:r>
-              <a:rPr lang="ru-RU" u="sng" dirty="0">
-                <a:hlinkClick r:id="rId2"/>
-              </a:rPr>
-              <a:t>трелочные функции</a:t>
-            </a:r>
-            <a:r>
-              <a:rPr lang="en-US" dirty="0"/>
-              <a:t> </a:t>
-            </a:r>
-            <a:r>
-              <a:rPr lang="ru-RU" dirty="0"/>
-              <a:t>в</a:t>
-            </a:r>
-            <a:r>
-              <a:rPr lang="en-US" dirty="0"/>
-              <a:t> </a:t>
-            </a:r>
-            <a:r>
-              <a:rPr lang="ru-RU" dirty="0" err="1"/>
-              <a:t>колбэке</a:t>
-            </a:r>
-            <a:r>
-              <a:rPr lang="ru-RU" dirty="0"/>
-              <a:t>.</a:t>
-            </a:r>
-          </a:p>
-          <a:p>
-            <a:pPr marL="0" indent="0">
-              <a:buNone/>
-            </a:pPr>
-            <a:r>
-              <a:rPr lang="en-US" dirty="0"/>
-              <a:t>&lt;li </a:t>
-            </a:r>
-            <a:r>
-              <a:rPr lang="en-US" dirty="0" err="1"/>
-              <a:t>onClick</a:t>
-            </a:r>
-            <a:r>
-              <a:rPr lang="en-US" dirty="0"/>
-              <a:t>={() =&gt; </a:t>
-            </a:r>
-            <a:r>
-              <a:rPr lang="en-US" dirty="0" err="1"/>
-              <a:t>this.addNew</a:t>
-            </a:r>
-            <a:r>
-              <a:rPr lang="en-US" dirty="0"/>
-              <a:t>()}&gt;</a:t>
-            </a:r>
-            <a:r>
-              <a:rPr lang="ru-RU" dirty="0"/>
-              <a:t>Добавить&lt;/</a:t>
-            </a:r>
-            <a:r>
-              <a:rPr lang="en-US" dirty="0"/>
-              <a:t>li&gt;</a:t>
-            </a:r>
-            <a:endParaRPr lang="ru-RU" dirty="0"/>
-          </a:p>
-          <a:p>
-            <a:pPr marL="0" indent="0">
-              <a:buNone/>
-            </a:pPr>
-            <a:r>
-              <a:rPr lang="ru-RU" dirty="0"/>
-              <a:t>3.С</a:t>
-            </a:r>
-            <a:r>
-              <a:rPr lang="ru-RU" dirty="0">
-                <a:hlinkClick r:id="rId3"/>
-              </a:rPr>
-              <a:t>интаксисом общедоступных полей классов</a:t>
-            </a:r>
-            <a:r>
-              <a:rPr lang="ru-RU" dirty="0"/>
-              <a:t> (эксперимент.)</a:t>
-            </a:r>
-          </a:p>
-          <a:p>
-            <a:pPr marL="0" indent="0">
-              <a:buNone/>
-            </a:pPr>
-            <a:r>
-              <a:rPr lang="en-US" dirty="0" err="1"/>
-              <a:t>addNew</a:t>
-            </a:r>
-            <a:r>
-              <a:rPr lang="en-US" dirty="0"/>
-              <a:t> = () =&gt; {   </a:t>
-            </a:r>
-            <a:r>
-              <a:rPr lang="ru-RU" dirty="0"/>
-              <a:t>…</a:t>
-            </a:r>
-            <a:r>
-              <a:rPr lang="en-US" dirty="0"/>
-              <a:t>  }</a:t>
-            </a:r>
-            <a:endParaRPr lang="ru-RU" dirty="0"/>
-          </a:p>
-          <a:p>
-            <a:pPr marL="0" indent="0">
-              <a:buNone/>
-            </a:pPr>
-            <a:r>
-              <a:rPr lang="en-US" dirty="0" err="1"/>
-              <a:t>onClick</a:t>
-            </a:r>
-            <a:r>
-              <a:rPr lang="en-US" dirty="0"/>
-              <a:t>={</a:t>
-            </a:r>
-            <a:r>
-              <a:rPr lang="en-US" dirty="0" err="1"/>
-              <a:t>this.addNew</a:t>
-            </a:r>
-            <a:r>
-              <a:rPr lang="en-US" dirty="0"/>
-              <a:t>}</a:t>
-            </a:r>
-            <a:endParaRPr lang="ru-RU" dirty="0"/>
-          </a:p>
-          <a:p>
-            <a:pPr marL="0" indent="0">
-              <a:buNone/>
-            </a:pPr>
-            <a:endParaRPr lang="en-US" dirty="0"/>
-          </a:p>
-          <a:p>
-            <a:pPr marL="0" indent="0">
-              <a:buNone/>
-            </a:pPr>
-            <a:endParaRPr lang="en-US" dirty="0"/>
-          </a:p>
-          <a:p>
-            <a:pPr marL="0" indent="0">
-              <a:buNone/>
-            </a:pPr>
-            <a:endParaRPr lang="en-US" dirty="0"/>
-          </a:p>
-        </p:txBody>
-      </p:sp>
-    </p:spTree>
-    <p:extLst>
-      <p:ext uri="{BB962C8B-B14F-4D97-AF65-F5344CB8AC3E}">
-        <p14:creationId xmlns:p14="http://schemas.microsoft.com/office/powerpoint/2010/main" val="3565448551"/>
       </p:ext>
     </p:extLst>
   </p:cSld>

</xml_diff>

<commit_message>
How To and slides
</commit_message>
<xml_diff>
--- a/React.pptx
+++ b/React.pptx
@@ -18,8 +18,10 @@
     <p:sldId id="265" r:id="rId12"/>
     <p:sldId id="267" r:id="rId13"/>
     <p:sldId id="268" r:id="rId14"/>
-    <p:sldId id="271" r:id="rId15"/>
-    <p:sldId id="269" r:id="rId16"/>
+    <p:sldId id="272" r:id="rId15"/>
+    <p:sldId id="273" r:id="rId16"/>
+    <p:sldId id="271" r:id="rId17"/>
+    <p:sldId id="269" r:id="rId18"/>
   </p:sldIdLst>
   <p:sldSz cx="12192000" cy="6858000"/>
   <p:notesSz cx="6858000" cy="9144000"/>
@@ -4588,6 +4590,1291 @@
       </p:grpSpPr>
       <p:sp>
         <p:nvSpPr>
+          <p:cNvPr id="2" name="Title 1">
+            <a:extLst>
+              <a:ext uri="{FF2B5EF4-FFF2-40B4-BE49-F238E27FC236}">
+                <a16:creationId xmlns:a16="http://schemas.microsoft.com/office/drawing/2014/main" id="{D42BCB3B-EA05-46D2-BAB1-C1D6176DF032}"/>
+              </a:ext>
+            </a:extLst>
+          </p:cNvPr>
+          <p:cNvSpPr>
+            <a:spLocks noGrp="1"/>
+          </p:cNvSpPr>
+          <p:nvPr>
+            <p:ph type="ctrTitle"/>
+          </p:nvPr>
+        </p:nvSpPr>
+        <p:spPr>
+          <a:xfrm>
+            <a:off x="1524000" y="540361"/>
+            <a:ext cx="9144000" cy="1155577"/>
+          </a:xfrm>
+        </p:spPr>
+        <p:txBody>
+          <a:bodyPr>
+            <a:normAutofit fontScale="90000"/>
+          </a:bodyPr>
+          <a:lstStyle/>
+          <a:p>
+            <a:br>
+              <a:rPr lang="en-US" dirty="0"/>
+            </a:br>
+            <a:endParaRPr lang="en-US" dirty="0"/>
+          </a:p>
+        </p:txBody>
+      </p:sp>
+      <p:sp>
+        <p:nvSpPr>
+          <p:cNvPr id="4" name="Rectangle 3">
+            <a:extLst>
+              <a:ext uri="{FF2B5EF4-FFF2-40B4-BE49-F238E27FC236}">
+                <a16:creationId xmlns:a16="http://schemas.microsoft.com/office/drawing/2014/main" id="{D8819348-E597-4C66-9B1A-9875DC228B9E}"/>
+              </a:ext>
+            </a:extLst>
+          </p:cNvPr>
+          <p:cNvSpPr/>
+          <p:nvPr/>
+        </p:nvSpPr>
+        <p:spPr>
+          <a:xfrm>
+            <a:off x="1524000" y="540361"/>
+            <a:ext cx="9144000" cy="461665"/>
+          </a:xfrm>
+          <a:prstGeom prst="rect">
+            <a:avLst/>
+          </a:prstGeom>
+        </p:spPr>
+        <p:txBody>
+          <a:bodyPr wrap="square">
+            <a:spAutoFit/>
+          </a:bodyPr>
+          <a:lstStyle/>
+          <a:p>
+            <a:r>
+              <a:rPr lang="ru-RU" sz="2400" b="1" dirty="0"/>
+              <a:t>Фрагменты</a:t>
+            </a:r>
+            <a:endParaRPr lang="en-US" sz="2400" dirty="0"/>
+          </a:p>
+        </p:txBody>
+      </p:sp>
+      <p:sp>
+        <p:nvSpPr>
+          <p:cNvPr id="6" name="Rectangle 2">
+            <a:extLst>
+              <a:ext uri="{FF2B5EF4-FFF2-40B4-BE49-F238E27FC236}">
+                <a16:creationId xmlns:a16="http://schemas.microsoft.com/office/drawing/2014/main" id="{CD3F43F9-FE0D-4D4E-B700-4B065B778B57}"/>
+              </a:ext>
+            </a:extLst>
+          </p:cNvPr>
+          <p:cNvSpPr>
+            <a:spLocks noGrp="1" noChangeArrowheads="1"/>
+          </p:cNvSpPr>
+          <p:nvPr>
+            <p:ph type="subTitle" idx="1"/>
+          </p:nvPr>
+        </p:nvSpPr>
+        <p:spPr bwMode="auto">
+          <a:xfrm>
+            <a:off x="1524000" y="1222101"/>
+            <a:ext cx="4931158" cy="4524315"/>
+          </a:xfrm>
+          <a:prstGeom prst="rect">
+            <a:avLst/>
+          </a:prstGeom>
+          <a:noFill/>
+          <a:ln>
+            <a:noFill/>
+          </a:ln>
+          <a:effectLst/>
+          <a:extLst>
+            <a:ext uri="{909E8E84-426E-40DD-AFC4-6F175D3DCCD1}">
+              <a14:hiddenFill xmlns:a14="http://schemas.microsoft.com/office/drawing/2010/main">
+                <a:solidFill>
+                  <a:schemeClr val="accent1"/>
+                </a:solidFill>
+              </a14:hiddenFill>
+            </a:ext>
+            <a:ext uri="{91240B29-F687-4F45-9708-019B960494DF}">
+              <a14:hiddenLine xmlns:a14="http://schemas.microsoft.com/office/drawing/2010/main" w="9525">
+                <a:solidFill>
+                  <a:schemeClr val="tx1"/>
+                </a:solidFill>
+                <a:miter lim="800000"/>
+                <a:headEnd/>
+                <a:tailEnd/>
+              </a14:hiddenLine>
+            </a:ext>
+            <a:ext uri="{AF507438-7753-43E0-B8FC-AC1667EBCBE1}">
+              <a14:hiddenEffects xmlns:a14="http://schemas.microsoft.com/office/drawing/2010/main">
+                <a:effectLst>
+                  <a:outerShdw dist="35921" dir="2700000" algn="ctr" rotWithShape="0">
+                    <a:schemeClr val="bg2"/>
+                  </a:outerShdw>
+                </a:effectLst>
+              </a14:hiddenEffects>
+            </a:ext>
+          </a:extLst>
+        </p:spPr>
+        <p:txBody>
+          <a:bodyPr vert="horz" wrap="none" lIns="91440" tIns="45720" rIns="91440" bIns="45720" numCol="1" anchor="ctr" anchorCtr="0" compatLnSpc="1">
+            <a:prstTxWarp prst="textNoShape">
+              <a:avLst/>
+            </a:prstTxWarp>
+            <a:spAutoFit/>
+          </a:bodyPr>
+          <a:lstStyle/>
+          <a:p>
+            <a:pPr marL="0" marR="0" lvl="0" indent="0" algn="l" defTabSz="914400" rtl="0" eaLnBrk="0" fontAlgn="base" latinLnBrk="0" hangingPunct="0">
+              <a:lnSpc>
+                <a:spcPct val="100000"/>
+              </a:lnSpc>
+              <a:spcBef>
+                <a:spcPct val="0"/>
+              </a:spcBef>
+              <a:spcAft>
+                <a:spcPct val="0"/>
+              </a:spcAft>
+              <a:buClrTx/>
+              <a:buSzTx/>
+              <a:buFontTx/>
+              <a:buNone/>
+              <a:tabLst/>
+            </a:pPr>
+            <a:r>
+              <a:rPr kumimoji="0" lang="en-US" altLang="en-US" sz="3200" b="0" i="0" u="none" strike="noStrike" cap="none" normalizeH="0" baseline="0" dirty="0">
+                <a:ln>
+                  <a:noFill/>
+                </a:ln>
+                <a:solidFill>
+                  <a:srgbClr val="79B6F2"/>
+                </a:solidFill>
+                <a:effectLst/>
+                <a:latin typeface="Consolas" panose="020B0609020204030204" pitchFamily="49" charset="0"/>
+                <a:ea typeface="Calibri" panose="020F0502020204030204" pitchFamily="34" charset="0"/>
+                <a:cs typeface="Times New Roman" panose="02020603050405020304" pitchFamily="18" charset="0"/>
+              </a:rPr>
+              <a:t>render</a:t>
+            </a:r>
+            <a:r>
+              <a:rPr kumimoji="0" lang="en-US" altLang="en-US" sz="3200" b="0" i="0" u="none" strike="noStrike" cap="none" normalizeH="0" baseline="0" dirty="0">
+                <a:ln>
+                  <a:noFill/>
+                </a:ln>
+                <a:solidFill>
+                  <a:srgbClr val="88C6BE"/>
+                </a:solidFill>
+                <a:effectLst/>
+                <a:latin typeface="Consolas" panose="020B0609020204030204" pitchFamily="49" charset="0"/>
+                <a:ea typeface="Calibri" panose="020F0502020204030204" pitchFamily="34" charset="0"/>
+                <a:cs typeface="Times New Roman" panose="02020603050405020304" pitchFamily="18" charset="0"/>
+              </a:rPr>
+              <a:t>()</a:t>
+            </a:r>
+            <a:r>
+              <a:rPr kumimoji="0" lang="en-US" altLang="en-US" sz="3200" b="0" i="0" u="none" strike="noStrike" cap="none" normalizeH="0" baseline="0" dirty="0">
+                <a:ln>
+                  <a:noFill/>
+                </a:ln>
+                <a:solidFill>
+                  <a:srgbClr val="FFFFFF"/>
+                </a:solidFill>
+                <a:effectLst/>
+                <a:latin typeface="Consolas" panose="020B0609020204030204" pitchFamily="49" charset="0"/>
+                <a:ea typeface="Calibri" panose="020F0502020204030204" pitchFamily="34" charset="0"/>
+                <a:cs typeface="Courier New" panose="02070309020205020404" pitchFamily="49" charset="0"/>
+              </a:rPr>
+              <a:t> </a:t>
+            </a:r>
+            <a:r>
+              <a:rPr kumimoji="0" lang="en-US" altLang="en-US" sz="3200" b="0" i="0" u="none" strike="noStrike" cap="none" normalizeH="0" baseline="0" dirty="0">
+                <a:ln>
+                  <a:noFill/>
+                </a:ln>
+                <a:solidFill>
+                  <a:srgbClr val="88C6BE"/>
+                </a:solidFill>
+                <a:effectLst/>
+                <a:latin typeface="Consolas" panose="020B0609020204030204" pitchFamily="49" charset="0"/>
+                <a:ea typeface="Calibri" panose="020F0502020204030204" pitchFamily="34" charset="0"/>
+                <a:cs typeface="Times New Roman" panose="02020603050405020304" pitchFamily="18" charset="0"/>
+              </a:rPr>
+              <a:t>{</a:t>
+            </a:r>
+            <a:endParaRPr kumimoji="0" lang="en-US" altLang="en-US" sz="3200" b="0" i="0" u="none" strike="noStrike" cap="none" normalizeH="0" baseline="0" dirty="0">
+              <a:ln>
+                <a:noFill/>
+              </a:ln>
+              <a:solidFill>
+                <a:schemeClr val="tx1"/>
+              </a:solidFill>
+              <a:effectLst/>
+            </a:endParaRPr>
+          </a:p>
+          <a:p>
+            <a:pPr marL="0" marR="0" lvl="0" indent="0" algn="l" defTabSz="914400" rtl="0" eaLnBrk="0" fontAlgn="base" latinLnBrk="0" hangingPunct="0">
+              <a:lnSpc>
+                <a:spcPct val="100000"/>
+              </a:lnSpc>
+              <a:spcBef>
+                <a:spcPct val="0"/>
+              </a:spcBef>
+              <a:spcAft>
+                <a:spcPct val="0"/>
+              </a:spcAft>
+              <a:buClrTx/>
+              <a:buSzTx/>
+              <a:buFontTx/>
+              <a:buNone/>
+              <a:tabLst/>
+            </a:pPr>
+            <a:r>
+              <a:rPr kumimoji="0" lang="en-US" altLang="en-US" sz="3200" b="0" i="0" u="none" strike="noStrike" cap="none" normalizeH="0" baseline="0" dirty="0">
+                <a:ln>
+                  <a:noFill/>
+                </a:ln>
+                <a:solidFill>
+                  <a:srgbClr val="FFFFFF"/>
+                </a:solidFill>
+                <a:effectLst/>
+                <a:latin typeface="Consolas" panose="020B0609020204030204" pitchFamily="49" charset="0"/>
+                <a:ea typeface="Calibri" panose="020F0502020204030204" pitchFamily="34" charset="0"/>
+                <a:cs typeface="Courier New" panose="02070309020205020404" pitchFamily="49" charset="0"/>
+              </a:rPr>
+              <a:t>  </a:t>
+            </a:r>
+            <a:r>
+              <a:rPr kumimoji="0" lang="en-US" altLang="en-US" sz="3200" b="0" i="0" u="none" strike="noStrike" cap="none" normalizeH="0" baseline="0" dirty="0">
+                <a:ln>
+                  <a:noFill/>
+                </a:ln>
+                <a:solidFill>
+                  <a:srgbClr val="C5A5C5"/>
+                </a:solidFill>
+                <a:effectLst/>
+                <a:latin typeface="Consolas" panose="020B0609020204030204" pitchFamily="49" charset="0"/>
+                <a:ea typeface="Calibri" panose="020F0502020204030204" pitchFamily="34" charset="0"/>
+                <a:cs typeface="Times New Roman" panose="02020603050405020304" pitchFamily="18" charset="0"/>
+              </a:rPr>
+              <a:t>return</a:t>
+            </a:r>
+            <a:r>
+              <a:rPr kumimoji="0" lang="en-US" altLang="en-US" sz="3200" b="0" i="0" u="none" strike="noStrike" cap="none" normalizeH="0" baseline="0" dirty="0">
+                <a:ln>
+                  <a:noFill/>
+                </a:ln>
+                <a:solidFill>
+                  <a:srgbClr val="FFFFFF"/>
+                </a:solidFill>
+                <a:effectLst/>
+                <a:latin typeface="Consolas" panose="020B0609020204030204" pitchFamily="49" charset="0"/>
+                <a:ea typeface="Calibri" panose="020F0502020204030204" pitchFamily="34" charset="0"/>
+                <a:cs typeface="Courier New" panose="02070309020205020404" pitchFamily="49" charset="0"/>
+              </a:rPr>
+              <a:t> </a:t>
+            </a:r>
+            <a:r>
+              <a:rPr kumimoji="0" lang="en-US" altLang="en-US" sz="3200" b="0" i="0" u="none" strike="noStrike" cap="none" normalizeH="0" baseline="0" dirty="0">
+                <a:ln>
+                  <a:noFill/>
+                </a:ln>
+                <a:solidFill>
+                  <a:srgbClr val="88C6BE"/>
+                </a:solidFill>
+                <a:effectLst/>
+                <a:latin typeface="Consolas" panose="020B0609020204030204" pitchFamily="49" charset="0"/>
+                <a:ea typeface="Calibri" panose="020F0502020204030204" pitchFamily="34" charset="0"/>
+                <a:cs typeface="Times New Roman" panose="02020603050405020304" pitchFamily="18" charset="0"/>
+              </a:rPr>
+              <a:t>(</a:t>
+            </a:r>
+            <a:endParaRPr kumimoji="0" lang="en-US" altLang="en-US" sz="3200" b="0" i="0" u="none" strike="noStrike" cap="none" normalizeH="0" baseline="0" dirty="0">
+              <a:ln>
+                <a:noFill/>
+              </a:ln>
+              <a:solidFill>
+                <a:schemeClr val="tx1"/>
+              </a:solidFill>
+              <a:effectLst/>
+            </a:endParaRPr>
+          </a:p>
+          <a:p>
+            <a:pPr marL="0" marR="0" lvl="0" indent="0" algn="l" defTabSz="914400" rtl="0" eaLnBrk="0" fontAlgn="base" latinLnBrk="0" hangingPunct="0">
+              <a:lnSpc>
+                <a:spcPct val="100000"/>
+              </a:lnSpc>
+              <a:spcBef>
+                <a:spcPct val="0"/>
+              </a:spcBef>
+              <a:spcAft>
+                <a:spcPct val="0"/>
+              </a:spcAft>
+              <a:buClrTx/>
+              <a:buSzTx/>
+              <a:buFontTx/>
+              <a:buNone/>
+              <a:tabLst/>
+            </a:pPr>
+            <a:r>
+              <a:rPr kumimoji="0" lang="en-US" altLang="en-US" sz="3200" b="0" i="0" u="none" strike="noStrike" cap="none" normalizeH="0" baseline="0" dirty="0">
+                <a:ln>
+                  <a:noFill/>
+                </a:ln>
+                <a:solidFill>
+                  <a:srgbClr val="FFFFFF"/>
+                </a:solidFill>
+                <a:effectLst/>
+                <a:latin typeface="Consolas" panose="020B0609020204030204" pitchFamily="49" charset="0"/>
+                <a:ea typeface="Calibri" panose="020F0502020204030204" pitchFamily="34" charset="0"/>
+                <a:cs typeface="Courier New" panose="02070309020205020404" pitchFamily="49" charset="0"/>
+              </a:rPr>
+              <a:t>    </a:t>
+            </a:r>
+            <a:r>
+              <a:rPr kumimoji="0" lang="en-US" altLang="en-US" sz="3200" b="0" i="0" u="none" strike="noStrike" cap="none" normalizeH="0" baseline="0" dirty="0">
+                <a:ln>
+                  <a:noFill/>
+                </a:ln>
+                <a:solidFill>
+                  <a:srgbClr val="88C6BE"/>
+                </a:solidFill>
+                <a:effectLst/>
+                <a:latin typeface="Consolas" panose="020B0609020204030204" pitchFamily="49" charset="0"/>
+                <a:ea typeface="Calibri" panose="020F0502020204030204" pitchFamily="34" charset="0"/>
+                <a:cs typeface="Times New Roman" panose="02020603050405020304" pitchFamily="18" charset="0"/>
+              </a:rPr>
+              <a:t>&lt;</a:t>
+            </a:r>
+            <a:r>
+              <a:rPr kumimoji="0" lang="en-US" altLang="en-US" sz="3200" b="0" i="0" u="none" strike="noStrike" cap="none" normalizeH="0" baseline="0" dirty="0" err="1">
+                <a:ln>
+                  <a:noFill/>
+                </a:ln>
+                <a:solidFill>
+                  <a:srgbClr val="FC929E"/>
+                </a:solidFill>
+                <a:effectLst/>
+                <a:latin typeface="Consolas" panose="020B0609020204030204" pitchFamily="49" charset="0"/>
+                <a:ea typeface="Calibri" panose="020F0502020204030204" pitchFamily="34" charset="0"/>
+                <a:cs typeface="Times New Roman" panose="02020603050405020304" pitchFamily="18" charset="0"/>
+              </a:rPr>
+              <a:t>React.Fragment</a:t>
+            </a:r>
+            <a:r>
+              <a:rPr kumimoji="0" lang="en-US" altLang="en-US" sz="3200" b="0" i="0" u="none" strike="noStrike" cap="none" normalizeH="0" baseline="0" dirty="0">
+                <a:ln>
+                  <a:noFill/>
+                </a:ln>
+                <a:solidFill>
+                  <a:srgbClr val="88C6BE"/>
+                </a:solidFill>
+                <a:effectLst/>
+                <a:latin typeface="Consolas" panose="020B0609020204030204" pitchFamily="49" charset="0"/>
+                <a:ea typeface="Calibri" panose="020F0502020204030204" pitchFamily="34" charset="0"/>
+                <a:cs typeface="Times New Roman" panose="02020603050405020304" pitchFamily="18" charset="0"/>
+              </a:rPr>
+              <a:t>&gt;</a:t>
+            </a:r>
+            <a:endParaRPr kumimoji="0" lang="en-US" altLang="en-US" sz="3200" b="0" i="0" u="none" strike="noStrike" cap="none" normalizeH="0" baseline="0" dirty="0">
+              <a:ln>
+                <a:noFill/>
+              </a:ln>
+              <a:solidFill>
+                <a:schemeClr val="tx1"/>
+              </a:solidFill>
+              <a:effectLst/>
+            </a:endParaRPr>
+          </a:p>
+          <a:p>
+            <a:pPr marL="0" marR="0" lvl="0" indent="0" algn="l" defTabSz="914400" rtl="0" eaLnBrk="0" fontAlgn="base" latinLnBrk="0" hangingPunct="0">
+              <a:lnSpc>
+                <a:spcPct val="100000"/>
+              </a:lnSpc>
+              <a:spcBef>
+                <a:spcPct val="0"/>
+              </a:spcBef>
+              <a:spcAft>
+                <a:spcPct val="0"/>
+              </a:spcAft>
+              <a:buClrTx/>
+              <a:buSzTx/>
+              <a:buFontTx/>
+              <a:buNone/>
+              <a:tabLst/>
+            </a:pPr>
+            <a:r>
+              <a:rPr kumimoji="0" lang="en-US" altLang="en-US" sz="3200" b="0" i="0" u="none" strike="noStrike" cap="none" normalizeH="0" baseline="0" dirty="0">
+                <a:ln>
+                  <a:noFill/>
+                </a:ln>
+                <a:solidFill>
+                  <a:srgbClr val="FFFFFF"/>
+                </a:solidFill>
+                <a:effectLst/>
+                <a:latin typeface="Consolas" panose="020B0609020204030204" pitchFamily="49" charset="0"/>
+                <a:ea typeface="Calibri" panose="020F0502020204030204" pitchFamily="34" charset="0"/>
+                <a:cs typeface="Times New Roman" panose="02020603050405020304" pitchFamily="18" charset="0"/>
+              </a:rPr>
+              <a:t>      </a:t>
+            </a:r>
+            <a:r>
+              <a:rPr kumimoji="0" lang="en-US" altLang="en-US" sz="3200" b="0" i="0" u="none" strike="noStrike" cap="none" normalizeH="0" baseline="0" dirty="0">
+                <a:ln>
+                  <a:noFill/>
+                </a:ln>
+                <a:solidFill>
+                  <a:srgbClr val="88C6BE"/>
+                </a:solidFill>
+                <a:effectLst/>
+                <a:latin typeface="Consolas" panose="020B0609020204030204" pitchFamily="49" charset="0"/>
+                <a:ea typeface="Calibri" panose="020F0502020204030204" pitchFamily="34" charset="0"/>
+                <a:cs typeface="Times New Roman" panose="02020603050405020304" pitchFamily="18" charset="0"/>
+              </a:rPr>
+              <a:t>&lt;</a:t>
+            </a:r>
+            <a:r>
+              <a:rPr kumimoji="0" lang="en-US" altLang="en-US" sz="3200" b="0" i="0" u="none" strike="noStrike" cap="none" normalizeH="0" baseline="0" dirty="0" err="1">
+                <a:ln>
+                  <a:noFill/>
+                </a:ln>
+                <a:solidFill>
+                  <a:srgbClr val="FC929E"/>
+                </a:solidFill>
+                <a:effectLst/>
+                <a:latin typeface="Consolas" panose="020B0609020204030204" pitchFamily="49" charset="0"/>
+                <a:ea typeface="Calibri" panose="020F0502020204030204" pitchFamily="34" charset="0"/>
+                <a:cs typeface="Times New Roman" panose="02020603050405020304" pitchFamily="18" charset="0"/>
+              </a:rPr>
+              <a:t>ChildA</a:t>
+            </a:r>
+            <a:r>
+              <a:rPr kumimoji="0" lang="en-US" altLang="en-US" sz="3200" b="0" i="0" u="none" strike="noStrike" cap="none" normalizeH="0" baseline="0" dirty="0">
+                <a:ln>
+                  <a:noFill/>
+                </a:ln>
+                <a:solidFill>
+                  <a:srgbClr val="FC929E"/>
+                </a:solidFill>
+                <a:effectLst/>
+                <a:latin typeface="Consolas" panose="020B0609020204030204" pitchFamily="49" charset="0"/>
+                <a:ea typeface="Calibri" panose="020F0502020204030204" pitchFamily="34" charset="0"/>
+                <a:cs typeface="Times New Roman" panose="02020603050405020304" pitchFamily="18" charset="0"/>
+              </a:rPr>
+              <a:t> </a:t>
+            </a:r>
+            <a:r>
+              <a:rPr kumimoji="0" lang="en-US" altLang="en-US" sz="3200" b="0" i="0" u="none" strike="noStrike" cap="none" normalizeH="0" baseline="0" dirty="0">
+                <a:ln>
+                  <a:noFill/>
+                </a:ln>
+                <a:solidFill>
+                  <a:srgbClr val="88C6BE"/>
+                </a:solidFill>
+                <a:effectLst/>
+                <a:latin typeface="Consolas" panose="020B0609020204030204" pitchFamily="49" charset="0"/>
+                <a:ea typeface="Calibri" panose="020F0502020204030204" pitchFamily="34" charset="0"/>
+                <a:cs typeface="Times New Roman" panose="02020603050405020304" pitchFamily="18" charset="0"/>
+              </a:rPr>
+              <a:t>/&gt;</a:t>
+            </a:r>
+            <a:endParaRPr kumimoji="0" lang="en-US" altLang="en-US" sz="3200" b="0" i="0" u="none" strike="noStrike" cap="none" normalizeH="0" baseline="0" dirty="0">
+              <a:ln>
+                <a:noFill/>
+              </a:ln>
+              <a:solidFill>
+                <a:schemeClr val="tx1"/>
+              </a:solidFill>
+              <a:effectLst/>
+            </a:endParaRPr>
+          </a:p>
+          <a:p>
+            <a:pPr marL="0" marR="0" lvl="0" indent="0" algn="l" defTabSz="914400" rtl="0" eaLnBrk="0" fontAlgn="base" latinLnBrk="0" hangingPunct="0">
+              <a:lnSpc>
+                <a:spcPct val="100000"/>
+              </a:lnSpc>
+              <a:spcBef>
+                <a:spcPct val="0"/>
+              </a:spcBef>
+              <a:spcAft>
+                <a:spcPct val="0"/>
+              </a:spcAft>
+              <a:buClrTx/>
+              <a:buSzTx/>
+              <a:buFontTx/>
+              <a:buNone/>
+              <a:tabLst/>
+            </a:pPr>
+            <a:r>
+              <a:rPr kumimoji="0" lang="en-US" altLang="en-US" sz="3200" b="0" i="0" u="none" strike="noStrike" cap="none" normalizeH="0" baseline="0" dirty="0">
+                <a:ln>
+                  <a:noFill/>
+                </a:ln>
+                <a:solidFill>
+                  <a:srgbClr val="FFFFFF"/>
+                </a:solidFill>
+                <a:effectLst/>
+                <a:latin typeface="Consolas" panose="020B0609020204030204" pitchFamily="49" charset="0"/>
+                <a:ea typeface="Calibri" panose="020F0502020204030204" pitchFamily="34" charset="0"/>
+                <a:cs typeface="Times New Roman" panose="02020603050405020304" pitchFamily="18" charset="0"/>
+              </a:rPr>
+              <a:t>      </a:t>
+            </a:r>
+            <a:r>
+              <a:rPr kumimoji="0" lang="ru-RU" altLang="en-US" sz="3200" b="0" i="0" u="none" strike="noStrike" cap="none" normalizeH="0" baseline="0" dirty="0">
+                <a:ln>
+                  <a:noFill/>
+                </a:ln>
+                <a:solidFill>
+                  <a:srgbClr val="88C6BE"/>
+                </a:solidFill>
+                <a:effectLst/>
+                <a:latin typeface="Consolas" panose="020B0609020204030204" pitchFamily="49" charset="0"/>
+                <a:ea typeface="Calibri" panose="020F0502020204030204" pitchFamily="34" charset="0"/>
+                <a:cs typeface="Times New Roman" panose="02020603050405020304" pitchFamily="18" charset="0"/>
+              </a:rPr>
+              <a:t>&lt;</a:t>
+            </a:r>
+            <a:r>
+              <a:rPr kumimoji="0" lang="en-US" altLang="en-US" sz="3200" b="0" i="0" u="none" strike="noStrike" cap="none" normalizeH="0" baseline="0" dirty="0" err="1">
+                <a:ln>
+                  <a:noFill/>
+                </a:ln>
+                <a:solidFill>
+                  <a:srgbClr val="FC929E"/>
+                </a:solidFill>
+                <a:effectLst/>
+                <a:latin typeface="Consolas" panose="020B0609020204030204" pitchFamily="49" charset="0"/>
+                <a:ea typeface="Calibri" panose="020F0502020204030204" pitchFamily="34" charset="0"/>
+                <a:cs typeface="Times New Roman" panose="02020603050405020304" pitchFamily="18" charset="0"/>
+              </a:rPr>
+              <a:t>ChildB</a:t>
+            </a:r>
+            <a:r>
+              <a:rPr kumimoji="0" lang="ru-RU" altLang="en-US" sz="3200" b="0" i="0" u="none" strike="noStrike" cap="none" normalizeH="0" baseline="0" dirty="0">
+                <a:ln>
+                  <a:noFill/>
+                </a:ln>
+                <a:solidFill>
+                  <a:srgbClr val="FC929E"/>
+                </a:solidFill>
+                <a:effectLst/>
+                <a:latin typeface="Consolas" panose="020B0609020204030204" pitchFamily="49" charset="0"/>
+                <a:ea typeface="Calibri" panose="020F0502020204030204" pitchFamily="34" charset="0"/>
+                <a:cs typeface="Times New Roman" panose="02020603050405020304" pitchFamily="18" charset="0"/>
+              </a:rPr>
+              <a:t> </a:t>
+            </a:r>
+            <a:r>
+              <a:rPr kumimoji="0" lang="ru-RU" altLang="en-US" sz="3200" b="0" i="0" u="none" strike="noStrike" cap="none" normalizeH="0" baseline="0" dirty="0">
+                <a:ln>
+                  <a:noFill/>
+                </a:ln>
+                <a:solidFill>
+                  <a:srgbClr val="88C6BE"/>
+                </a:solidFill>
+                <a:effectLst/>
+                <a:latin typeface="Consolas" panose="020B0609020204030204" pitchFamily="49" charset="0"/>
+                <a:ea typeface="Calibri" panose="020F0502020204030204" pitchFamily="34" charset="0"/>
+                <a:cs typeface="Times New Roman" panose="02020603050405020304" pitchFamily="18" charset="0"/>
+              </a:rPr>
+              <a:t>/&gt;</a:t>
+            </a:r>
+            <a:endParaRPr kumimoji="0" lang="en-US" altLang="en-US" sz="3200" b="0" i="0" u="none" strike="noStrike" cap="none" normalizeH="0" baseline="0" dirty="0">
+              <a:ln>
+                <a:noFill/>
+              </a:ln>
+              <a:solidFill>
+                <a:schemeClr val="tx1"/>
+              </a:solidFill>
+              <a:effectLst/>
+            </a:endParaRPr>
+          </a:p>
+          <a:p>
+            <a:pPr marL="0" marR="0" lvl="0" indent="0" algn="l" defTabSz="914400" rtl="0" eaLnBrk="0" fontAlgn="base" latinLnBrk="0" hangingPunct="0">
+              <a:lnSpc>
+                <a:spcPct val="100000"/>
+              </a:lnSpc>
+              <a:spcBef>
+                <a:spcPct val="0"/>
+              </a:spcBef>
+              <a:spcAft>
+                <a:spcPct val="0"/>
+              </a:spcAft>
+              <a:buClrTx/>
+              <a:buSzTx/>
+              <a:buFontTx/>
+              <a:buNone/>
+              <a:tabLst/>
+            </a:pPr>
+            <a:r>
+              <a:rPr kumimoji="0" lang="ru-RU" altLang="en-US" sz="3200" b="0" i="0" u="none" strike="noStrike" cap="none" normalizeH="0" baseline="0" dirty="0">
+                <a:ln>
+                  <a:noFill/>
+                </a:ln>
+                <a:solidFill>
+                  <a:srgbClr val="FFFFFF"/>
+                </a:solidFill>
+                <a:effectLst/>
+                <a:latin typeface="Consolas" panose="020B0609020204030204" pitchFamily="49" charset="0"/>
+                <a:ea typeface="Calibri" panose="020F0502020204030204" pitchFamily="34" charset="0"/>
+                <a:cs typeface="Times New Roman" panose="02020603050405020304" pitchFamily="18" charset="0"/>
+              </a:rPr>
+              <a:t>      </a:t>
+            </a:r>
+            <a:r>
+              <a:rPr kumimoji="0" lang="ru-RU" altLang="en-US" sz="3200" b="0" i="0" u="none" strike="noStrike" cap="none" normalizeH="0" baseline="0" dirty="0">
+                <a:ln>
+                  <a:noFill/>
+                </a:ln>
+                <a:solidFill>
+                  <a:srgbClr val="88C6BE"/>
+                </a:solidFill>
+                <a:effectLst/>
+                <a:latin typeface="Consolas" panose="020B0609020204030204" pitchFamily="49" charset="0"/>
+                <a:ea typeface="Calibri" panose="020F0502020204030204" pitchFamily="34" charset="0"/>
+                <a:cs typeface="Times New Roman" panose="02020603050405020304" pitchFamily="18" charset="0"/>
+              </a:rPr>
+              <a:t>&lt;</a:t>
+            </a:r>
+            <a:r>
+              <a:rPr kumimoji="0" lang="en-US" altLang="en-US" sz="3200" b="0" i="0" u="none" strike="noStrike" cap="none" normalizeH="0" baseline="0" dirty="0" err="1">
+                <a:ln>
+                  <a:noFill/>
+                </a:ln>
+                <a:solidFill>
+                  <a:srgbClr val="FC929E"/>
+                </a:solidFill>
+                <a:effectLst/>
+                <a:latin typeface="Consolas" panose="020B0609020204030204" pitchFamily="49" charset="0"/>
+                <a:ea typeface="Calibri" panose="020F0502020204030204" pitchFamily="34" charset="0"/>
+                <a:cs typeface="Times New Roman" panose="02020603050405020304" pitchFamily="18" charset="0"/>
+              </a:rPr>
+              <a:t>ChildC</a:t>
+            </a:r>
+            <a:r>
+              <a:rPr kumimoji="0" lang="ru-RU" altLang="en-US" sz="3200" b="0" i="0" u="none" strike="noStrike" cap="none" normalizeH="0" baseline="0" dirty="0">
+                <a:ln>
+                  <a:noFill/>
+                </a:ln>
+                <a:solidFill>
+                  <a:srgbClr val="FC929E"/>
+                </a:solidFill>
+                <a:effectLst/>
+                <a:latin typeface="Consolas" panose="020B0609020204030204" pitchFamily="49" charset="0"/>
+                <a:ea typeface="Calibri" panose="020F0502020204030204" pitchFamily="34" charset="0"/>
+                <a:cs typeface="Times New Roman" panose="02020603050405020304" pitchFamily="18" charset="0"/>
+              </a:rPr>
+              <a:t> </a:t>
+            </a:r>
+            <a:r>
+              <a:rPr kumimoji="0" lang="ru-RU" altLang="en-US" sz="3200" b="0" i="0" u="none" strike="noStrike" cap="none" normalizeH="0" baseline="0" dirty="0">
+                <a:ln>
+                  <a:noFill/>
+                </a:ln>
+                <a:solidFill>
+                  <a:srgbClr val="88C6BE"/>
+                </a:solidFill>
+                <a:effectLst/>
+                <a:latin typeface="Consolas" panose="020B0609020204030204" pitchFamily="49" charset="0"/>
+                <a:ea typeface="Calibri" panose="020F0502020204030204" pitchFamily="34" charset="0"/>
+                <a:cs typeface="Times New Roman" panose="02020603050405020304" pitchFamily="18" charset="0"/>
+              </a:rPr>
+              <a:t>/&gt;</a:t>
+            </a:r>
+            <a:endParaRPr kumimoji="0" lang="en-US" altLang="en-US" sz="3200" b="0" i="0" u="none" strike="noStrike" cap="none" normalizeH="0" baseline="0" dirty="0">
+              <a:ln>
+                <a:noFill/>
+              </a:ln>
+              <a:solidFill>
+                <a:schemeClr val="tx1"/>
+              </a:solidFill>
+              <a:effectLst/>
+            </a:endParaRPr>
+          </a:p>
+          <a:p>
+            <a:pPr marL="0" marR="0" lvl="0" indent="0" algn="l" defTabSz="914400" rtl="0" eaLnBrk="0" fontAlgn="base" latinLnBrk="0" hangingPunct="0">
+              <a:lnSpc>
+                <a:spcPct val="100000"/>
+              </a:lnSpc>
+              <a:spcBef>
+                <a:spcPct val="0"/>
+              </a:spcBef>
+              <a:spcAft>
+                <a:spcPct val="0"/>
+              </a:spcAft>
+              <a:buClrTx/>
+              <a:buSzTx/>
+              <a:buFontTx/>
+              <a:buNone/>
+              <a:tabLst/>
+            </a:pPr>
+            <a:r>
+              <a:rPr kumimoji="0" lang="ru-RU" altLang="en-US" sz="3200" b="0" i="0" u="none" strike="noStrike" cap="none" normalizeH="0" baseline="0" dirty="0">
+                <a:ln>
+                  <a:noFill/>
+                </a:ln>
+                <a:solidFill>
+                  <a:srgbClr val="FFFFFF"/>
+                </a:solidFill>
+                <a:effectLst/>
+                <a:latin typeface="Consolas" panose="020B0609020204030204" pitchFamily="49" charset="0"/>
+                <a:ea typeface="Calibri" panose="020F0502020204030204" pitchFamily="34" charset="0"/>
+                <a:cs typeface="Times New Roman" panose="02020603050405020304" pitchFamily="18" charset="0"/>
+              </a:rPr>
+              <a:t>    </a:t>
+            </a:r>
+            <a:r>
+              <a:rPr kumimoji="0" lang="ru-RU" altLang="en-US" sz="3200" b="0" i="0" u="none" strike="noStrike" cap="none" normalizeH="0" baseline="0" dirty="0">
+                <a:ln>
+                  <a:noFill/>
+                </a:ln>
+                <a:solidFill>
+                  <a:srgbClr val="88C6BE"/>
+                </a:solidFill>
+                <a:effectLst/>
+                <a:latin typeface="Consolas" panose="020B0609020204030204" pitchFamily="49" charset="0"/>
+                <a:ea typeface="Calibri" panose="020F0502020204030204" pitchFamily="34" charset="0"/>
+                <a:cs typeface="Times New Roman" panose="02020603050405020304" pitchFamily="18" charset="0"/>
+              </a:rPr>
+              <a:t>&lt;/</a:t>
+            </a:r>
+            <a:r>
+              <a:rPr kumimoji="0" lang="en-US" altLang="en-US" sz="3200" b="0" i="0" u="none" strike="noStrike" cap="none" normalizeH="0" baseline="0" dirty="0">
+                <a:ln>
+                  <a:noFill/>
+                </a:ln>
+                <a:solidFill>
+                  <a:srgbClr val="FC929E"/>
+                </a:solidFill>
+                <a:effectLst/>
+                <a:latin typeface="Consolas" panose="020B0609020204030204" pitchFamily="49" charset="0"/>
+                <a:ea typeface="Calibri" panose="020F0502020204030204" pitchFamily="34" charset="0"/>
+                <a:cs typeface="Times New Roman" panose="02020603050405020304" pitchFamily="18" charset="0"/>
+              </a:rPr>
+              <a:t>React</a:t>
+            </a:r>
+            <a:r>
+              <a:rPr kumimoji="0" lang="ru-RU" altLang="en-US" sz="3200" b="0" i="0" u="none" strike="noStrike" cap="none" normalizeH="0" baseline="0" dirty="0">
+                <a:ln>
+                  <a:noFill/>
+                </a:ln>
+                <a:solidFill>
+                  <a:srgbClr val="FC929E"/>
+                </a:solidFill>
+                <a:effectLst/>
+                <a:latin typeface="Consolas" panose="020B0609020204030204" pitchFamily="49" charset="0"/>
+                <a:ea typeface="Calibri" panose="020F0502020204030204" pitchFamily="34" charset="0"/>
+                <a:cs typeface="Times New Roman" panose="02020603050405020304" pitchFamily="18" charset="0"/>
+              </a:rPr>
+              <a:t>.</a:t>
+            </a:r>
+            <a:r>
+              <a:rPr kumimoji="0" lang="en-US" altLang="en-US" sz="3200" b="0" i="0" u="none" strike="noStrike" cap="none" normalizeH="0" baseline="0" dirty="0">
+                <a:ln>
+                  <a:noFill/>
+                </a:ln>
+                <a:solidFill>
+                  <a:srgbClr val="FC929E"/>
+                </a:solidFill>
+                <a:effectLst/>
+                <a:latin typeface="Consolas" panose="020B0609020204030204" pitchFamily="49" charset="0"/>
+                <a:ea typeface="Calibri" panose="020F0502020204030204" pitchFamily="34" charset="0"/>
+                <a:cs typeface="Times New Roman" panose="02020603050405020304" pitchFamily="18" charset="0"/>
+              </a:rPr>
+              <a:t>Fragment</a:t>
+            </a:r>
+            <a:r>
+              <a:rPr kumimoji="0" lang="ru-RU" altLang="en-US" sz="3200" b="0" i="0" u="none" strike="noStrike" cap="none" normalizeH="0" baseline="0" dirty="0">
+                <a:ln>
+                  <a:noFill/>
+                </a:ln>
+                <a:solidFill>
+                  <a:srgbClr val="88C6BE"/>
+                </a:solidFill>
+                <a:effectLst/>
+                <a:latin typeface="Consolas" panose="020B0609020204030204" pitchFamily="49" charset="0"/>
+                <a:ea typeface="Calibri" panose="020F0502020204030204" pitchFamily="34" charset="0"/>
+                <a:cs typeface="Times New Roman" panose="02020603050405020304" pitchFamily="18" charset="0"/>
+              </a:rPr>
+              <a:t>&gt;</a:t>
+            </a:r>
+            <a:endParaRPr kumimoji="0" lang="en-US" altLang="en-US" sz="3200" b="0" i="0" u="none" strike="noStrike" cap="none" normalizeH="0" baseline="0" dirty="0">
+              <a:ln>
+                <a:noFill/>
+              </a:ln>
+              <a:solidFill>
+                <a:schemeClr val="tx1"/>
+              </a:solidFill>
+              <a:effectLst/>
+            </a:endParaRPr>
+          </a:p>
+          <a:p>
+            <a:pPr marL="0" marR="0" lvl="0" indent="0" algn="l" defTabSz="914400" rtl="0" eaLnBrk="0" fontAlgn="base" latinLnBrk="0" hangingPunct="0">
+              <a:lnSpc>
+                <a:spcPct val="100000"/>
+              </a:lnSpc>
+              <a:spcBef>
+                <a:spcPct val="0"/>
+              </a:spcBef>
+              <a:spcAft>
+                <a:spcPct val="0"/>
+              </a:spcAft>
+              <a:buClrTx/>
+              <a:buSzTx/>
+              <a:buFontTx/>
+              <a:buNone/>
+              <a:tabLst/>
+            </a:pPr>
+            <a:r>
+              <a:rPr kumimoji="0" lang="ru-RU" altLang="en-US" sz="3200" b="0" i="0" u="none" strike="noStrike" cap="none" normalizeH="0" baseline="0" dirty="0">
+                <a:ln>
+                  <a:noFill/>
+                </a:ln>
+                <a:solidFill>
+                  <a:srgbClr val="FFFFFF"/>
+                </a:solidFill>
+                <a:effectLst/>
+                <a:latin typeface="Consolas" panose="020B0609020204030204" pitchFamily="49" charset="0"/>
+                <a:ea typeface="Calibri" panose="020F0502020204030204" pitchFamily="34" charset="0"/>
+                <a:cs typeface="Courier New" panose="02070309020205020404" pitchFamily="49" charset="0"/>
+              </a:rPr>
+              <a:t>  </a:t>
+            </a:r>
+            <a:r>
+              <a:rPr kumimoji="0" lang="ru-RU" altLang="en-US" sz="3200" b="0" i="0" u="none" strike="noStrike" cap="none" normalizeH="0" baseline="0" dirty="0">
+                <a:ln>
+                  <a:noFill/>
+                </a:ln>
+                <a:solidFill>
+                  <a:srgbClr val="88C6BE"/>
+                </a:solidFill>
+                <a:effectLst/>
+                <a:latin typeface="Consolas" panose="020B0609020204030204" pitchFamily="49" charset="0"/>
+                <a:ea typeface="Calibri" panose="020F0502020204030204" pitchFamily="34" charset="0"/>
+                <a:cs typeface="Times New Roman" panose="02020603050405020304" pitchFamily="18" charset="0"/>
+              </a:rPr>
+              <a:t>);</a:t>
+            </a:r>
+            <a:endParaRPr kumimoji="0" lang="en-US" altLang="en-US" sz="3200" b="0" i="0" u="none" strike="noStrike" cap="none" normalizeH="0" baseline="0" dirty="0">
+              <a:ln>
+                <a:noFill/>
+              </a:ln>
+              <a:solidFill>
+                <a:schemeClr val="tx1"/>
+              </a:solidFill>
+              <a:effectLst/>
+            </a:endParaRPr>
+          </a:p>
+          <a:p>
+            <a:pPr marL="0" marR="0" lvl="0" indent="0" algn="l" defTabSz="914400" rtl="0" eaLnBrk="0" fontAlgn="base" latinLnBrk="0" hangingPunct="0">
+              <a:lnSpc>
+                <a:spcPct val="100000"/>
+              </a:lnSpc>
+              <a:spcBef>
+                <a:spcPct val="0"/>
+              </a:spcBef>
+              <a:spcAft>
+                <a:spcPct val="0"/>
+              </a:spcAft>
+              <a:buClrTx/>
+              <a:buSzTx/>
+              <a:buFontTx/>
+              <a:buNone/>
+              <a:tabLst/>
+            </a:pPr>
+            <a:r>
+              <a:rPr kumimoji="0" lang="ru-RU" altLang="en-US" sz="3200" b="0" i="0" u="none" strike="noStrike" cap="none" normalizeH="0" baseline="0" dirty="0">
+                <a:ln>
+                  <a:noFill/>
+                </a:ln>
+                <a:solidFill>
+                  <a:srgbClr val="88C6BE"/>
+                </a:solidFill>
+                <a:effectLst/>
+                <a:latin typeface="Consolas" panose="020B0609020204030204" pitchFamily="49" charset="0"/>
+                <a:ea typeface="Calibri" panose="020F0502020204030204" pitchFamily="34" charset="0"/>
+                <a:cs typeface="Times New Roman" panose="02020603050405020304" pitchFamily="18" charset="0"/>
+              </a:rPr>
+              <a:t>}</a:t>
+            </a:r>
+            <a:endParaRPr kumimoji="0" lang="ru-RU" altLang="en-US" sz="3200" b="0" i="0" u="none" strike="noStrike" cap="none" normalizeH="0" baseline="0" dirty="0">
+              <a:ln>
+                <a:noFill/>
+              </a:ln>
+              <a:solidFill>
+                <a:schemeClr val="tx1"/>
+              </a:solidFill>
+              <a:effectLst/>
+              <a:latin typeface="Arial" panose="020B0604020202020204" pitchFamily="34" charset="0"/>
+            </a:endParaRPr>
+          </a:p>
+        </p:txBody>
+      </p:sp>
+    </p:spTree>
+    <p:extLst>
+      <p:ext uri="{BB962C8B-B14F-4D97-AF65-F5344CB8AC3E}">
+        <p14:creationId xmlns:p14="http://schemas.microsoft.com/office/powerpoint/2010/main" val="146770913"/>
+      </p:ext>
+    </p:extLst>
+  </p:cSld>
+  <p:clrMapOvr>
+    <a:masterClrMapping/>
+  </p:clrMapOvr>
+</p:sld>
+</file>
+
+<file path=ppt/slides/slide15.xml><?xml version="1.0" encoding="utf-8"?>
+<p:sld xmlns:a="http://schemas.openxmlformats.org/drawingml/2006/main" xmlns:r="http://schemas.openxmlformats.org/officeDocument/2006/relationships" xmlns:p="http://schemas.openxmlformats.org/presentationml/2006/main">
+  <p:cSld>
+    <p:spTree>
+      <p:nvGrpSpPr>
+        <p:cNvPr id="1" name=""/>
+        <p:cNvGrpSpPr/>
+        <p:nvPr/>
+      </p:nvGrpSpPr>
+      <p:grpSpPr>
+        <a:xfrm>
+          <a:off x="0" y="0"/>
+          <a:ext cx="0" cy="0"/>
+          <a:chOff x="0" y="0"/>
+          <a:chExt cx="0" cy="0"/>
+        </a:xfrm>
+      </p:grpSpPr>
+      <p:sp>
+        <p:nvSpPr>
+          <p:cNvPr id="2" name="Title 1">
+            <a:extLst>
+              <a:ext uri="{FF2B5EF4-FFF2-40B4-BE49-F238E27FC236}">
+                <a16:creationId xmlns:a16="http://schemas.microsoft.com/office/drawing/2014/main" id="{69CE438D-3469-468C-9623-F26A41E8632D}"/>
+              </a:ext>
+            </a:extLst>
+          </p:cNvPr>
+          <p:cNvSpPr>
+            <a:spLocks noGrp="1"/>
+          </p:cNvSpPr>
+          <p:nvPr>
+            <p:ph type="ctrTitle"/>
+          </p:nvPr>
+        </p:nvSpPr>
+        <p:spPr>
+          <a:xfrm>
+            <a:off x="1524000" y="414216"/>
+            <a:ext cx="9144000" cy="969108"/>
+          </a:xfrm>
+        </p:spPr>
+        <p:txBody>
+          <a:bodyPr>
+            <a:normAutofit/>
+          </a:bodyPr>
+          <a:lstStyle/>
+          <a:p>
+            <a:r>
+              <a:rPr lang="ru-RU" b="1" dirty="0"/>
+              <a:t>Предохранители</a:t>
+            </a:r>
+            <a:endParaRPr lang="en-US" dirty="0"/>
+          </a:p>
+        </p:txBody>
+      </p:sp>
+      <p:sp>
+        <p:nvSpPr>
+          <p:cNvPr id="3" name="Subtitle 2">
+            <a:extLst>
+              <a:ext uri="{FF2B5EF4-FFF2-40B4-BE49-F238E27FC236}">
+                <a16:creationId xmlns:a16="http://schemas.microsoft.com/office/drawing/2014/main" id="{63459629-27A0-49E5-B82B-BCAE655E8FCE}"/>
+              </a:ext>
+            </a:extLst>
+          </p:cNvPr>
+          <p:cNvSpPr>
+            <a:spLocks noGrp="1"/>
+          </p:cNvSpPr>
+          <p:nvPr>
+            <p:ph type="subTitle" idx="1"/>
+          </p:nvPr>
+        </p:nvSpPr>
+        <p:spPr>
+          <a:xfrm>
+            <a:off x="1524000" y="1383324"/>
+            <a:ext cx="9144000" cy="4892430"/>
+          </a:xfrm>
+        </p:spPr>
+        <p:txBody>
+          <a:bodyPr>
+            <a:normAutofit/>
+          </a:bodyPr>
+          <a:lstStyle/>
+          <a:p>
+            <a:r>
+              <a:rPr lang="en-US" dirty="0"/>
+              <a:t> </a:t>
+            </a:r>
+          </a:p>
+          <a:p>
+            <a:r>
+              <a:rPr lang="en-US" dirty="0"/>
+              <a:t>  static </a:t>
+            </a:r>
+            <a:r>
+              <a:rPr lang="en-US" dirty="0" err="1"/>
+              <a:t>getDerivedStateFromError</a:t>
+            </a:r>
+            <a:r>
+              <a:rPr lang="en-US" dirty="0"/>
+              <a:t>(error) {</a:t>
+            </a:r>
+          </a:p>
+          <a:p>
+            <a:r>
+              <a:rPr lang="en-US" dirty="0"/>
+              <a:t>    // </a:t>
+            </a:r>
+            <a:r>
+              <a:rPr lang="en-US" dirty="0" err="1"/>
+              <a:t>Обновить</a:t>
+            </a:r>
+            <a:r>
+              <a:rPr lang="en-US" dirty="0"/>
+              <a:t> </a:t>
+            </a:r>
+            <a:r>
+              <a:rPr lang="en-US" dirty="0" err="1"/>
+              <a:t>состояние</a:t>
+            </a:r>
+            <a:r>
+              <a:rPr lang="en-US" dirty="0"/>
+              <a:t> с </a:t>
+            </a:r>
+            <a:r>
+              <a:rPr lang="en-US" dirty="0" err="1"/>
+              <a:t>тем</a:t>
+            </a:r>
+            <a:r>
+              <a:rPr lang="en-US" dirty="0"/>
+              <a:t>, </a:t>
+            </a:r>
+            <a:r>
+              <a:rPr lang="en-US" dirty="0" err="1"/>
+              <a:t>чтобы</a:t>
+            </a:r>
+            <a:r>
+              <a:rPr lang="en-US" dirty="0"/>
+              <a:t> </a:t>
+            </a:r>
+            <a:r>
+              <a:rPr lang="en-US" dirty="0" err="1"/>
+              <a:t>следующий</a:t>
+            </a:r>
+            <a:r>
+              <a:rPr lang="en-US" dirty="0"/>
+              <a:t> </a:t>
+            </a:r>
+            <a:r>
+              <a:rPr lang="en-US" dirty="0" err="1"/>
+              <a:t>рендер</a:t>
+            </a:r>
+            <a:r>
+              <a:rPr lang="en-US" dirty="0"/>
+              <a:t> </a:t>
+            </a:r>
+            <a:r>
+              <a:rPr lang="en-US" dirty="0" err="1"/>
+              <a:t>показал</a:t>
+            </a:r>
+            <a:r>
+              <a:rPr lang="en-US" dirty="0"/>
+              <a:t> </a:t>
+            </a:r>
+            <a:r>
+              <a:rPr lang="en-US" dirty="0" err="1"/>
+              <a:t>запасной</a:t>
+            </a:r>
+            <a:r>
+              <a:rPr lang="en-US" dirty="0"/>
+              <a:t> UI.</a:t>
+            </a:r>
+          </a:p>
+          <a:p>
+            <a:r>
+              <a:rPr lang="en-US" dirty="0"/>
+              <a:t>}</a:t>
+            </a:r>
+          </a:p>
+          <a:p>
+            <a:r>
+              <a:rPr lang="en-US" dirty="0"/>
+              <a:t> </a:t>
+            </a:r>
+          </a:p>
+          <a:p>
+            <a:r>
+              <a:rPr lang="en-US" dirty="0"/>
+              <a:t>  </a:t>
+            </a:r>
+            <a:r>
+              <a:rPr lang="en-US" dirty="0" err="1"/>
+              <a:t>componentDidCatch</a:t>
+            </a:r>
+            <a:r>
+              <a:rPr lang="en-US" dirty="0"/>
+              <a:t>(error, </a:t>
+            </a:r>
+            <a:r>
+              <a:rPr lang="en-US" dirty="0" err="1"/>
+              <a:t>errorInfo</a:t>
+            </a:r>
+            <a:r>
+              <a:rPr lang="en-US" dirty="0"/>
+              <a:t>) {</a:t>
+            </a:r>
+          </a:p>
+          <a:p>
+            <a:r>
+              <a:rPr lang="en-US" dirty="0"/>
+              <a:t>    // </a:t>
+            </a:r>
+            <a:r>
+              <a:rPr lang="en-US" dirty="0" err="1"/>
+              <a:t>Можно</a:t>
+            </a:r>
+            <a:r>
+              <a:rPr lang="en-US" dirty="0"/>
+              <a:t> </a:t>
+            </a:r>
+            <a:r>
+              <a:rPr lang="en-US" dirty="0" err="1"/>
+              <a:t>также</a:t>
+            </a:r>
+            <a:r>
+              <a:rPr lang="en-US" dirty="0"/>
+              <a:t> </a:t>
+            </a:r>
+            <a:r>
+              <a:rPr lang="en-US" dirty="0" err="1"/>
+              <a:t>сохранить</a:t>
+            </a:r>
+            <a:r>
+              <a:rPr lang="en-US" dirty="0"/>
+              <a:t> </a:t>
+            </a:r>
+            <a:r>
+              <a:rPr lang="en-US" dirty="0" err="1"/>
+              <a:t>информацию</a:t>
+            </a:r>
+            <a:r>
+              <a:rPr lang="en-US" dirty="0"/>
+              <a:t> </a:t>
+            </a:r>
+            <a:r>
+              <a:rPr lang="en-US" dirty="0" err="1"/>
+              <a:t>об</a:t>
+            </a:r>
+            <a:r>
+              <a:rPr lang="en-US" dirty="0"/>
+              <a:t> </a:t>
+            </a:r>
+            <a:r>
+              <a:rPr lang="en-US" dirty="0" err="1"/>
+              <a:t>ошибке</a:t>
+            </a:r>
+            <a:r>
+              <a:rPr lang="en-US" dirty="0"/>
+              <a:t> в </a:t>
+            </a:r>
+            <a:r>
+              <a:rPr lang="en-US" dirty="0" err="1"/>
+              <a:t>соответствующую</a:t>
+            </a:r>
+            <a:r>
+              <a:rPr lang="en-US" dirty="0"/>
+              <a:t> </a:t>
+            </a:r>
+            <a:r>
+              <a:rPr lang="en-US" dirty="0" err="1"/>
+              <a:t>службу</a:t>
+            </a:r>
+            <a:r>
+              <a:rPr lang="en-US" dirty="0"/>
+              <a:t> </a:t>
+            </a:r>
+            <a:r>
+              <a:rPr lang="en-US" dirty="0" err="1"/>
+              <a:t>журнала</a:t>
+            </a:r>
+            <a:r>
+              <a:rPr lang="en-US" dirty="0"/>
+              <a:t> </a:t>
+            </a:r>
+            <a:r>
+              <a:rPr lang="en-US" dirty="0" err="1"/>
+              <a:t>ошибок</a:t>
+            </a:r>
+            <a:endParaRPr lang="en-US" dirty="0"/>
+          </a:p>
+          <a:p>
+            <a:r>
+              <a:rPr lang="en-US" dirty="0"/>
+              <a:t>    </a:t>
+            </a:r>
+            <a:r>
+              <a:rPr lang="en-US" dirty="0" err="1"/>
+              <a:t>logErrorToMyService</a:t>
+            </a:r>
+            <a:r>
+              <a:rPr lang="en-US" dirty="0"/>
+              <a:t>(error, </a:t>
+            </a:r>
+            <a:r>
+              <a:rPr lang="en-US" dirty="0" err="1"/>
+              <a:t>errorInfo</a:t>
+            </a:r>
+            <a:r>
+              <a:rPr lang="en-US" dirty="0"/>
+              <a:t>);</a:t>
+            </a:r>
+          </a:p>
+          <a:p>
+            <a:r>
+              <a:rPr lang="en-US" dirty="0"/>
+              <a:t>  }</a:t>
+            </a:r>
+          </a:p>
+          <a:p>
+            <a:endParaRPr lang="en-US" dirty="0"/>
+          </a:p>
+        </p:txBody>
+      </p:sp>
+    </p:spTree>
+    <p:extLst>
+      <p:ext uri="{BB962C8B-B14F-4D97-AF65-F5344CB8AC3E}">
+        <p14:creationId xmlns:p14="http://schemas.microsoft.com/office/powerpoint/2010/main" val="1298801532"/>
+      </p:ext>
+    </p:extLst>
+  </p:cSld>
+  <p:clrMapOvr>
+    <a:masterClrMapping/>
+  </p:clrMapOvr>
+</p:sld>
+</file>
+
+<file path=ppt/slides/slide16.xml><?xml version="1.0" encoding="utf-8"?>
+<p:sld xmlns:a="http://schemas.openxmlformats.org/drawingml/2006/main" xmlns:r="http://schemas.openxmlformats.org/officeDocument/2006/relationships" xmlns:p="http://schemas.openxmlformats.org/presentationml/2006/main">
+  <p:cSld>
+    <p:spTree>
+      <p:nvGrpSpPr>
+        <p:cNvPr id="1" name=""/>
+        <p:cNvGrpSpPr/>
+        <p:nvPr/>
+      </p:nvGrpSpPr>
+      <p:grpSpPr>
+        <a:xfrm>
+          <a:off x="0" y="0"/>
+          <a:ext cx="0" cy="0"/>
+          <a:chOff x="0" y="0"/>
+          <a:chExt cx="0" cy="0"/>
+        </a:xfrm>
+      </p:grpSpPr>
+      <p:sp>
+        <p:nvSpPr>
           <p:cNvPr id="2" name="Rectangle 1">
             <a:extLst>
               <a:ext uri="{FF2B5EF4-FFF2-40B4-BE49-F238E27FC236}">
@@ -5570,7 +6857,7 @@
 </p:sld>
 </file>
 
-<file path=ppt/slides/slide15.xml><?xml version="1.0" encoding="utf-8"?>
+<file path=ppt/slides/slide17.xml><?xml version="1.0" encoding="utf-8"?>
 <p:sld xmlns:a="http://schemas.openxmlformats.org/drawingml/2006/main" xmlns:r="http://schemas.openxmlformats.org/officeDocument/2006/relationships" xmlns:p="http://schemas.openxmlformats.org/presentationml/2006/main">
   <p:cSld>
     <p:spTree>

</xml_diff>